<commit_message>
Add star in board
</commit_message>
<xml_diff>
--- a/memo.pptx
+++ b/memo.pptx
@@ -7,6 +7,7 @@
   <p:sldIdLst>
     <p:sldId id="256" r:id="rId2"/>
     <p:sldId id="257" r:id="rId3"/>
+    <p:sldId id="258" r:id="rId4"/>
   </p:sldIdLst>
   <p:sldSz cx="12192000" cy="6858000"/>
   <p:notesSz cx="6858000" cy="9144000"/>
@@ -105,6 +106,11 @@
       </a:defRPr>
     </a:lvl9pPr>
   </p:defaultTextStyle>
+  <p:extLst>
+    <p:ext uri="{EFAFB233-063F-42B5-8137-9DF3F51BA10A}">
+      <p15:sldGuideLst xmlns:p15="http://schemas.microsoft.com/office/powerpoint/2012/main"/>
+    </p:ext>
+  </p:extLst>
 </p:presentation>
 </file>
 
@@ -5163,6 +5169,83 @@
 </p:sld>
 </file>
 
+<file path=ppt/slides/slide3.xml><?xml version="1.0" encoding="utf-8"?>
+<p:sld xmlns:a="http://schemas.openxmlformats.org/drawingml/2006/main" xmlns:r="http://schemas.openxmlformats.org/officeDocument/2006/relationships" xmlns:p="http://schemas.openxmlformats.org/presentationml/2006/main">
+  <p:cSld>
+    <p:spTree>
+      <p:nvGrpSpPr>
+        <p:cNvPr id="1" name=""/>
+        <p:cNvGrpSpPr/>
+        <p:nvPr/>
+      </p:nvGrpSpPr>
+      <p:grpSpPr>
+        <a:xfrm>
+          <a:off x="0" y="0"/>
+          <a:ext cx="0" cy="0"/>
+          <a:chOff x="0" y="0"/>
+          <a:chExt cx="0" cy="0"/>
+        </a:xfrm>
+      </p:grpSpPr>
+      <p:pic>
+        <p:nvPicPr>
+          <p:cNvPr id="2050" name="Picture 2" descr="囲碁を打ってみよう！実戦対局が初心者にとって一番の上達法：アプリも紹介！│囲碁くまブログ">
+            <a:extLst>
+              <a:ext uri="{FF2B5EF4-FFF2-40B4-BE49-F238E27FC236}">
+                <a16:creationId xmlns:a16="http://schemas.microsoft.com/office/drawing/2014/main" id="{BA029D60-8F8D-C53A-3558-3D2C19D534C9}"/>
+              </a:ext>
+            </a:extLst>
+          </p:cNvPr>
+          <p:cNvPicPr>
+            <a:picLocks noChangeAspect="1" noChangeArrowheads="1"/>
+          </p:cNvPicPr>
+          <p:nvPr/>
+        </p:nvPicPr>
+        <p:blipFill>
+          <a:blip r:embed="rId2">
+            <a:extLst>
+              <a:ext uri="{28A0092B-C50C-407E-A947-70E740481C1C}">
+                <a14:useLocalDpi xmlns:a14="http://schemas.microsoft.com/office/drawing/2010/main" val="0"/>
+              </a:ext>
+            </a:extLst>
+          </a:blip>
+          <a:srcRect/>
+          <a:stretch>
+            <a:fillRect/>
+          </a:stretch>
+        </p:blipFill>
+        <p:spPr bwMode="auto">
+          <a:xfrm>
+            <a:off x="456170" y="316899"/>
+            <a:ext cx="7239000" cy="3295650"/>
+          </a:xfrm>
+          <a:prstGeom prst="rect">
+            <a:avLst/>
+          </a:prstGeom>
+          <a:noFill/>
+          <a:extLst>
+            <a:ext uri="{909E8E84-426E-40DD-AFC4-6F175D3DCCD1}">
+              <a14:hiddenFill xmlns:a14="http://schemas.microsoft.com/office/drawing/2010/main">
+                <a:solidFill>
+                  <a:srgbClr val="FFFFFF"/>
+                </a:solidFill>
+              </a14:hiddenFill>
+            </a:ext>
+          </a:extLst>
+        </p:spPr>
+      </p:pic>
+    </p:spTree>
+    <p:extLst>
+      <p:ext uri="{BB962C8B-B14F-4D97-AF65-F5344CB8AC3E}">
+        <p14:creationId xmlns:p14="http://schemas.microsoft.com/office/powerpoint/2010/main" val="2013257604"/>
+      </p:ext>
+    </p:extLst>
+  </p:cSld>
+  <p:clrMapOvr>
+    <a:masterClrMapping/>
+  </p:clrMapOvr>
+</p:sld>
+</file>
+
 <file path=ppt/theme/theme1.xml><?xml version="1.0" encoding="utf-8"?>
 <a:theme xmlns:a="http://schemas.openxmlformats.org/drawingml/2006/main" name="Office テーマ">
   <a:themeElements>

</xml_diff>

<commit_message>
Add mouse data cache(but not works in vscode)
</commit_message>
<xml_diff>
--- a/memo.pptx
+++ b/memo.pptx
@@ -4207,6 +4207,53 @@
           </a:p>
         </p:txBody>
       </p:sp>
+      <p:pic>
+        <p:nvPicPr>
+          <p:cNvPr id="18" name="Picture 2" descr="囲碁を打ってみよう！実戦対局が初心者にとって一番の上達法：アプリも紹介！│囲碁くまブログ">
+            <a:extLst>
+              <a:ext uri="{FF2B5EF4-FFF2-40B4-BE49-F238E27FC236}">
+                <a16:creationId xmlns:a16="http://schemas.microsoft.com/office/drawing/2014/main" id="{03AFAD3C-8D8D-35E6-1B86-82A8C144FC0E}"/>
+              </a:ext>
+            </a:extLst>
+          </p:cNvPr>
+          <p:cNvPicPr>
+            <a:picLocks noChangeAspect="1" noChangeArrowheads="1"/>
+          </p:cNvPicPr>
+          <p:nvPr/>
+        </p:nvPicPr>
+        <p:blipFill>
+          <a:blip r:embed="rId4">
+            <a:extLst>
+              <a:ext uri="{28A0092B-C50C-407E-A947-70E740481C1C}">
+                <a14:useLocalDpi xmlns:a14="http://schemas.microsoft.com/office/drawing/2010/main" val="0"/>
+              </a:ext>
+            </a:extLst>
+          </a:blip>
+          <a:srcRect/>
+          <a:stretch>
+            <a:fillRect/>
+          </a:stretch>
+        </p:blipFill>
+        <p:spPr bwMode="auto">
+          <a:xfrm>
+            <a:off x="7201133" y="3404358"/>
+            <a:ext cx="4944335" cy="2250973"/>
+          </a:xfrm>
+          <a:prstGeom prst="rect">
+            <a:avLst/>
+          </a:prstGeom>
+          <a:noFill/>
+          <a:extLst>
+            <a:ext uri="{909E8E84-426E-40DD-AFC4-6F175D3DCCD1}">
+              <a14:hiddenFill xmlns:a14="http://schemas.microsoft.com/office/drawing/2010/main">
+                <a:solidFill>
+                  <a:srgbClr val="FFFFFF"/>
+                </a:solidFill>
+              </a14:hiddenFill>
+            </a:ext>
+          </a:extLst>
+        </p:spPr>
+      </p:pic>
     </p:spTree>
     <p:extLst>
       <p:ext uri="{BB962C8B-B14F-4D97-AF65-F5344CB8AC3E}">
@@ -5186,53 +5233,2047 @@
           <a:chExt cx="0" cy="0"/>
         </a:xfrm>
       </p:grpSpPr>
-      <p:pic>
-        <p:nvPicPr>
-          <p:cNvPr id="2050" name="Picture 2" descr="囲碁を打ってみよう！実戦対局が初心者にとって一番の上達法：アプリも紹介！│囲碁くまブログ">
-            <a:extLst>
-              <a:ext uri="{FF2B5EF4-FFF2-40B4-BE49-F238E27FC236}">
-                <a16:creationId xmlns:a16="http://schemas.microsoft.com/office/drawing/2014/main" id="{BA029D60-8F8D-C53A-3558-3D2C19D534C9}"/>
-              </a:ext>
-            </a:extLst>
-          </p:cNvPr>
-          <p:cNvPicPr>
-            <a:picLocks noChangeAspect="1" noChangeArrowheads="1"/>
-          </p:cNvPicPr>
+      <p:sp>
+        <p:nvSpPr>
+          <p:cNvPr id="4" name="テキスト ボックス 3">
+            <a:extLst>
+              <a:ext uri="{FF2B5EF4-FFF2-40B4-BE49-F238E27FC236}">
+                <a16:creationId xmlns:a16="http://schemas.microsoft.com/office/drawing/2014/main" id="{71E8BE35-B030-609E-420C-093CADFA21FE}"/>
+              </a:ext>
+            </a:extLst>
+          </p:cNvPr>
+          <p:cNvSpPr txBox="1"/>
           <p:nvPr/>
-        </p:nvPicPr>
-        <p:blipFill>
-          <a:blip r:embed="rId2">
-            <a:extLst>
-              <a:ext uri="{28A0092B-C50C-407E-A947-70E740481C1C}">
-                <a14:useLocalDpi xmlns:a14="http://schemas.microsoft.com/office/drawing/2010/main" val="0"/>
-              </a:ext>
-            </a:extLst>
-          </a:blip>
-          <a:srcRect/>
-          <a:stretch>
-            <a:fillRect/>
-          </a:stretch>
-        </p:blipFill>
-        <p:spPr bwMode="auto">
+        </p:nvSpPr>
+        <p:spPr>
           <a:xfrm>
-            <a:off x="456170" y="316899"/>
-            <a:ext cx="7239000" cy="3295650"/>
+            <a:off x="265867" y="245646"/>
+            <a:ext cx="2276106" cy="369332"/>
           </a:xfrm>
           <a:prstGeom prst="rect">
             <a:avLst/>
           </a:prstGeom>
           <a:noFill/>
-          <a:extLst>
-            <a:ext uri="{909E8E84-426E-40DD-AFC4-6F175D3DCCD1}">
-              <a14:hiddenFill xmlns:a14="http://schemas.microsoft.com/office/drawing/2010/main">
+        </p:spPr>
+        <p:txBody>
+          <a:bodyPr wrap="square" rtlCol="0">
+            <a:spAutoFit/>
+          </a:bodyPr>
+          <a:lstStyle/>
+          <a:p>
+            <a:r>
+              <a:rPr kumimoji="1" lang="en-US" altLang="ja-JP" dirty="0"/>
+              <a:t>Buffer1</a:t>
+            </a:r>
+            <a:endParaRPr kumimoji="1" lang="ja-JP" altLang="en-US" dirty="0"/>
+          </a:p>
+        </p:txBody>
+      </p:sp>
+      <p:graphicFrame>
+        <p:nvGraphicFramePr>
+          <p:cNvPr id="5" name="表 5">
+            <a:extLst>
+              <a:ext uri="{FF2B5EF4-FFF2-40B4-BE49-F238E27FC236}">
+                <a16:creationId xmlns:a16="http://schemas.microsoft.com/office/drawing/2014/main" id="{D3559311-70E9-4411-ABD9-F891BFFA8C7D}"/>
+              </a:ext>
+            </a:extLst>
+          </p:cNvPr>
+          <p:cNvGraphicFramePr>
+            <a:graphicFrameLocks noGrp="1"/>
+          </p:cNvGraphicFramePr>
+          <p:nvPr>
+            <p:extLst>
+              <p:ext uri="{D42A27DB-BD31-4B8C-83A1-F6EECF244321}">
+                <p14:modId xmlns:p14="http://schemas.microsoft.com/office/powerpoint/2010/main" val="1833820992"/>
+              </p:ext>
+            </p:extLst>
+          </p:nvPr>
+        </p:nvGraphicFramePr>
+        <p:xfrm>
+          <a:off x="933236" y="1593774"/>
+          <a:ext cx="3791770" cy="2966720"/>
+        </p:xfrm>
+        <a:graphic>
+          <a:graphicData uri="http://schemas.openxmlformats.org/drawingml/2006/table">
+            <a:tbl>
+              <a:tblPr firstRow="1" bandRow="1">
+                <a:tableStyleId>{5940675A-B579-460E-94D1-54222C63F5DA}</a:tableStyleId>
+              </a:tblPr>
+              <a:tblGrid>
+                <a:gridCol w="379177">
+                  <a:extLst>
+                    <a:ext uri="{9D8B030D-6E8A-4147-A177-3AD203B41FA5}">
+                      <a16:colId xmlns:a16="http://schemas.microsoft.com/office/drawing/2014/main" val="1942756904"/>
+                    </a:ext>
+                  </a:extLst>
+                </a:gridCol>
+                <a:gridCol w="379177">
+                  <a:extLst>
+                    <a:ext uri="{9D8B030D-6E8A-4147-A177-3AD203B41FA5}">
+                      <a16:colId xmlns:a16="http://schemas.microsoft.com/office/drawing/2014/main" val="4116636073"/>
+                    </a:ext>
+                  </a:extLst>
+                </a:gridCol>
+                <a:gridCol w="379177">
+                  <a:extLst>
+                    <a:ext uri="{9D8B030D-6E8A-4147-A177-3AD203B41FA5}">
+                      <a16:colId xmlns:a16="http://schemas.microsoft.com/office/drawing/2014/main" val="2451679617"/>
+                    </a:ext>
+                  </a:extLst>
+                </a:gridCol>
+                <a:gridCol w="379177">
+                  <a:extLst>
+                    <a:ext uri="{9D8B030D-6E8A-4147-A177-3AD203B41FA5}">
+                      <a16:colId xmlns:a16="http://schemas.microsoft.com/office/drawing/2014/main" val="2454501736"/>
+                    </a:ext>
+                  </a:extLst>
+                </a:gridCol>
+                <a:gridCol w="379177">
+                  <a:extLst>
+                    <a:ext uri="{9D8B030D-6E8A-4147-A177-3AD203B41FA5}">
+                      <a16:colId xmlns:a16="http://schemas.microsoft.com/office/drawing/2014/main" val="3627646444"/>
+                    </a:ext>
+                  </a:extLst>
+                </a:gridCol>
+                <a:gridCol w="379177">
+                  <a:extLst>
+                    <a:ext uri="{9D8B030D-6E8A-4147-A177-3AD203B41FA5}">
+                      <a16:colId xmlns:a16="http://schemas.microsoft.com/office/drawing/2014/main" val="1187485144"/>
+                    </a:ext>
+                  </a:extLst>
+                </a:gridCol>
+                <a:gridCol w="379177">
+                  <a:extLst>
+                    <a:ext uri="{9D8B030D-6E8A-4147-A177-3AD203B41FA5}">
+                      <a16:colId xmlns:a16="http://schemas.microsoft.com/office/drawing/2014/main" val="4189529641"/>
+                    </a:ext>
+                  </a:extLst>
+                </a:gridCol>
+                <a:gridCol w="379177">
+                  <a:extLst>
+                    <a:ext uri="{9D8B030D-6E8A-4147-A177-3AD203B41FA5}">
+                      <a16:colId xmlns:a16="http://schemas.microsoft.com/office/drawing/2014/main" val="1889683278"/>
+                    </a:ext>
+                  </a:extLst>
+                </a:gridCol>
+                <a:gridCol w="379177">
+                  <a:extLst>
+                    <a:ext uri="{9D8B030D-6E8A-4147-A177-3AD203B41FA5}">
+                      <a16:colId xmlns:a16="http://schemas.microsoft.com/office/drawing/2014/main" val="1006794416"/>
+                    </a:ext>
+                  </a:extLst>
+                </a:gridCol>
+                <a:gridCol w="379177">
+                  <a:extLst>
+                    <a:ext uri="{9D8B030D-6E8A-4147-A177-3AD203B41FA5}">
+                      <a16:colId xmlns:a16="http://schemas.microsoft.com/office/drawing/2014/main" val="1324040989"/>
+                    </a:ext>
+                  </a:extLst>
+                </a:gridCol>
+              </a:tblGrid>
+              <a:tr h="370840">
+                <a:tc>
+                  <a:txBody>
+                    <a:bodyPr/>
+                    <a:lstStyle/>
+                    <a:p>
+                      <a:pPr algn="ctr"/>
+                      <a:endParaRPr kumimoji="1" lang="ja-JP" altLang="en-US" sz="1000" dirty="0"/>
+                    </a:p>
+                  </a:txBody>
+                  <a:tcPr marL="42657" marR="42657" anchor="ctr"/>
+                </a:tc>
+                <a:tc>
+                  <a:txBody>
+                    <a:bodyPr/>
+                    <a:lstStyle/>
+                    <a:p>
+                      <a:pPr algn="ctr"/>
+                      <a:endParaRPr kumimoji="1" lang="ja-JP" altLang="en-US" sz="1000"/>
+                    </a:p>
+                  </a:txBody>
+                  <a:tcPr marL="42657" marR="42657" anchor="ctr"/>
+                </a:tc>
+                <a:tc>
+                  <a:txBody>
+                    <a:bodyPr/>
+                    <a:lstStyle/>
+                    <a:p>
+                      <a:pPr algn="ctr"/>
+                      <a:endParaRPr kumimoji="1" lang="ja-JP" altLang="en-US" sz="1000"/>
+                    </a:p>
+                  </a:txBody>
+                  <a:tcPr marL="42657" marR="42657" anchor="ctr"/>
+                </a:tc>
+                <a:tc>
+                  <a:txBody>
+                    <a:bodyPr/>
+                    <a:lstStyle/>
+                    <a:p>
+                      <a:pPr algn="ctr"/>
+                      <a:endParaRPr kumimoji="1" lang="ja-JP" altLang="en-US" sz="1000"/>
+                    </a:p>
+                  </a:txBody>
+                  <a:tcPr marL="42657" marR="42657" anchor="ctr"/>
+                </a:tc>
+                <a:tc>
+                  <a:txBody>
+                    <a:bodyPr/>
+                    <a:lstStyle/>
+                    <a:p>
+                      <a:pPr algn="ctr"/>
+                      <a:endParaRPr kumimoji="1" lang="ja-JP" altLang="en-US" sz="1000"/>
+                    </a:p>
+                  </a:txBody>
+                  <a:tcPr marL="42657" marR="42657" anchor="ctr"/>
+                </a:tc>
+                <a:tc>
+                  <a:txBody>
+                    <a:bodyPr/>
+                    <a:lstStyle/>
+                    <a:p>
+                      <a:pPr algn="ctr"/>
+                      <a:endParaRPr kumimoji="1" lang="ja-JP" altLang="en-US" sz="1000"/>
+                    </a:p>
+                  </a:txBody>
+                  <a:tcPr marL="42657" marR="42657" anchor="ctr"/>
+                </a:tc>
+                <a:tc>
+                  <a:txBody>
+                    <a:bodyPr/>
+                    <a:lstStyle/>
+                    <a:p>
+                      <a:pPr algn="ctr"/>
+                      <a:endParaRPr kumimoji="1" lang="ja-JP" altLang="en-US" sz="1000"/>
+                    </a:p>
+                  </a:txBody>
+                  <a:tcPr marL="42657" marR="42657" anchor="ctr"/>
+                </a:tc>
+                <a:tc>
+                  <a:txBody>
+                    <a:bodyPr/>
+                    <a:lstStyle/>
+                    <a:p>
+                      <a:pPr algn="ctr"/>
+                      <a:endParaRPr kumimoji="1" lang="ja-JP" altLang="en-US" sz="1000"/>
+                    </a:p>
+                  </a:txBody>
+                  <a:tcPr marL="42657" marR="42657" anchor="ctr"/>
+                </a:tc>
+                <a:tc>
+                  <a:txBody>
+                    <a:bodyPr/>
+                    <a:lstStyle/>
+                    <a:p>
+                      <a:pPr algn="ctr"/>
+                      <a:endParaRPr kumimoji="1" lang="ja-JP" altLang="en-US" sz="1000"/>
+                    </a:p>
+                  </a:txBody>
+                  <a:tcPr marL="42657" marR="42657" anchor="ctr"/>
+                </a:tc>
+                <a:tc>
+                  <a:txBody>
+                    <a:bodyPr/>
+                    <a:lstStyle/>
+                    <a:p>
+                      <a:pPr algn="ctr"/>
+                      <a:endParaRPr kumimoji="1" lang="ja-JP" altLang="en-US" sz="1000"/>
+                    </a:p>
+                  </a:txBody>
+                  <a:tcPr marL="42657" marR="42657" anchor="ctr"/>
+                </a:tc>
+                <a:extLst>
+                  <a:ext uri="{0D108BD9-81ED-4DB2-BD59-A6C34878D82A}">
+                    <a16:rowId xmlns:a16="http://schemas.microsoft.com/office/drawing/2014/main" val="2576575008"/>
+                  </a:ext>
+                </a:extLst>
+              </a:tr>
+              <a:tr h="370840">
+                <a:tc>
+                  <a:txBody>
+                    <a:bodyPr/>
+                    <a:lstStyle/>
+                    <a:p>
+                      <a:pPr algn="ctr"/>
+                      <a:endParaRPr kumimoji="1" lang="ja-JP" altLang="en-US" sz="1000" dirty="0"/>
+                    </a:p>
+                  </a:txBody>
+                  <a:tcPr marL="42657" marR="42657" anchor="ctr"/>
+                </a:tc>
+                <a:tc>
+                  <a:txBody>
+                    <a:bodyPr/>
+                    <a:lstStyle/>
+                    <a:p>
+                      <a:pPr algn="ctr"/>
+                      <a:endParaRPr kumimoji="1" lang="ja-JP" altLang="en-US" sz="1000" dirty="0"/>
+                    </a:p>
+                  </a:txBody>
+                  <a:tcPr marL="42657" marR="42657" anchor="ctr"/>
+                </a:tc>
+                <a:tc>
+                  <a:txBody>
+                    <a:bodyPr/>
+                    <a:lstStyle/>
+                    <a:p>
+                      <a:pPr algn="ctr"/>
+                      <a:endParaRPr kumimoji="1" lang="ja-JP" altLang="en-US" sz="1000"/>
+                    </a:p>
+                  </a:txBody>
+                  <a:tcPr marL="42657" marR="42657" anchor="ctr"/>
+                </a:tc>
+                <a:tc>
+                  <a:txBody>
+                    <a:bodyPr/>
+                    <a:lstStyle/>
+                    <a:p>
+                      <a:pPr algn="ctr"/>
+                      <a:endParaRPr kumimoji="1" lang="ja-JP" altLang="en-US" sz="1000"/>
+                    </a:p>
+                  </a:txBody>
+                  <a:tcPr marL="42657" marR="42657" anchor="ctr"/>
+                </a:tc>
+                <a:tc>
+                  <a:txBody>
+                    <a:bodyPr/>
+                    <a:lstStyle/>
+                    <a:p>
+                      <a:pPr algn="ctr"/>
+                      <a:endParaRPr kumimoji="1" lang="ja-JP" altLang="en-US" sz="1000"/>
+                    </a:p>
+                  </a:txBody>
+                  <a:tcPr marL="42657" marR="42657" anchor="ctr"/>
+                </a:tc>
+                <a:tc>
+                  <a:txBody>
+                    <a:bodyPr/>
+                    <a:lstStyle/>
+                    <a:p>
+                      <a:pPr algn="ctr"/>
+                      <a:endParaRPr kumimoji="1" lang="ja-JP" altLang="en-US" sz="1000"/>
+                    </a:p>
+                  </a:txBody>
+                  <a:tcPr marL="42657" marR="42657" anchor="ctr"/>
+                </a:tc>
+                <a:tc>
+                  <a:txBody>
+                    <a:bodyPr/>
+                    <a:lstStyle/>
+                    <a:p>
+                      <a:pPr algn="ctr"/>
+                      <a:endParaRPr kumimoji="1" lang="ja-JP" altLang="en-US" sz="1000"/>
+                    </a:p>
+                  </a:txBody>
+                  <a:tcPr marL="42657" marR="42657" anchor="ctr"/>
+                </a:tc>
+                <a:tc>
+                  <a:txBody>
+                    <a:bodyPr/>
+                    <a:lstStyle/>
+                    <a:p>
+                      <a:pPr algn="ctr"/>
+                      <a:endParaRPr kumimoji="1" lang="ja-JP" altLang="en-US" sz="1000"/>
+                    </a:p>
+                  </a:txBody>
+                  <a:tcPr marL="42657" marR="42657" anchor="ctr"/>
+                </a:tc>
+                <a:tc>
+                  <a:txBody>
+                    <a:bodyPr/>
+                    <a:lstStyle/>
+                    <a:p>
+                      <a:pPr algn="ctr"/>
+                      <a:endParaRPr kumimoji="1" lang="ja-JP" altLang="en-US" sz="1000"/>
+                    </a:p>
+                  </a:txBody>
+                  <a:tcPr marL="42657" marR="42657" anchor="ctr"/>
+                </a:tc>
+                <a:tc>
+                  <a:txBody>
+                    <a:bodyPr/>
+                    <a:lstStyle/>
+                    <a:p>
+                      <a:pPr algn="ctr"/>
+                      <a:endParaRPr kumimoji="1" lang="ja-JP" altLang="en-US" sz="1000"/>
+                    </a:p>
+                  </a:txBody>
+                  <a:tcPr marL="42657" marR="42657" anchor="ctr"/>
+                </a:tc>
+                <a:extLst>
+                  <a:ext uri="{0D108BD9-81ED-4DB2-BD59-A6C34878D82A}">
+                    <a16:rowId xmlns:a16="http://schemas.microsoft.com/office/drawing/2014/main" val="3435885312"/>
+                  </a:ext>
+                </a:extLst>
+              </a:tr>
+              <a:tr h="370840">
+                <a:tc>
+                  <a:txBody>
+                    <a:bodyPr/>
+                    <a:lstStyle/>
+                    <a:p>
+                      <a:pPr algn="ctr"/>
+                      <a:endParaRPr kumimoji="1" lang="ja-JP" altLang="en-US" sz="1000"/>
+                    </a:p>
+                  </a:txBody>
+                  <a:tcPr marL="42657" marR="42657" anchor="ctr"/>
+                </a:tc>
+                <a:tc>
+                  <a:txBody>
+                    <a:bodyPr/>
+                    <a:lstStyle/>
+                    <a:p>
+                      <a:pPr algn="ctr"/>
+                      <a:endParaRPr kumimoji="1" lang="ja-JP" altLang="en-US" sz="1000"/>
+                    </a:p>
+                  </a:txBody>
+                  <a:tcPr marL="42657" marR="42657" anchor="ctr"/>
+                </a:tc>
+                <a:tc>
+                  <a:txBody>
+                    <a:bodyPr/>
+                    <a:lstStyle/>
+                    <a:p>
+                      <a:pPr algn="ctr"/>
+                      <a:endParaRPr kumimoji="1" lang="ja-JP" altLang="en-US" sz="1000" dirty="0"/>
+                    </a:p>
+                  </a:txBody>
+                  <a:tcPr marL="42657" marR="42657" anchor="ctr"/>
+                </a:tc>
+                <a:tc>
+                  <a:txBody>
+                    <a:bodyPr/>
+                    <a:lstStyle/>
+                    <a:p>
+                      <a:pPr algn="ctr"/>
+                      <a:endParaRPr kumimoji="1" lang="ja-JP" altLang="en-US" sz="1000"/>
+                    </a:p>
+                  </a:txBody>
+                  <a:tcPr marL="42657" marR="42657" anchor="ctr"/>
+                </a:tc>
+                <a:tc>
+                  <a:txBody>
+                    <a:bodyPr/>
+                    <a:lstStyle/>
+                    <a:p>
+                      <a:pPr algn="ctr"/>
+                      <a:endParaRPr kumimoji="1" lang="ja-JP" altLang="en-US" sz="1000"/>
+                    </a:p>
+                  </a:txBody>
+                  <a:tcPr marL="42657" marR="42657" anchor="ctr"/>
+                </a:tc>
+                <a:tc>
+                  <a:txBody>
+                    <a:bodyPr/>
+                    <a:lstStyle/>
+                    <a:p>
+                      <a:pPr algn="ctr"/>
+                      <a:endParaRPr kumimoji="1" lang="ja-JP" altLang="en-US" sz="1000"/>
+                    </a:p>
+                  </a:txBody>
+                  <a:tcPr marL="42657" marR="42657" anchor="ctr"/>
+                </a:tc>
+                <a:tc>
+                  <a:txBody>
+                    <a:bodyPr/>
+                    <a:lstStyle/>
+                    <a:p>
+                      <a:pPr algn="ctr"/>
+                      <a:endParaRPr kumimoji="1" lang="ja-JP" altLang="en-US" sz="1000"/>
+                    </a:p>
+                  </a:txBody>
+                  <a:tcPr marL="42657" marR="42657" anchor="ctr"/>
+                </a:tc>
+                <a:tc>
+                  <a:txBody>
+                    <a:bodyPr/>
+                    <a:lstStyle/>
+                    <a:p>
+                      <a:pPr algn="ctr"/>
+                      <a:endParaRPr kumimoji="1" lang="ja-JP" altLang="en-US" sz="1000"/>
+                    </a:p>
+                  </a:txBody>
+                  <a:tcPr marL="42657" marR="42657" anchor="ctr"/>
+                </a:tc>
+                <a:tc>
+                  <a:txBody>
+                    <a:bodyPr/>
+                    <a:lstStyle/>
+                    <a:p>
+                      <a:pPr algn="ctr"/>
+                      <a:endParaRPr kumimoji="1" lang="ja-JP" altLang="en-US" sz="1000"/>
+                    </a:p>
+                  </a:txBody>
+                  <a:tcPr marL="42657" marR="42657" anchor="ctr"/>
+                </a:tc>
+                <a:tc>
+                  <a:txBody>
+                    <a:bodyPr/>
+                    <a:lstStyle/>
+                    <a:p>
+                      <a:pPr algn="ctr"/>
+                      <a:endParaRPr kumimoji="1" lang="ja-JP" altLang="en-US" sz="1000"/>
+                    </a:p>
+                  </a:txBody>
+                  <a:tcPr marL="42657" marR="42657" anchor="ctr"/>
+                </a:tc>
+                <a:extLst>
+                  <a:ext uri="{0D108BD9-81ED-4DB2-BD59-A6C34878D82A}">
+                    <a16:rowId xmlns:a16="http://schemas.microsoft.com/office/drawing/2014/main" val="2651038122"/>
+                  </a:ext>
+                </a:extLst>
+              </a:tr>
+              <a:tr h="370840">
+                <a:tc>
+                  <a:txBody>
+                    <a:bodyPr/>
+                    <a:lstStyle/>
+                    <a:p>
+                      <a:pPr algn="ctr"/>
+                      <a:endParaRPr kumimoji="1" lang="ja-JP" altLang="en-US" sz="1000"/>
+                    </a:p>
+                  </a:txBody>
+                  <a:tcPr marL="42657" marR="42657" anchor="ctr"/>
+                </a:tc>
+                <a:tc>
+                  <a:txBody>
+                    <a:bodyPr/>
+                    <a:lstStyle/>
+                    <a:p>
+                      <a:pPr algn="ctr"/>
+                      <a:endParaRPr kumimoji="1" lang="ja-JP" altLang="en-US" sz="1000"/>
+                    </a:p>
+                  </a:txBody>
+                  <a:tcPr marL="42657" marR="42657" anchor="ctr"/>
+                </a:tc>
+                <a:tc>
+                  <a:txBody>
+                    <a:bodyPr/>
+                    <a:lstStyle/>
+                    <a:p>
+                      <a:pPr algn="ctr"/>
+                      <a:endParaRPr kumimoji="1" lang="ja-JP" altLang="en-US" sz="1000"/>
+                    </a:p>
+                  </a:txBody>
+                  <a:tcPr marL="42657" marR="42657" anchor="ctr"/>
+                </a:tc>
+                <a:tc>
+                  <a:txBody>
+                    <a:bodyPr/>
+                    <a:lstStyle/>
+                    <a:p>
+                      <a:pPr algn="ctr"/>
+                      <a:endParaRPr kumimoji="1" lang="ja-JP" altLang="en-US" sz="1000" dirty="0"/>
+                    </a:p>
+                  </a:txBody>
+                  <a:tcPr marL="42657" marR="42657" anchor="ctr"/>
+                </a:tc>
+                <a:tc>
+                  <a:txBody>
+                    <a:bodyPr/>
+                    <a:lstStyle/>
+                    <a:p>
+                      <a:pPr algn="ctr"/>
+                      <a:endParaRPr kumimoji="1" lang="ja-JP" altLang="en-US" sz="1000" dirty="0"/>
+                    </a:p>
+                  </a:txBody>
+                  <a:tcPr marL="42657" marR="42657" anchor="ctr"/>
+                </a:tc>
+                <a:tc>
+                  <a:txBody>
+                    <a:bodyPr/>
+                    <a:lstStyle/>
+                    <a:p>
+                      <a:pPr algn="ctr"/>
+                      <a:endParaRPr kumimoji="1" lang="ja-JP" altLang="en-US" sz="1000"/>
+                    </a:p>
+                  </a:txBody>
+                  <a:tcPr marL="42657" marR="42657" anchor="ctr"/>
+                </a:tc>
+                <a:tc>
+                  <a:txBody>
+                    <a:bodyPr/>
+                    <a:lstStyle/>
+                    <a:p>
+                      <a:pPr algn="ctr"/>
+                      <a:endParaRPr kumimoji="1" lang="ja-JP" altLang="en-US" sz="1000"/>
+                    </a:p>
+                  </a:txBody>
+                  <a:tcPr marL="42657" marR="42657" anchor="ctr"/>
+                </a:tc>
+                <a:tc>
+                  <a:txBody>
+                    <a:bodyPr/>
+                    <a:lstStyle/>
+                    <a:p>
+                      <a:pPr algn="ctr"/>
+                      <a:endParaRPr kumimoji="1" lang="ja-JP" altLang="en-US" sz="1000"/>
+                    </a:p>
+                  </a:txBody>
+                  <a:tcPr marL="42657" marR="42657" anchor="ctr"/>
+                </a:tc>
+                <a:tc>
+                  <a:txBody>
+                    <a:bodyPr/>
+                    <a:lstStyle/>
+                    <a:p>
+                      <a:pPr algn="ctr"/>
+                      <a:endParaRPr kumimoji="1" lang="ja-JP" altLang="en-US" sz="1000"/>
+                    </a:p>
+                  </a:txBody>
+                  <a:tcPr marL="42657" marR="42657" anchor="ctr"/>
+                </a:tc>
+                <a:tc>
+                  <a:txBody>
+                    <a:bodyPr/>
+                    <a:lstStyle/>
+                    <a:p>
+                      <a:pPr algn="ctr"/>
+                      <a:endParaRPr kumimoji="1" lang="ja-JP" altLang="en-US" sz="1000"/>
+                    </a:p>
+                  </a:txBody>
+                  <a:tcPr marL="42657" marR="42657" anchor="ctr"/>
+                </a:tc>
+                <a:extLst>
+                  <a:ext uri="{0D108BD9-81ED-4DB2-BD59-A6C34878D82A}">
+                    <a16:rowId xmlns:a16="http://schemas.microsoft.com/office/drawing/2014/main" val="3513956979"/>
+                  </a:ext>
+                </a:extLst>
+              </a:tr>
+              <a:tr h="370840">
+                <a:tc>
+                  <a:txBody>
+                    <a:bodyPr/>
+                    <a:lstStyle/>
+                    <a:p>
+                      <a:pPr algn="ctr"/>
+                      <a:endParaRPr kumimoji="1" lang="ja-JP" altLang="en-US" sz="1000"/>
+                    </a:p>
+                  </a:txBody>
+                  <a:tcPr marL="42657" marR="42657" anchor="ctr"/>
+                </a:tc>
+                <a:tc>
+                  <a:txBody>
+                    <a:bodyPr/>
+                    <a:lstStyle/>
+                    <a:p>
+                      <a:pPr algn="ctr"/>
+                      <a:endParaRPr kumimoji="1" lang="ja-JP" altLang="en-US" sz="1000"/>
+                    </a:p>
+                  </a:txBody>
+                  <a:tcPr marL="42657" marR="42657" anchor="ctr"/>
+                </a:tc>
+                <a:tc>
+                  <a:txBody>
+                    <a:bodyPr/>
+                    <a:lstStyle/>
+                    <a:p>
+                      <a:pPr algn="ctr"/>
+                      <a:endParaRPr kumimoji="1" lang="ja-JP" altLang="en-US" sz="1000"/>
+                    </a:p>
+                  </a:txBody>
+                  <a:tcPr marL="42657" marR="42657" anchor="ctr"/>
+                </a:tc>
+                <a:tc>
+                  <a:txBody>
+                    <a:bodyPr/>
+                    <a:lstStyle/>
+                    <a:p>
+                      <a:pPr algn="ctr"/>
+                      <a:endParaRPr kumimoji="1" lang="ja-JP" altLang="en-US" sz="1000"/>
+                    </a:p>
+                  </a:txBody>
+                  <a:tcPr marL="42657" marR="42657" anchor="ctr"/>
+                </a:tc>
+                <a:tc>
+                  <a:txBody>
+                    <a:bodyPr/>
+                    <a:lstStyle/>
+                    <a:p>
+                      <a:pPr algn="ctr"/>
+                      <a:endParaRPr kumimoji="1" lang="ja-JP" altLang="en-US" sz="1000" dirty="0"/>
+                    </a:p>
+                  </a:txBody>
+                  <a:tcPr marL="42657" marR="42657" anchor="ctr"/>
+                </a:tc>
+                <a:tc>
+                  <a:txBody>
+                    <a:bodyPr/>
+                    <a:lstStyle/>
+                    <a:p>
+                      <a:pPr algn="ctr"/>
+                      <a:endParaRPr kumimoji="1" lang="ja-JP" altLang="en-US" sz="1000" dirty="0"/>
+                    </a:p>
+                  </a:txBody>
+                  <a:tcPr marL="42657" marR="42657" anchor="ctr"/>
+                </a:tc>
+                <a:tc>
+                  <a:txBody>
+                    <a:bodyPr/>
+                    <a:lstStyle/>
+                    <a:p>
+                      <a:pPr algn="ctr"/>
+                      <a:endParaRPr kumimoji="1" lang="ja-JP" altLang="en-US" sz="1000" dirty="0"/>
+                    </a:p>
+                  </a:txBody>
+                  <a:tcPr marL="42657" marR="42657" anchor="ctr"/>
+                </a:tc>
+                <a:tc>
+                  <a:txBody>
+                    <a:bodyPr/>
+                    <a:lstStyle/>
+                    <a:p>
+                      <a:pPr algn="ctr"/>
+                      <a:endParaRPr kumimoji="1" lang="ja-JP" altLang="en-US" sz="1000"/>
+                    </a:p>
+                  </a:txBody>
+                  <a:tcPr marL="42657" marR="42657" anchor="ctr"/>
+                </a:tc>
+                <a:tc>
+                  <a:txBody>
+                    <a:bodyPr/>
+                    <a:lstStyle/>
+                    <a:p>
+                      <a:pPr algn="ctr"/>
+                      <a:endParaRPr kumimoji="1" lang="ja-JP" altLang="en-US" sz="1000"/>
+                    </a:p>
+                  </a:txBody>
+                  <a:tcPr marL="42657" marR="42657" anchor="ctr"/>
+                </a:tc>
+                <a:tc>
+                  <a:txBody>
+                    <a:bodyPr/>
+                    <a:lstStyle/>
+                    <a:p>
+                      <a:pPr algn="ctr"/>
+                      <a:endParaRPr kumimoji="1" lang="ja-JP" altLang="en-US" sz="1000"/>
+                    </a:p>
+                  </a:txBody>
+                  <a:tcPr marL="42657" marR="42657" anchor="ctr"/>
+                </a:tc>
+                <a:extLst>
+                  <a:ext uri="{0D108BD9-81ED-4DB2-BD59-A6C34878D82A}">
+                    <a16:rowId xmlns:a16="http://schemas.microsoft.com/office/drawing/2014/main" val="3403615487"/>
+                  </a:ext>
+                </a:extLst>
+              </a:tr>
+              <a:tr h="370840">
+                <a:tc>
+                  <a:txBody>
+                    <a:bodyPr/>
+                    <a:lstStyle/>
+                    <a:p>
+                      <a:pPr algn="ctr"/>
+                      <a:endParaRPr kumimoji="1" lang="ja-JP" altLang="en-US" sz="1000"/>
+                    </a:p>
+                  </a:txBody>
+                  <a:tcPr marL="42657" marR="42657" anchor="ctr"/>
+                </a:tc>
+                <a:tc>
+                  <a:txBody>
+                    <a:bodyPr/>
+                    <a:lstStyle/>
+                    <a:p>
+                      <a:pPr algn="ctr"/>
+                      <a:endParaRPr kumimoji="1" lang="ja-JP" altLang="en-US" sz="1000"/>
+                    </a:p>
+                  </a:txBody>
+                  <a:tcPr marL="42657" marR="42657" anchor="ctr"/>
+                </a:tc>
+                <a:tc>
+                  <a:txBody>
+                    <a:bodyPr/>
+                    <a:lstStyle/>
+                    <a:p>
+                      <a:pPr algn="ctr"/>
+                      <a:endParaRPr kumimoji="1" lang="ja-JP" altLang="en-US" sz="1000"/>
+                    </a:p>
+                  </a:txBody>
+                  <a:tcPr marL="42657" marR="42657" anchor="ctr"/>
+                </a:tc>
+                <a:tc>
+                  <a:txBody>
+                    <a:bodyPr/>
+                    <a:lstStyle/>
+                    <a:p>
+                      <a:pPr algn="ctr"/>
+                      <a:endParaRPr kumimoji="1" lang="ja-JP" altLang="en-US" sz="1000"/>
+                    </a:p>
+                  </a:txBody>
+                  <a:tcPr marL="42657" marR="42657" anchor="ctr"/>
+                </a:tc>
+                <a:tc>
+                  <a:txBody>
+                    <a:bodyPr/>
+                    <a:lstStyle/>
+                    <a:p>
+                      <a:pPr algn="ctr"/>
+                      <a:endParaRPr kumimoji="1" lang="ja-JP" altLang="en-US" sz="1000"/>
+                    </a:p>
+                  </a:txBody>
+                  <a:tcPr marL="42657" marR="42657" anchor="ctr"/>
+                </a:tc>
+                <a:tc>
+                  <a:txBody>
+                    <a:bodyPr/>
+                    <a:lstStyle/>
+                    <a:p>
+                      <a:pPr algn="ctr"/>
+                      <a:endParaRPr kumimoji="1" lang="ja-JP" altLang="en-US" sz="1000" dirty="0"/>
+                    </a:p>
+                  </a:txBody>
+                  <a:tcPr marL="42657" marR="42657" anchor="ctr"/>
+                </a:tc>
+                <a:tc>
+                  <a:txBody>
+                    <a:bodyPr/>
+                    <a:lstStyle/>
+                    <a:p>
+                      <a:pPr algn="ctr"/>
+                      <a:endParaRPr kumimoji="1" lang="ja-JP" altLang="en-US" sz="1000" dirty="0"/>
+                    </a:p>
+                  </a:txBody>
+                  <a:tcPr marL="42657" marR="42657" anchor="ctr"/>
+                </a:tc>
+                <a:tc>
+                  <a:txBody>
+                    <a:bodyPr/>
+                    <a:lstStyle/>
+                    <a:p>
+                      <a:pPr algn="ctr"/>
+                      <a:endParaRPr kumimoji="1" lang="ja-JP" altLang="en-US" sz="1000" dirty="0"/>
+                    </a:p>
+                  </a:txBody>
+                  <a:tcPr marL="42657" marR="42657" anchor="ctr"/>
+                </a:tc>
+                <a:tc>
+                  <a:txBody>
+                    <a:bodyPr/>
+                    <a:lstStyle/>
+                    <a:p>
+                      <a:pPr algn="ctr"/>
+                      <a:endParaRPr kumimoji="1" lang="ja-JP" altLang="en-US" sz="1000"/>
+                    </a:p>
+                  </a:txBody>
+                  <a:tcPr marL="42657" marR="42657" anchor="ctr"/>
+                </a:tc>
+                <a:tc>
+                  <a:txBody>
+                    <a:bodyPr/>
+                    <a:lstStyle/>
+                    <a:p>
+                      <a:pPr algn="ctr"/>
+                      <a:endParaRPr kumimoji="1" lang="ja-JP" altLang="en-US" sz="1000"/>
+                    </a:p>
+                  </a:txBody>
+                  <a:tcPr marL="42657" marR="42657" anchor="ctr"/>
+                </a:tc>
+                <a:extLst>
+                  <a:ext uri="{0D108BD9-81ED-4DB2-BD59-A6C34878D82A}">
+                    <a16:rowId xmlns:a16="http://schemas.microsoft.com/office/drawing/2014/main" val="228801138"/>
+                  </a:ext>
+                </a:extLst>
+              </a:tr>
+              <a:tr h="370840">
+                <a:tc>
+                  <a:txBody>
+                    <a:bodyPr/>
+                    <a:lstStyle/>
+                    <a:p>
+                      <a:pPr algn="ctr"/>
+                      <a:endParaRPr kumimoji="1" lang="ja-JP" altLang="en-US" sz="1000"/>
+                    </a:p>
+                  </a:txBody>
+                  <a:tcPr marL="42657" marR="42657" anchor="ctr"/>
+                </a:tc>
+                <a:tc>
+                  <a:txBody>
+                    <a:bodyPr/>
+                    <a:lstStyle/>
+                    <a:p>
+                      <a:pPr algn="ctr"/>
+                      <a:endParaRPr kumimoji="1" lang="ja-JP" altLang="en-US" sz="1000"/>
+                    </a:p>
+                  </a:txBody>
+                  <a:tcPr marL="42657" marR="42657" anchor="ctr"/>
+                </a:tc>
+                <a:tc>
+                  <a:txBody>
+                    <a:bodyPr/>
+                    <a:lstStyle/>
+                    <a:p>
+                      <a:pPr algn="ctr"/>
+                      <a:endParaRPr kumimoji="1" lang="ja-JP" altLang="en-US" sz="1000"/>
+                    </a:p>
+                  </a:txBody>
+                  <a:tcPr marL="42657" marR="42657" anchor="ctr"/>
+                </a:tc>
+                <a:tc>
+                  <a:txBody>
+                    <a:bodyPr/>
+                    <a:lstStyle/>
+                    <a:p>
+                      <a:pPr algn="ctr"/>
+                      <a:endParaRPr kumimoji="1" lang="ja-JP" altLang="en-US" sz="1000"/>
+                    </a:p>
+                  </a:txBody>
+                  <a:tcPr marL="42657" marR="42657" anchor="ctr"/>
+                </a:tc>
+                <a:tc>
+                  <a:txBody>
+                    <a:bodyPr/>
+                    <a:lstStyle/>
+                    <a:p>
+                      <a:pPr algn="ctr"/>
+                      <a:endParaRPr kumimoji="1" lang="ja-JP" altLang="en-US" sz="1000"/>
+                    </a:p>
+                  </a:txBody>
+                  <a:tcPr marL="42657" marR="42657" anchor="ctr"/>
+                </a:tc>
+                <a:tc>
+                  <a:txBody>
+                    <a:bodyPr/>
+                    <a:lstStyle/>
+                    <a:p>
+                      <a:pPr algn="ctr"/>
+                      <a:endParaRPr kumimoji="1" lang="ja-JP" altLang="en-US" sz="1000"/>
+                    </a:p>
+                  </a:txBody>
+                  <a:tcPr marL="42657" marR="42657" anchor="ctr"/>
+                </a:tc>
+                <a:tc>
+                  <a:txBody>
+                    <a:bodyPr/>
+                    <a:lstStyle/>
+                    <a:p>
+                      <a:pPr algn="ctr"/>
+                      <a:endParaRPr kumimoji="1" lang="ja-JP" altLang="en-US" sz="1000"/>
+                    </a:p>
+                  </a:txBody>
+                  <a:tcPr marL="42657" marR="42657" anchor="ctr"/>
+                </a:tc>
+                <a:tc>
+                  <a:txBody>
+                    <a:bodyPr/>
+                    <a:lstStyle/>
+                    <a:p>
+                      <a:pPr algn="ctr"/>
+                      <a:endParaRPr kumimoji="1" lang="ja-JP" altLang="en-US" sz="1000" dirty="0"/>
+                    </a:p>
+                  </a:txBody>
+                  <a:tcPr marL="42657" marR="42657" anchor="ctr"/>
+                </a:tc>
+                <a:tc>
+                  <a:txBody>
+                    <a:bodyPr/>
+                    <a:lstStyle/>
+                    <a:p>
+                      <a:pPr algn="ctr"/>
+                      <a:endParaRPr kumimoji="1" lang="ja-JP" altLang="en-US" sz="1000" dirty="0"/>
+                    </a:p>
+                  </a:txBody>
+                  <a:tcPr marL="42657" marR="42657" anchor="ctr"/>
+                </a:tc>
+                <a:tc>
+                  <a:txBody>
+                    <a:bodyPr/>
+                    <a:lstStyle/>
+                    <a:p>
+                      <a:pPr algn="ctr"/>
+                      <a:endParaRPr kumimoji="1" lang="ja-JP" altLang="en-US" sz="1000" dirty="0"/>
+                    </a:p>
+                  </a:txBody>
+                  <a:tcPr marL="42657" marR="42657" anchor="ctr"/>
+                </a:tc>
+                <a:extLst>
+                  <a:ext uri="{0D108BD9-81ED-4DB2-BD59-A6C34878D82A}">
+                    <a16:rowId xmlns:a16="http://schemas.microsoft.com/office/drawing/2014/main" val="594924718"/>
+                  </a:ext>
+                </a:extLst>
+              </a:tr>
+              <a:tr h="370840">
+                <a:tc>
+                  <a:txBody>
+                    <a:bodyPr/>
+                    <a:lstStyle/>
+                    <a:p>
+                      <a:pPr algn="ctr"/>
+                      <a:endParaRPr kumimoji="1" lang="ja-JP" altLang="en-US" sz="1000"/>
+                    </a:p>
+                  </a:txBody>
+                  <a:tcPr marL="42657" marR="42657" anchor="ctr"/>
+                </a:tc>
+                <a:tc>
+                  <a:txBody>
+                    <a:bodyPr/>
+                    <a:lstStyle/>
+                    <a:p>
+                      <a:pPr algn="ctr"/>
+                      <a:endParaRPr kumimoji="1" lang="ja-JP" altLang="en-US" sz="1000"/>
+                    </a:p>
+                  </a:txBody>
+                  <a:tcPr marL="42657" marR="42657" anchor="ctr"/>
+                </a:tc>
+                <a:tc>
+                  <a:txBody>
+                    <a:bodyPr/>
+                    <a:lstStyle/>
+                    <a:p>
+                      <a:pPr algn="ctr"/>
+                      <a:endParaRPr kumimoji="1" lang="ja-JP" altLang="en-US" sz="1000"/>
+                    </a:p>
+                  </a:txBody>
+                  <a:tcPr marL="42657" marR="42657" anchor="ctr"/>
+                </a:tc>
+                <a:tc>
+                  <a:txBody>
+                    <a:bodyPr/>
+                    <a:lstStyle/>
+                    <a:p>
+                      <a:pPr algn="ctr"/>
+                      <a:endParaRPr kumimoji="1" lang="ja-JP" altLang="en-US" sz="1000"/>
+                    </a:p>
+                  </a:txBody>
+                  <a:tcPr marL="42657" marR="42657" anchor="ctr"/>
+                </a:tc>
+                <a:tc>
+                  <a:txBody>
+                    <a:bodyPr/>
+                    <a:lstStyle/>
+                    <a:p>
+                      <a:pPr algn="ctr"/>
+                      <a:endParaRPr kumimoji="1" lang="ja-JP" altLang="en-US" sz="1000"/>
+                    </a:p>
+                  </a:txBody>
+                  <a:tcPr marL="42657" marR="42657" anchor="ctr"/>
+                </a:tc>
+                <a:tc>
+                  <a:txBody>
+                    <a:bodyPr/>
+                    <a:lstStyle/>
+                    <a:p>
+                      <a:pPr algn="ctr"/>
+                      <a:endParaRPr kumimoji="1" lang="ja-JP" altLang="en-US" sz="1000"/>
+                    </a:p>
+                  </a:txBody>
+                  <a:tcPr marL="42657" marR="42657" anchor="ctr"/>
+                </a:tc>
+                <a:tc>
+                  <a:txBody>
+                    <a:bodyPr/>
+                    <a:lstStyle/>
+                    <a:p>
+                      <a:pPr algn="ctr"/>
+                      <a:endParaRPr kumimoji="1" lang="ja-JP" altLang="en-US" sz="1000"/>
+                    </a:p>
+                  </a:txBody>
+                  <a:tcPr marL="42657" marR="42657" anchor="ctr"/>
+                </a:tc>
+                <a:tc>
+                  <a:txBody>
+                    <a:bodyPr/>
+                    <a:lstStyle/>
+                    <a:p>
+                      <a:pPr algn="ctr"/>
+                      <a:endParaRPr kumimoji="1" lang="ja-JP" altLang="en-US" sz="1000"/>
+                    </a:p>
+                  </a:txBody>
+                  <a:tcPr marL="42657" marR="42657" anchor="ctr"/>
+                </a:tc>
+                <a:tc>
+                  <a:txBody>
+                    <a:bodyPr/>
+                    <a:lstStyle/>
+                    <a:p>
+                      <a:pPr algn="ctr"/>
+                      <a:endParaRPr kumimoji="1" lang="ja-JP" altLang="en-US" sz="1000"/>
+                    </a:p>
+                  </a:txBody>
+                  <a:tcPr marL="42657" marR="42657" anchor="ctr"/>
+                </a:tc>
+                <a:tc>
+                  <a:txBody>
+                    <a:bodyPr/>
+                    <a:lstStyle/>
+                    <a:p>
+                      <a:pPr algn="ctr"/>
+                      <a:endParaRPr kumimoji="1" lang="ja-JP" altLang="en-US" sz="1000" dirty="0"/>
+                    </a:p>
+                  </a:txBody>
+                  <a:tcPr marL="42657" marR="42657" anchor="ctr"/>
+                </a:tc>
+                <a:extLst>
+                  <a:ext uri="{0D108BD9-81ED-4DB2-BD59-A6C34878D82A}">
+                    <a16:rowId xmlns:a16="http://schemas.microsoft.com/office/drawing/2014/main" val="4198897053"/>
+                  </a:ext>
+                </a:extLst>
+              </a:tr>
+            </a:tbl>
+          </a:graphicData>
+        </a:graphic>
+      </p:graphicFrame>
+      <p:sp>
+        <p:nvSpPr>
+          <p:cNvPr id="6" name="正方形/長方形 5">
+            <a:extLst>
+              <a:ext uri="{FF2B5EF4-FFF2-40B4-BE49-F238E27FC236}">
+                <a16:creationId xmlns:a16="http://schemas.microsoft.com/office/drawing/2014/main" id="{54C52E34-F982-578E-560B-CF569A9632B3}"/>
+              </a:ext>
+            </a:extLst>
+          </p:cNvPr>
+          <p:cNvSpPr/>
+          <p:nvPr/>
+        </p:nvSpPr>
+        <p:spPr>
+          <a:xfrm>
+            <a:off x="1311428" y="1965084"/>
+            <a:ext cx="5267172" cy="3864216"/>
+          </a:xfrm>
+          <a:prstGeom prst="rect">
+            <a:avLst/>
+          </a:prstGeom>
+          <a:solidFill>
+            <a:srgbClr val="4472C4">
+              <a:alpha val="30196"/>
+            </a:srgbClr>
+          </a:solidFill>
+        </p:spPr>
+        <p:style>
+          <a:lnRef idx="2">
+            <a:schemeClr val="accent1">
+              <a:shade val="50000"/>
+            </a:schemeClr>
+          </a:lnRef>
+          <a:fillRef idx="1">
+            <a:schemeClr val="accent1"/>
+          </a:fillRef>
+          <a:effectRef idx="0">
+            <a:schemeClr val="accent1"/>
+          </a:effectRef>
+          <a:fontRef idx="minor">
+            <a:schemeClr val="lt1"/>
+          </a:fontRef>
+        </p:style>
+        <p:txBody>
+          <a:bodyPr rtlCol="0" anchor="ctr"/>
+          <a:lstStyle/>
+          <a:p>
+            <a:pPr algn="ctr"/>
+            <a:r>
+              <a:rPr lang="ja-JP" altLang="en-US" b="1" dirty="0">
                 <a:solidFill>
-                  <a:srgbClr val="FFFFFF"/>
+                  <a:sysClr val="windowText" lastClr="000000"/>
                 </a:solidFill>
-              </a14:hiddenFill>
-            </a:ext>
-          </a:extLst>
+              </a:rPr>
+              <a:t>盤面の状態</a:t>
+            </a:r>
+            <a:endParaRPr lang="en-US" altLang="ja-JP" b="1" dirty="0">
+              <a:solidFill>
+                <a:sysClr val="windowText" lastClr="000000"/>
+              </a:solidFill>
+            </a:endParaRPr>
+          </a:p>
+          <a:p>
+            <a:pPr algn="ctr"/>
+            <a:r>
+              <a:rPr lang="en-US" altLang="ja-JP" b="1" dirty="0">
+                <a:solidFill>
+                  <a:sysClr val="windowText" lastClr="000000"/>
+                </a:solidFill>
+              </a:rPr>
+              <a:t>W</a:t>
+            </a:r>
+            <a:r>
+              <a:rPr kumimoji="1" lang="en-US" altLang="ja-JP" b="1" dirty="0">
+                <a:solidFill>
+                  <a:sysClr val="windowText" lastClr="000000"/>
+                </a:solidFill>
+              </a:rPr>
+              <a:t>=0</a:t>
+            </a:r>
+            <a:r>
+              <a:rPr kumimoji="1" lang="ja-JP" altLang="en-US" b="1" dirty="0">
+                <a:solidFill>
+                  <a:sysClr val="windowText" lastClr="000000"/>
+                </a:solidFill>
+              </a:rPr>
+              <a:t>なら</a:t>
+            </a:r>
+            <a:r>
+              <a:rPr kumimoji="1" lang="en-US" altLang="ja-JP" b="1" dirty="0">
+                <a:solidFill>
+                  <a:sysClr val="windowText" lastClr="000000"/>
+                </a:solidFill>
+              </a:rPr>
+              <a:t>SPACE</a:t>
+            </a:r>
+          </a:p>
+          <a:p>
+            <a:pPr algn="ctr"/>
+            <a:r>
+              <a:rPr lang="en-US" altLang="ja-JP" b="1" dirty="0">
+                <a:solidFill>
+                  <a:sysClr val="windowText" lastClr="000000"/>
+                </a:solidFill>
+              </a:rPr>
+              <a:t>W=1</a:t>
+            </a:r>
+            <a:r>
+              <a:rPr lang="ja-JP" altLang="en-US" b="1" dirty="0">
+                <a:solidFill>
+                  <a:sysClr val="windowText" lastClr="000000"/>
+                </a:solidFill>
+              </a:rPr>
+              <a:t>なら</a:t>
+            </a:r>
+            <a:r>
+              <a:rPr lang="en-US" altLang="ja-JP" b="1" dirty="0">
+                <a:solidFill>
+                  <a:sysClr val="windowText" lastClr="000000"/>
+                </a:solidFill>
+              </a:rPr>
+              <a:t>BLACK</a:t>
+            </a:r>
+          </a:p>
+          <a:p>
+            <a:pPr algn="ctr"/>
+            <a:r>
+              <a:rPr lang="en-US" altLang="ja-JP" b="1" dirty="0">
+                <a:solidFill>
+                  <a:sysClr val="windowText" lastClr="000000"/>
+                </a:solidFill>
+              </a:rPr>
+              <a:t>W</a:t>
+            </a:r>
+            <a:r>
+              <a:rPr kumimoji="1" lang="en-US" altLang="ja-JP" b="1" dirty="0">
+                <a:solidFill>
+                  <a:sysClr val="windowText" lastClr="000000"/>
+                </a:solidFill>
+              </a:rPr>
+              <a:t>=2</a:t>
+            </a:r>
+            <a:r>
+              <a:rPr kumimoji="1" lang="ja-JP" altLang="en-US" b="1" dirty="0">
+                <a:solidFill>
+                  <a:sysClr val="windowText" lastClr="000000"/>
+                </a:solidFill>
+              </a:rPr>
+              <a:t>なら</a:t>
+            </a:r>
+            <a:r>
+              <a:rPr kumimoji="1" lang="en-US" altLang="ja-JP" b="1" dirty="0">
+                <a:solidFill>
+                  <a:sysClr val="windowText" lastClr="000000"/>
+                </a:solidFill>
+              </a:rPr>
+              <a:t>WHITE</a:t>
+            </a:r>
+            <a:endParaRPr kumimoji="1" lang="ja-JP" altLang="en-US" b="1" dirty="0">
+              <a:solidFill>
+                <a:sysClr val="windowText" lastClr="000000"/>
+              </a:solidFill>
+            </a:endParaRPr>
+          </a:p>
+        </p:txBody>
+      </p:sp>
+      <p:sp>
+        <p:nvSpPr>
+          <p:cNvPr id="8" name="正方形/長方形 7">
+            <a:extLst>
+              <a:ext uri="{FF2B5EF4-FFF2-40B4-BE49-F238E27FC236}">
+                <a16:creationId xmlns:a16="http://schemas.microsoft.com/office/drawing/2014/main" id="{1814B2F7-B1B9-D1C2-4874-9EDDE9228B0E}"/>
+              </a:ext>
+            </a:extLst>
+          </p:cNvPr>
+          <p:cNvSpPr/>
+          <p:nvPr/>
+        </p:nvSpPr>
+        <p:spPr>
+          <a:xfrm>
+            <a:off x="1302928" y="1553189"/>
+            <a:ext cx="5275672" cy="411895"/>
+          </a:xfrm>
+          <a:prstGeom prst="rect">
+            <a:avLst/>
+          </a:prstGeom>
+          <a:solidFill>
+            <a:schemeClr val="accent4">
+              <a:alpha val="30196"/>
+            </a:schemeClr>
+          </a:solidFill>
         </p:spPr>
-      </p:pic>
+        <p:style>
+          <a:lnRef idx="2">
+            <a:schemeClr val="accent1">
+              <a:shade val="50000"/>
+            </a:schemeClr>
+          </a:lnRef>
+          <a:fillRef idx="1">
+            <a:schemeClr val="accent1"/>
+          </a:fillRef>
+          <a:effectRef idx="0">
+            <a:schemeClr val="accent1"/>
+          </a:effectRef>
+          <a:fontRef idx="minor">
+            <a:schemeClr val="lt1"/>
+          </a:fontRef>
+        </p:style>
+        <p:txBody>
+          <a:bodyPr rtlCol="0" anchor="ctr"/>
+          <a:lstStyle/>
+          <a:p>
+            <a:pPr algn="ctr"/>
+            <a:r>
+              <a:rPr kumimoji="1" lang="ja-JP" altLang="en-US" b="1" dirty="0">
+                <a:solidFill>
+                  <a:sysClr val="windowText" lastClr="000000"/>
+                </a:solidFill>
+              </a:rPr>
+              <a:t>盤外（</a:t>
+            </a:r>
+            <a:r>
+              <a:rPr lang="en-US" altLang="ja-JP" b="1" dirty="0">
+                <a:solidFill>
+                  <a:sysClr val="windowText" lastClr="000000"/>
+                </a:solidFill>
+              </a:rPr>
+              <a:t>W</a:t>
+            </a:r>
+            <a:r>
+              <a:rPr kumimoji="1" lang="en-US" altLang="ja-JP" b="1" dirty="0">
+                <a:solidFill>
+                  <a:sysClr val="windowText" lastClr="000000"/>
+                </a:solidFill>
+              </a:rPr>
+              <a:t>=3</a:t>
+            </a:r>
+            <a:r>
+              <a:rPr kumimoji="1" lang="ja-JP" altLang="en-US" b="1" dirty="0">
+                <a:solidFill>
+                  <a:sysClr val="windowText" lastClr="000000"/>
+                </a:solidFill>
+              </a:rPr>
+              <a:t>）</a:t>
+            </a:r>
+          </a:p>
+        </p:txBody>
+      </p:sp>
+      <p:sp>
+        <p:nvSpPr>
+          <p:cNvPr id="9" name="正方形/長方形 8">
+            <a:extLst>
+              <a:ext uri="{FF2B5EF4-FFF2-40B4-BE49-F238E27FC236}">
+                <a16:creationId xmlns:a16="http://schemas.microsoft.com/office/drawing/2014/main" id="{BE9F4BDC-658D-E182-581E-1C374FEECBBC}"/>
+              </a:ext>
+            </a:extLst>
+          </p:cNvPr>
+          <p:cNvSpPr/>
+          <p:nvPr/>
+        </p:nvSpPr>
+        <p:spPr>
+          <a:xfrm>
+            <a:off x="933237" y="1965084"/>
+            <a:ext cx="378192" cy="3864216"/>
+          </a:xfrm>
+          <a:prstGeom prst="rect">
+            <a:avLst/>
+          </a:prstGeom>
+          <a:solidFill>
+            <a:schemeClr val="accent4">
+              <a:alpha val="30196"/>
+            </a:schemeClr>
+          </a:solidFill>
+        </p:spPr>
+        <p:style>
+          <a:lnRef idx="2">
+            <a:schemeClr val="accent1">
+              <a:shade val="50000"/>
+            </a:schemeClr>
+          </a:lnRef>
+          <a:fillRef idx="1">
+            <a:schemeClr val="accent1"/>
+          </a:fillRef>
+          <a:effectRef idx="0">
+            <a:schemeClr val="accent1"/>
+          </a:effectRef>
+          <a:fontRef idx="minor">
+            <a:schemeClr val="lt1"/>
+          </a:fontRef>
+        </p:style>
+        <p:txBody>
+          <a:bodyPr rtlCol="0" anchor="ctr"/>
+          <a:lstStyle/>
+          <a:p>
+            <a:pPr algn="ctr"/>
+            <a:r>
+              <a:rPr kumimoji="1" lang="ja-JP" altLang="en-US" b="1" dirty="0">
+                <a:solidFill>
+                  <a:sysClr val="windowText" lastClr="000000"/>
+                </a:solidFill>
+              </a:rPr>
+              <a:t>盤外</a:t>
+            </a:r>
+          </a:p>
+        </p:txBody>
+      </p:sp>
+      <p:sp>
+        <p:nvSpPr>
+          <p:cNvPr id="10" name="正方形/長方形 9">
+            <a:extLst>
+              <a:ext uri="{FF2B5EF4-FFF2-40B4-BE49-F238E27FC236}">
+                <a16:creationId xmlns:a16="http://schemas.microsoft.com/office/drawing/2014/main" id="{54E3ABEB-148E-B9E3-9155-4E6F665059E9}"/>
+              </a:ext>
+            </a:extLst>
+          </p:cNvPr>
+          <p:cNvSpPr/>
+          <p:nvPr/>
+        </p:nvSpPr>
+        <p:spPr>
+          <a:xfrm>
+            <a:off x="921928" y="1540489"/>
+            <a:ext cx="378192" cy="411895"/>
+          </a:xfrm>
+          <a:prstGeom prst="rect">
+            <a:avLst/>
+          </a:prstGeom>
+          <a:solidFill>
+            <a:schemeClr val="accent6">
+              <a:alpha val="30196"/>
+            </a:schemeClr>
+          </a:solidFill>
+        </p:spPr>
+        <p:style>
+          <a:lnRef idx="2">
+            <a:schemeClr val="accent1">
+              <a:shade val="50000"/>
+            </a:schemeClr>
+          </a:lnRef>
+          <a:fillRef idx="1">
+            <a:schemeClr val="accent1"/>
+          </a:fillRef>
+          <a:effectRef idx="0">
+            <a:schemeClr val="accent1"/>
+          </a:effectRef>
+          <a:fontRef idx="minor">
+            <a:schemeClr val="lt1"/>
+          </a:fontRef>
+        </p:style>
+        <p:txBody>
+          <a:bodyPr rtlCol="0" anchor="ctr"/>
+          <a:lstStyle/>
+          <a:p>
+            <a:pPr algn="ctr"/>
+            <a:endParaRPr kumimoji="1" lang="ja-JP" altLang="en-US" b="1" dirty="0">
+              <a:solidFill>
+                <a:sysClr val="windowText" lastClr="000000"/>
+              </a:solidFill>
+            </a:endParaRPr>
+          </a:p>
+        </p:txBody>
+      </p:sp>
+      <p:sp>
+        <p:nvSpPr>
+          <p:cNvPr id="11" name="テキスト ボックス 10">
+            <a:extLst>
+              <a:ext uri="{FF2B5EF4-FFF2-40B4-BE49-F238E27FC236}">
+                <a16:creationId xmlns:a16="http://schemas.microsoft.com/office/drawing/2014/main" id="{C56200E6-91DE-08F1-010B-E0228298420E}"/>
+              </a:ext>
+            </a:extLst>
+          </p:cNvPr>
+          <p:cNvSpPr txBox="1"/>
+          <p:nvPr/>
+        </p:nvSpPr>
+        <p:spPr>
+          <a:xfrm>
+            <a:off x="517581" y="620084"/>
+            <a:ext cx="6902664" cy="830997"/>
+          </a:xfrm>
+          <a:prstGeom prst="rect">
+            <a:avLst/>
+          </a:prstGeom>
+          <a:noFill/>
+        </p:spPr>
+        <p:txBody>
+          <a:bodyPr wrap="square" rtlCol="0">
+            <a:spAutoFit/>
+          </a:bodyPr>
+          <a:lstStyle/>
+          <a:p>
+            <a:r>
+              <a:rPr kumimoji="1" lang="ja-JP" altLang="en-US" sz="1600" b="1" dirty="0"/>
+              <a:t>今の状態を保持</a:t>
+            </a:r>
+            <a:endParaRPr kumimoji="1" lang="en-US" altLang="ja-JP" sz="1600" b="1" dirty="0"/>
+          </a:p>
+          <a:p>
+            <a:r>
+              <a:rPr kumimoji="1" lang="en-US" altLang="ja-JP" sz="1600" b="1" dirty="0"/>
+              <a:t>X=</a:t>
+            </a:r>
+            <a:r>
+              <a:rPr kumimoji="1" lang="ja-JP" altLang="en-US" sz="1600" b="1" dirty="0"/>
+              <a:t>選択中の</a:t>
+            </a:r>
+            <a:r>
+              <a:rPr kumimoji="1" lang="en-US" altLang="ja-JP" sz="1600" b="1" dirty="0"/>
+              <a:t>X</a:t>
+            </a:r>
+            <a:r>
+              <a:rPr kumimoji="1" lang="ja-JP" altLang="en-US" sz="1600" b="1" dirty="0"/>
+              <a:t>軸，</a:t>
+            </a:r>
+            <a:r>
+              <a:rPr kumimoji="1" lang="en-US" altLang="ja-JP" sz="1600" b="1" dirty="0"/>
+              <a:t>Y=</a:t>
+            </a:r>
+            <a:r>
+              <a:rPr kumimoji="1" lang="ja-JP" altLang="en-US" sz="1600" b="1" dirty="0"/>
+              <a:t>選択中の</a:t>
+            </a:r>
+            <a:r>
+              <a:rPr kumimoji="1" lang="en-US" altLang="ja-JP" sz="1600" b="1" dirty="0"/>
+              <a:t>Y</a:t>
+            </a:r>
+            <a:r>
+              <a:rPr kumimoji="1" lang="ja-JP" altLang="en-US" sz="1600" b="1" dirty="0"/>
+              <a:t>軸，</a:t>
+            </a:r>
+            <a:r>
+              <a:rPr kumimoji="1" lang="en-US" altLang="ja-JP" sz="1600" b="1" dirty="0"/>
+              <a:t>Z=</a:t>
+            </a:r>
+            <a:r>
+              <a:rPr kumimoji="1" lang="en-US" altLang="ja-JP" sz="1600" b="1" dirty="0" err="1"/>
+              <a:t>PrevMouse</a:t>
+            </a:r>
+            <a:r>
+              <a:rPr kumimoji="1" lang="ja-JP" altLang="en-US" sz="1600" b="1" dirty="0"/>
+              <a:t>（</a:t>
+            </a:r>
+            <a:r>
+              <a:rPr kumimoji="1" lang="en-US" altLang="ja-JP" sz="1600" b="1" dirty="0"/>
+              <a:t>1</a:t>
+            </a:r>
+            <a:r>
+              <a:rPr kumimoji="1" lang="ja-JP" altLang="en-US" sz="1600" b="1" dirty="0"/>
+              <a:t>なら</a:t>
+            </a:r>
+            <a:r>
+              <a:rPr kumimoji="1" lang="en-US" altLang="ja-JP" sz="1600" b="1" dirty="0"/>
+              <a:t>Pressed</a:t>
+            </a:r>
+            <a:r>
+              <a:rPr kumimoji="1" lang="ja-JP" altLang="en-US" sz="1600" b="1" dirty="0"/>
+              <a:t>）</a:t>
+            </a:r>
+            <a:endParaRPr kumimoji="1" lang="en-US" altLang="ja-JP" sz="1600" b="1" dirty="0"/>
+          </a:p>
+          <a:p>
+            <a:r>
+              <a:rPr lang="en-US" altLang="ja-JP" sz="1600" b="1" dirty="0"/>
+              <a:t>W</a:t>
+            </a:r>
+            <a:r>
+              <a:rPr kumimoji="1" lang="en-US" altLang="ja-JP" sz="1600" b="1" dirty="0"/>
+              <a:t>=BLACK or WHITE</a:t>
+            </a:r>
+          </a:p>
+        </p:txBody>
+      </p:sp>
+      <p:sp>
+        <p:nvSpPr>
+          <p:cNvPr id="15" name="テキスト ボックス 14">
+            <a:extLst>
+              <a:ext uri="{FF2B5EF4-FFF2-40B4-BE49-F238E27FC236}">
+                <a16:creationId xmlns:a16="http://schemas.microsoft.com/office/drawing/2014/main" id="{C3D85D0E-A553-5550-BBF0-69BE87826513}"/>
+              </a:ext>
+            </a:extLst>
+          </p:cNvPr>
+          <p:cNvSpPr txBox="1"/>
+          <p:nvPr/>
+        </p:nvSpPr>
+        <p:spPr>
+          <a:xfrm>
+            <a:off x="7476293" y="556150"/>
+            <a:ext cx="4580015" cy="861774"/>
+          </a:xfrm>
+          <a:prstGeom prst="rect">
+            <a:avLst/>
+          </a:prstGeom>
+          <a:noFill/>
+        </p:spPr>
+        <p:txBody>
+          <a:bodyPr wrap="square">
+            <a:spAutoFit/>
+          </a:bodyPr>
+          <a:lstStyle/>
+          <a:p>
+            <a:r>
+              <a:rPr lang="en-US" altLang="ja-JP" sz="1600" dirty="0"/>
+              <a:t>ivec2(</a:t>
+            </a:r>
+            <a:r>
+              <a:rPr lang="en-US" altLang="ja-JP" sz="1600" dirty="0" err="1"/>
+              <a:t>fragCoord.xy</a:t>
+            </a:r>
+            <a:r>
+              <a:rPr lang="en-US" altLang="ja-JP" sz="1600" dirty="0"/>
+              <a:t>) == ivec2(0, 0)</a:t>
+            </a:r>
+          </a:p>
+          <a:p>
+            <a:r>
+              <a:rPr lang="ja-JP" altLang="en-US" sz="1600" dirty="0"/>
+              <a:t>で位置を判定して処理を分けることで，</a:t>
+            </a:r>
+            <a:endParaRPr lang="en-US" altLang="ja-JP" sz="1600" dirty="0"/>
+          </a:p>
+          <a:p>
+            <a:r>
+              <a:rPr lang="en-US" altLang="ja-JP" sz="1600" dirty="0" err="1"/>
+              <a:t>texelFetch</a:t>
+            </a:r>
+            <a:r>
+              <a:rPr lang="ja-JP" altLang="en-US" sz="1600" dirty="0"/>
+              <a:t>する座標に対する書き込みができる</a:t>
+            </a:r>
+          </a:p>
+        </p:txBody>
+      </p:sp>
+      <p:sp>
+        <p:nvSpPr>
+          <p:cNvPr id="16" name="正方形/長方形 15">
+            <a:extLst>
+              <a:ext uri="{FF2B5EF4-FFF2-40B4-BE49-F238E27FC236}">
+                <a16:creationId xmlns:a16="http://schemas.microsoft.com/office/drawing/2014/main" id="{84CFB5DF-51F2-BE06-8FF4-BF8E5A528A78}"/>
+              </a:ext>
+            </a:extLst>
+          </p:cNvPr>
+          <p:cNvSpPr/>
+          <p:nvPr/>
+        </p:nvSpPr>
+        <p:spPr>
+          <a:xfrm>
+            <a:off x="1300120" y="5829300"/>
+            <a:ext cx="5275672" cy="411895"/>
+          </a:xfrm>
+          <a:prstGeom prst="rect">
+            <a:avLst/>
+          </a:prstGeom>
+          <a:solidFill>
+            <a:schemeClr val="accent4">
+              <a:alpha val="30196"/>
+            </a:schemeClr>
+          </a:solidFill>
+        </p:spPr>
+        <p:style>
+          <a:lnRef idx="2">
+            <a:schemeClr val="accent1">
+              <a:shade val="50000"/>
+            </a:schemeClr>
+          </a:lnRef>
+          <a:fillRef idx="1">
+            <a:schemeClr val="accent1"/>
+          </a:fillRef>
+          <a:effectRef idx="0">
+            <a:schemeClr val="accent1"/>
+          </a:effectRef>
+          <a:fontRef idx="minor">
+            <a:schemeClr val="lt1"/>
+          </a:fontRef>
+        </p:style>
+        <p:txBody>
+          <a:bodyPr rtlCol="0" anchor="ctr"/>
+          <a:lstStyle/>
+          <a:p>
+            <a:pPr algn="ctr"/>
+            <a:r>
+              <a:rPr kumimoji="1" lang="ja-JP" altLang="en-US" b="1" dirty="0">
+                <a:solidFill>
+                  <a:sysClr val="windowText" lastClr="000000"/>
+                </a:solidFill>
+              </a:rPr>
+              <a:t>盤外（</a:t>
+            </a:r>
+            <a:r>
+              <a:rPr lang="en-US" altLang="ja-JP" b="1" dirty="0">
+                <a:solidFill>
+                  <a:sysClr val="windowText" lastClr="000000"/>
+                </a:solidFill>
+              </a:rPr>
+              <a:t>W</a:t>
+            </a:r>
+            <a:r>
+              <a:rPr kumimoji="1" lang="en-US" altLang="ja-JP" b="1" dirty="0">
+                <a:solidFill>
+                  <a:sysClr val="windowText" lastClr="000000"/>
+                </a:solidFill>
+              </a:rPr>
+              <a:t>=3</a:t>
+            </a:r>
+            <a:r>
+              <a:rPr kumimoji="1" lang="ja-JP" altLang="en-US" b="1" dirty="0">
+                <a:solidFill>
+                  <a:sysClr val="windowText" lastClr="000000"/>
+                </a:solidFill>
+              </a:rPr>
+              <a:t>）</a:t>
+            </a:r>
+          </a:p>
+        </p:txBody>
+      </p:sp>
+      <p:sp>
+        <p:nvSpPr>
+          <p:cNvPr id="17" name="正方形/長方形 16">
+            <a:extLst>
+              <a:ext uri="{FF2B5EF4-FFF2-40B4-BE49-F238E27FC236}">
+                <a16:creationId xmlns:a16="http://schemas.microsoft.com/office/drawing/2014/main" id="{AFE3FE36-4805-E305-9241-7759964F941C}"/>
+              </a:ext>
+            </a:extLst>
+          </p:cNvPr>
+          <p:cNvSpPr/>
+          <p:nvPr/>
+        </p:nvSpPr>
+        <p:spPr>
+          <a:xfrm>
+            <a:off x="6629895" y="1965084"/>
+            <a:ext cx="378192" cy="3864216"/>
+          </a:xfrm>
+          <a:prstGeom prst="rect">
+            <a:avLst/>
+          </a:prstGeom>
+          <a:solidFill>
+            <a:schemeClr val="accent4">
+              <a:alpha val="30196"/>
+            </a:schemeClr>
+          </a:solidFill>
+        </p:spPr>
+        <p:style>
+          <a:lnRef idx="2">
+            <a:schemeClr val="accent1">
+              <a:shade val="50000"/>
+            </a:schemeClr>
+          </a:lnRef>
+          <a:fillRef idx="1">
+            <a:schemeClr val="accent1"/>
+          </a:fillRef>
+          <a:effectRef idx="0">
+            <a:schemeClr val="accent1"/>
+          </a:effectRef>
+          <a:fontRef idx="minor">
+            <a:schemeClr val="lt1"/>
+          </a:fontRef>
+        </p:style>
+        <p:txBody>
+          <a:bodyPr rtlCol="0" anchor="ctr"/>
+          <a:lstStyle/>
+          <a:p>
+            <a:pPr algn="ctr"/>
+            <a:r>
+              <a:rPr kumimoji="1" lang="ja-JP" altLang="en-US" b="1" dirty="0">
+                <a:solidFill>
+                  <a:sysClr val="windowText" lastClr="000000"/>
+                </a:solidFill>
+              </a:rPr>
+              <a:t>盤外</a:t>
+            </a:r>
+          </a:p>
+        </p:txBody>
+      </p:sp>
+      <p:cxnSp>
+        <p:nvCxnSpPr>
+          <p:cNvPr id="18" name="直線コネクタ 17">
+            <a:extLst>
+              <a:ext uri="{FF2B5EF4-FFF2-40B4-BE49-F238E27FC236}">
+                <a16:creationId xmlns:a16="http://schemas.microsoft.com/office/drawing/2014/main" id="{78FF22C9-13BA-5360-26D4-2C419BE6455B}"/>
+              </a:ext>
+            </a:extLst>
+          </p:cNvPr>
+          <p:cNvCxnSpPr>
+            <a:cxnSpLocks/>
+          </p:cNvCxnSpPr>
+          <p:nvPr/>
+        </p:nvCxnSpPr>
+        <p:spPr>
+          <a:xfrm flipV="1">
+            <a:off x="1111024" y="1363374"/>
+            <a:ext cx="11309" cy="316815"/>
+          </a:xfrm>
+          <a:prstGeom prst="line">
+            <a:avLst/>
+          </a:prstGeom>
+          <a:ln w="19050">
+            <a:solidFill>
+              <a:schemeClr val="accent6"/>
+            </a:solidFill>
+          </a:ln>
+        </p:spPr>
+        <p:style>
+          <a:lnRef idx="1">
+            <a:schemeClr val="accent1"/>
+          </a:lnRef>
+          <a:fillRef idx="0">
+            <a:schemeClr val="accent1"/>
+          </a:fillRef>
+          <a:effectRef idx="0">
+            <a:schemeClr val="accent1"/>
+          </a:effectRef>
+          <a:fontRef idx="minor">
+            <a:schemeClr val="tx1"/>
+          </a:fontRef>
+        </p:style>
+      </p:cxnSp>
+      <p:sp>
+        <p:nvSpPr>
+          <p:cNvPr id="20" name="テキスト ボックス 19">
+            <a:extLst>
+              <a:ext uri="{FF2B5EF4-FFF2-40B4-BE49-F238E27FC236}">
+                <a16:creationId xmlns:a16="http://schemas.microsoft.com/office/drawing/2014/main" id="{1604D97E-3052-5866-ECD3-EA9F467FEFC0}"/>
+              </a:ext>
+            </a:extLst>
+          </p:cNvPr>
+          <p:cNvSpPr txBox="1"/>
+          <p:nvPr/>
+        </p:nvSpPr>
+        <p:spPr>
+          <a:xfrm>
+            <a:off x="176967" y="1566446"/>
+            <a:ext cx="753461" cy="369332"/>
+          </a:xfrm>
+          <a:prstGeom prst="rect">
+            <a:avLst/>
+          </a:prstGeom>
+          <a:noFill/>
+        </p:spPr>
+        <p:txBody>
+          <a:bodyPr wrap="square" rtlCol="0">
+            <a:spAutoFit/>
+          </a:bodyPr>
+          <a:lstStyle/>
+          <a:p>
+            <a:r>
+              <a:rPr kumimoji="1" lang="en-US" altLang="ja-JP" dirty="0"/>
+              <a:t>Y=0</a:t>
+            </a:r>
+            <a:endParaRPr kumimoji="1" lang="ja-JP" altLang="en-US" dirty="0"/>
+          </a:p>
+        </p:txBody>
+      </p:sp>
+      <p:sp>
+        <p:nvSpPr>
+          <p:cNvPr id="21" name="テキスト ボックス 20">
+            <a:extLst>
+              <a:ext uri="{FF2B5EF4-FFF2-40B4-BE49-F238E27FC236}">
+                <a16:creationId xmlns:a16="http://schemas.microsoft.com/office/drawing/2014/main" id="{E56C6106-C6DC-7D42-C9E5-379C312CAB65}"/>
+              </a:ext>
+            </a:extLst>
+          </p:cNvPr>
+          <p:cNvSpPr txBox="1"/>
+          <p:nvPr/>
+        </p:nvSpPr>
+        <p:spPr>
+          <a:xfrm>
+            <a:off x="202367" y="1922046"/>
+            <a:ext cx="753461" cy="369332"/>
+          </a:xfrm>
+          <a:prstGeom prst="rect">
+            <a:avLst/>
+          </a:prstGeom>
+          <a:noFill/>
+        </p:spPr>
+        <p:txBody>
+          <a:bodyPr wrap="square" rtlCol="0">
+            <a:spAutoFit/>
+          </a:bodyPr>
+          <a:lstStyle/>
+          <a:p>
+            <a:r>
+              <a:rPr kumimoji="1" lang="en-US" altLang="ja-JP" dirty="0"/>
+              <a:t>Y=1</a:t>
+            </a:r>
+            <a:endParaRPr kumimoji="1" lang="ja-JP" altLang="en-US" dirty="0"/>
+          </a:p>
+        </p:txBody>
+      </p:sp>
+      <p:sp>
+        <p:nvSpPr>
+          <p:cNvPr id="22" name="テキスト ボックス 21">
+            <a:extLst>
+              <a:ext uri="{FF2B5EF4-FFF2-40B4-BE49-F238E27FC236}">
+                <a16:creationId xmlns:a16="http://schemas.microsoft.com/office/drawing/2014/main" id="{7A008209-E9D6-2DC0-2A09-E15DAB3BC93C}"/>
+              </a:ext>
+            </a:extLst>
+          </p:cNvPr>
+          <p:cNvSpPr txBox="1"/>
+          <p:nvPr/>
+        </p:nvSpPr>
+        <p:spPr>
+          <a:xfrm>
+            <a:off x="227767" y="5875981"/>
+            <a:ext cx="753461" cy="369332"/>
+          </a:xfrm>
+          <a:prstGeom prst="rect">
+            <a:avLst/>
+          </a:prstGeom>
+          <a:noFill/>
+        </p:spPr>
+        <p:txBody>
+          <a:bodyPr wrap="square" rtlCol="0">
+            <a:spAutoFit/>
+          </a:bodyPr>
+          <a:lstStyle/>
+          <a:p>
+            <a:r>
+              <a:rPr kumimoji="1" lang="en-US" altLang="ja-JP" dirty="0"/>
+              <a:t>Y=20</a:t>
+            </a:r>
+            <a:endParaRPr kumimoji="1" lang="ja-JP" altLang="en-US" dirty="0"/>
+          </a:p>
+        </p:txBody>
+      </p:sp>
+      <p:sp>
+        <p:nvSpPr>
+          <p:cNvPr id="23" name="テキスト ボックス 22">
+            <a:extLst>
+              <a:ext uri="{FF2B5EF4-FFF2-40B4-BE49-F238E27FC236}">
+                <a16:creationId xmlns:a16="http://schemas.microsoft.com/office/drawing/2014/main" id="{2B101A9A-9EA5-A5E9-16B0-AD550E4215C3}"/>
+              </a:ext>
+            </a:extLst>
+          </p:cNvPr>
+          <p:cNvSpPr txBox="1"/>
+          <p:nvPr/>
+        </p:nvSpPr>
+        <p:spPr>
+          <a:xfrm>
+            <a:off x="227767" y="5494981"/>
+            <a:ext cx="753461" cy="369332"/>
+          </a:xfrm>
+          <a:prstGeom prst="rect">
+            <a:avLst/>
+          </a:prstGeom>
+          <a:noFill/>
+        </p:spPr>
+        <p:txBody>
+          <a:bodyPr wrap="square" rtlCol="0">
+            <a:spAutoFit/>
+          </a:bodyPr>
+          <a:lstStyle/>
+          <a:p>
+            <a:r>
+              <a:rPr kumimoji="1" lang="en-US" altLang="ja-JP"/>
+              <a:t>Y=19</a:t>
+            </a:r>
+            <a:endParaRPr kumimoji="1" lang="ja-JP" altLang="en-US" dirty="0"/>
+          </a:p>
+        </p:txBody>
+      </p:sp>
+      <p:sp>
+        <p:nvSpPr>
+          <p:cNvPr id="24" name="テキスト ボックス 23">
+            <a:extLst>
+              <a:ext uri="{FF2B5EF4-FFF2-40B4-BE49-F238E27FC236}">
+                <a16:creationId xmlns:a16="http://schemas.microsoft.com/office/drawing/2014/main" id="{E9354F81-A58D-070F-B910-EB48D16E6B23}"/>
+              </a:ext>
+            </a:extLst>
+          </p:cNvPr>
+          <p:cNvSpPr txBox="1"/>
+          <p:nvPr/>
+        </p:nvSpPr>
+        <p:spPr>
+          <a:xfrm>
+            <a:off x="7387393" y="2080150"/>
+            <a:ext cx="4580015" cy="861774"/>
+          </a:xfrm>
+          <a:prstGeom prst="rect">
+            <a:avLst/>
+          </a:prstGeom>
+          <a:noFill/>
+        </p:spPr>
+        <p:txBody>
+          <a:bodyPr wrap="square">
+            <a:spAutoFit/>
+          </a:bodyPr>
+          <a:lstStyle/>
+          <a:p>
+            <a:r>
+              <a:rPr lang="en-US" altLang="ja-JP" sz="1600" dirty="0"/>
+              <a:t>ivec2(</a:t>
+            </a:r>
+            <a:r>
+              <a:rPr lang="en-US" altLang="ja-JP" sz="1600" dirty="0" err="1"/>
+              <a:t>fragCoord.xy</a:t>
+            </a:r>
+            <a:r>
+              <a:rPr lang="en-US" altLang="ja-JP" sz="1600" dirty="0"/>
+              <a:t>) == ivec2(0, 0)</a:t>
+            </a:r>
+          </a:p>
+          <a:p>
+            <a:r>
+              <a:rPr lang="ja-JP" altLang="en-US" sz="1600" dirty="0"/>
+              <a:t>で位置を判定して処理を分けることで，</a:t>
+            </a:r>
+            <a:endParaRPr lang="en-US" altLang="ja-JP" sz="1600" dirty="0"/>
+          </a:p>
+          <a:p>
+            <a:r>
+              <a:rPr lang="en-US" altLang="ja-JP" sz="1600" dirty="0" err="1"/>
+              <a:t>texelFetch</a:t>
+            </a:r>
+            <a:r>
+              <a:rPr lang="ja-JP" altLang="en-US" sz="1600" dirty="0"/>
+              <a:t>する座標に対する書き込みができる</a:t>
+            </a:r>
+          </a:p>
+        </p:txBody>
+      </p:sp>
+      <p:sp>
+        <p:nvSpPr>
+          <p:cNvPr id="25" name="テキスト ボックス 24">
+            <a:extLst>
+              <a:ext uri="{FF2B5EF4-FFF2-40B4-BE49-F238E27FC236}">
+                <a16:creationId xmlns:a16="http://schemas.microsoft.com/office/drawing/2014/main" id="{D9C1B2BE-740D-1731-D369-BE2DE68531E8}"/>
+              </a:ext>
+            </a:extLst>
+          </p:cNvPr>
+          <p:cNvSpPr txBox="1"/>
+          <p:nvPr/>
+        </p:nvSpPr>
+        <p:spPr>
+          <a:xfrm>
+            <a:off x="1416569" y="132896"/>
+            <a:ext cx="6384010" cy="276999"/>
+          </a:xfrm>
+          <a:prstGeom prst="rect">
+            <a:avLst/>
+          </a:prstGeom>
+          <a:noFill/>
+        </p:spPr>
+        <p:txBody>
+          <a:bodyPr wrap="square">
+            <a:spAutoFit/>
+          </a:bodyPr>
+          <a:lstStyle/>
+          <a:p>
+            <a:r>
+              <a:rPr lang="en-US" altLang="ja-JP" sz="1200" b="1" dirty="0">
+                <a:solidFill>
+                  <a:srgbClr val="FF0000"/>
+                </a:solidFill>
+              </a:rPr>
+              <a:t>Main</a:t>
+            </a:r>
+            <a:r>
+              <a:rPr lang="ja-JP" altLang="en-US" sz="1200" b="1" dirty="0">
+                <a:solidFill>
+                  <a:srgbClr val="FF0000"/>
+                </a:solidFill>
+              </a:rPr>
+              <a:t>とテクスチャサイズが違うので，座標変換が同じにならない（たぶん）</a:t>
+            </a:r>
+          </a:p>
+        </p:txBody>
+      </p:sp>
     </p:spTree>
     <p:extLst>
       <p:ext uri="{BB962C8B-B14F-4D97-AF65-F5344CB8AC3E}">

</xml_diff>

<commit_message>
Update memo for agehama
</commit_message>
<xml_diff>
--- a/memo.pptx
+++ b/memo.pptx
@@ -4284,76 +4284,34 @@
           <a:chExt cx="0" cy="0"/>
         </a:xfrm>
       </p:grpSpPr>
-      <p:pic>
-        <p:nvPicPr>
-          <p:cNvPr id="24" name="Picture 2" descr="碁盤のイラスト素材 [157430270] - イメージマート">
-            <a:extLst>
-              <a:ext uri="{FF2B5EF4-FFF2-40B4-BE49-F238E27FC236}">
-                <a16:creationId xmlns:a16="http://schemas.microsoft.com/office/drawing/2014/main" id="{7251A3CE-B43C-1D7A-04E2-8F0A94CC86D9}"/>
-              </a:ext>
-            </a:extLst>
-          </p:cNvPr>
-          <p:cNvPicPr>
-            <a:picLocks noChangeAspect="1" noChangeArrowheads="1"/>
-          </p:cNvPicPr>
+      <p:sp>
+        <p:nvSpPr>
+          <p:cNvPr id="42" name="正方形/長方形 41">
+            <a:extLst>
+              <a:ext uri="{FF2B5EF4-FFF2-40B4-BE49-F238E27FC236}">
+                <a16:creationId xmlns:a16="http://schemas.microsoft.com/office/drawing/2014/main" id="{D66961D3-DAE9-490B-CF60-BA56D6BFF980}"/>
+              </a:ext>
+            </a:extLst>
+          </p:cNvPr>
+          <p:cNvSpPr/>
           <p:nvPr/>
-        </p:nvPicPr>
-        <p:blipFill rotWithShape="1">
-          <a:blip r:embed="rId2">
-            <a:alphaModFix amt="35000"/>
-            <a:extLst>
-              <a:ext uri="{28A0092B-C50C-407E-A947-70E740481C1C}">
-                <a14:useLocalDpi xmlns:a14="http://schemas.microsoft.com/office/drawing/2010/main" val="0"/>
-              </a:ext>
-            </a:extLst>
-          </a:blip>
-          <a:srcRect l="3927" t="3777" r="4152" b="4504"/>
-          <a:stretch/>
-        </p:blipFill>
-        <p:spPr bwMode="auto">
+        </p:nvSpPr>
+        <p:spPr>
           <a:xfrm>
-            <a:off x="1826333" y="769834"/>
-            <a:ext cx="2283375" cy="2278297"/>
+            <a:off x="4237762" y="770419"/>
+            <a:ext cx="1148555" cy="2452059"/>
           </a:xfrm>
           <a:prstGeom prst="rect">
             <a:avLst/>
           </a:prstGeom>
-          <a:noFill/>
-          <a:extLst>
-            <a:ext uri="{909E8E84-426E-40DD-AFC4-6F175D3DCCD1}">
-              <a14:hiddenFill xmlns:a14="http://schemas.microsoft.com/office/drawing/2010/main">
-                <a:solidFill>
-                  <a:srgbClr val="FFFFFF"/>
-                </a:solidFill>
-              </a14:hiddenFill>
-            </a:ext>
-          </a:extLst>
-        </p:spPr>
-      </p:pic>
-      <p:sp>
-        <p:nvSpPr>
-          <p:cNvPr id="4" name="正方形/長方形 3">
-            <a:extLst>
-              <a:ext uri="{FF2B5EF4-FFF2-40B4-BE49-F238E27FC236}">
-                <a16:creationId xmlns:a16="http://schemas.microsoft.com/office/drawing/2014/main" id="{2438E701-9E35-F6F5-0B03-FB41135435E8}"/>
-              </a:ext>
-            </a:extLst>
-          </p:cNvPr>
-          <p:cNvSpPr/>
-          <p:nvPr/>
-        </p:nvSpPr>
-        <p:spPr>
-          <a:xfrm>
-            <a:off x="536744" y="596446"/>
-            <a:ext cx="4862383" cy="2638167"/>
-          </a:xfrm>
-          <a:prstGeom prst="rect">
-            <a:avLst/>
-          </a:prstGeom>
-          <a:noFill/>
+          <a:solidFill>
+            <a:srgbClr val="FEE6FB">
+              <a:alpha val="30196"/>
+            </a:srgbClr>
+          </a:solidFill>
           <a:ln>
             <a:solidFill>
-              <a:srgbClr val="000000"/>
+              <a:srgbClr val="FAA4E3"/>
             </a:solidFill>
           </a:ln>
         </p:spPr>
@@ -4382,30 +4340,76 @@
           </a:p>
         </p:txBody>
       </p:sp>
-      <p:sp>
-        <p:nvSpPr>
-          <p:cNvPr id="5" name="正方形/長方形 4">
-            <a:extLst>
-              <a:ext uri="{FF2B5EF4-FFF2-40B4-BE49-F238E27FC236}">
-                <a16:creationId xmlns:a16="http://schemas.microsoft.com/office/drawing/2014/main" id="{FFC407A4-7645-308B-4320-EAA2FF6A4B7F}"/>
-              </a:ext>
-            </a:extLst>
-          </p:cNvPr>
-          <p:cNvSpPr/>
+      <p:pic>
+        <p:nvPicPr>
+          <p:cNvPr id="24" name="Picture 2" descr="碁盤のイラスト素材 [157430270] - イメージマート">
+            <a:extLst>
+              <a:ext uri="{FF2B5EF4-FFF2-40B4-BE49-F238E27FC236}">
+                <a16:creationId xmlns:a16="http://schemas.microsoft.com/office/drawing/2014/main" id="{7251A3CE-B43C-1D7A-04E2-8F0A94CC86D9}"/>
+              </a:ext>
+            </a:extLst>
+          </p:cNvPr>
+          <p:cNvPicPr>
+            <a:picLocks noChangeAspect="1" noChangeArrowheads="1"/>
+          </p:cNvPicPr>
           <p:nvPr/>
-        </p:nvSpPr>
-        <p:spPr>
+        </p:nvPicPr>
+        <p:blipFill rotWithShape="1">
+          <a:blip r:embed="rId2">
+            <a:alphaModFix amt="35000"/>
+            <a:extLst>
+              <a:ext uri="{28A0092B-C50C-407E-A947-70E740481C1C}">
+                <a14:useLocalDpi xmlns:a14="http://schemas.microsoft.com/office/drawing/2010/main" val="0"/>
+              </a:ext>
+            </a:extLst>
+          </a:blip>
+          <a:srcRect l="3927" t="3777" r="4152" b="4504"/>
+          <a:stretch/>
+        </p:blipFill>
+        <p:spPr bwMode="auto">
           <a:xfrm>
-            <a:off x="1813540" y="761134"/>
-            <a:ext cx="2308791" cy="2308791"/>
+            <a:off x="1826333" y="769834"/>
+            <a:ext cx="2283375" cy="2278297"/>
           </a:xfrm>
           <a:prstGeom prst="rect">
             <a:avLst/>
           </a:prstGeom>
           <a:noFill/>
-          <a:ln w="38100">
+          <a:extLst>
+            <a:ext uri="{909E8E84-426E-40DD-AFC4-6F175D3DCCD1}">
+              <a14:hiddenFill xmlns:a14="http://schemas.microsoft.com/office/drawing/2010/main">
+                <a:solidFill>
+                  <a:srgbClr val="FFFFFF"/>
+                </a:solidFill>
+              </a14:hiddenFill>
+            </a:ext>
+          </a:extLst>
+        </p:spPr>
+      </p:pic>
+      <p:sp>
+        <p:nvSpPr>
+          <p:cNvPr id="4" name="正方形/長方形 3">
+            <a:extLst>
+              <a:ext uri="{FF2B5EF4-FFF2-40B4-BE49-F238E27FC236}">
+                <a16:creationId xmlns:a16="http://schemas.microsoft.com/office/drawing/2014/main" id="{2438E701-9E35-F6F5-0B03-FB41135435E8}"/>
+              </a:ext>
+            </a:extLst>
+          </p:cNvPr>
+          <p:cNvSpPr/>
+          <p:nvPr/>
+        </p:nvSpPr>
+        <p:spPr>
+          <a:xfrm>
+            <a:off x="536744" y="596446"/>
+            <a:ext cx="4862383" cy="2638167"/>
+          </a:xfrm>
+          <a:prstGeom prst="rect">
+            <a:avLst/>
+          </a:prstGeom>
+          <a:noFill/>
+          <a:ln>
             <a:solidFill>
-              <a:schemeClr val="accent1"/>
+              <a:srgbClr val="000000"/>
             </a:solidFill>
           </a:ln>
         </p:spPr>
@@ -4436,6 +4440,58 @@
       </p:sp>
       <p:sp>
         <p:nvSpPr>
+          <p:cNvPr id="5" name="正方形/長方形 4">
+            <a:extLst>
+              <a:ext uri="{FF2B5EF4-FFF2-40B4-BE49-F238E27FC236}">
+                <a16:creationId xmlns:a16="http://schemas.microsoft.com/office/drawing/2014/main" id="{FFC407A4-7645-308B-4320-EAA2FF6A4B7F}"/>
+              </a:ext>
+            </a:extLst>
+          </p:cNvPr>
+          <p:cNvSpPr/>
+          <p:nvPr/>
+        </p:nvSpPr>
+        <p:spPr>
+          <a:xfrm>
+            <a:off x="1813540" y="761134"/>
+            <a:ext cx="2308791" cy="2308791"/>
+          </a:xfrm>
+          <a:prstGeom prst="rect">
+            <a:avLst/>
+          </a:prstGeom>
+          <a:noFill/>
+          <a:ln w="38100">
+            <a:solidFill>
+              <a:schemeClr val="accent1"/>
+            </a:solidFill>
+          </a:ln>
+        </p:spPr>
+        <p:style>
+          <a:lnRef idx="2">
+            <a:schemeClr val="accent1">
+              <a:shade val="50000"/>
+            </a:schemeClr>
+          </a:lnRef>
+          <a:fillRef idx="1">
+            <a:schemeClr val="accent1"/>
+          </a:fillRef>
+          <a:effectRef idx="0">
+            <a:schemeClr val="accent1"/>
+          </a:effectRef>
+          <a:fontRef idx="minor">
+            <a:schemeClr val="lt1"/>
+          </a:fontRef>
+        </p:style>
+        <p:txBody>
+          <a:bodyPr rtlCol="0" anchor="ctr"/>
+          <a:lstStyle/>
+          <a:p>
+            <a:pPr algn="ctr"/>
+            <a:endParaRPr kumimoji="1" lang="ja-JP" altLang="en-US"/>
+          </a:p>
+        </p:txBody>
+      </p:sp>
+      <p:sp>
+        <p:nvSpPr>
           <p:cNvPr id="6" name="テキスト ボックス 5">
             <a:extLst>
               <a:ext uri="{FF2B5EF4-FFF2-40B4-BE49-F238E27FC236}">
@@ -4554,15 +4610,7 @@
             </a:r>
             <a:r>
               <a:rPr lang="en-US" altLang="ja-JP" sz="1200" dirty="0"/>
-              <a:t> = 19.0</a:t>
-            </a:r>
-            <a:r>
-              <a:rPr lang="en-US" altLang="ja-JP" sz="1200"/>
-              <a:t>*(centerPxCoord+vec2</a:t>
-            </a:r>
-            <a:r>
-              <a:rPr lang="en-US" altLang="ja-JP" sz="1200" dirty="0"/>
-              <a:t>(</a:t>
+              <a:t> = 19.0*(centerPxCoord+vec2(</a:t>
             </a:r>
             <a:r>
               <a:rPr kumimoji="1" lang="en-US" altLang="ja-JP" sz="1200" dirty="0" err="1"/>
@@ -4962,8 +5010,8 @@
         </p:nvCxnSpPr>
         <p:spPr>
           <a:xfrm>
-            <a:off x="1351301" y="761134"/>
-            <a:ext cx="4223483" cy="0"/>
+            <a:off x="486378" y="757959"/>
+            <a:ext cx="5102428" cy="0"/>
           </a:xfrm>
           <a:prstGeom prst="straightConnector1">
             <a:avLst/>
@@ -5263,7 +5311,7 @@
         </p:nvSpPr>
         <p:spPr>
           <a:xfrm>
-            <a:off x="1187759" y="3477747"/>
+            <a:off x="862918" y="3294894"/>
             <a:ext cx="1205854" cy="215444"/>
           </a:xfrm>
           <a:prstGeom prst="rect">
@@ -5328,6 +5376,626 @@
                 </a:solidFill>
               </a:rPr>
               <a:t>boardCoord.x</a:t>
+            </a:r>
+            <a:endParaRPr lang="ja-JP" altLang="en-US" sz="800" b="1" dirty="0">
+              <a:solidFill>
+                <a:schemeClr val="accent1"/>
+              </a:solidFill>
+            </a:endParaRPr>
+          </a:p>
+        </p:txBody>
+      </p:sp>
+      <p:sp>
+        <p:nvSpPr>
+          <p:cNvPr id="28" name="テキスト ボックス 27">
+            <a:extLst>
+              <a:ext uri="{FF2B5EF4-FFF2-40B4-BE49-F238E27FC236}">
+                <a16:creationId xmlns:a16="http://schemas.microsoft.com/office/drawing/2014/main" id="{BEDF6424-784C-2D68-AFD3-2CA08DC14E7F}"/>
+              </a:ext>
+            </a:extLst>
+          </p:cNvPr>
+          <p:cNvSpPr txBox="1"/>
+          <p:nvPr/>
+        </p:nvSpPr>
+        <p:spPr>
+          <a:xfrm>
+            <a:off x="5490608" y="2811436"/>
+            <a:ext cx="2187629" cy="215444"/>
+          </a:xfrm>
+          <a:prstGeom prst="rect">
+            <a:avLst/>
+          </a:prstGeom>
+          <a:noFill/>
+        </p:spPr>
+        <p:txBody>
+          <a:bodyPr wrap="square">
+            <a:spAutoFit/>
+          </a:bodyPr>
+          <a:lstStyle/>
+          <a:p>
+            <a:r>
+              <a:rPr lang="en-US" altLang="ja-JP" sz="800" b="1" dirty="0">
+                <a:solidFill>
+                  <a:schemeClr val="accent1"/>
+                </a:solidFill>
+              </a:rPr>
+              <a:t>screenRectInBoardCoord.zw</a:t>
+            </a:r>
+            <a:endParaRPr lang="ja-JP" altLang="en-US" sz="800" b="1" dirty="0">
+              <a:solidFill>
+                <a:schemeClr val="accent1"/>
+              </a:solidFill>
+            </a:endParaRPr>
+          </a:p>
+        </p:txBody>
+      </p:sp>
+      <p:cxnSp>
+        <p:nvCxnSpPr>
+          <p:cNvPr id="29" name="直線矢印コネクタ 28">
+            <a:extLst>
+              <a:ext uri="{FF2B5EF4-FFF2-40B4-BE49-F238E27FC236}">
+                <a16:creationId xmlns:a16="http://schemas.microsoft.com/office/drawing/2014/main" id="{5C6A0E73-B867-29C3-A90D-9271ACF0B1C6}"/>
+              </a:ext>
+            </a:extLst>
+          </p:cNvPr>
+          <p:cNvCxnSpPr>
+            <a:cxnSpLocks/>
+          </p:cNvCxnSpPr>
+          <p:nvPr/>
+        </p:nvCxnSpPr>
+        <p:spPr>
+          <a:xfrm flipV="1">
+            <a:off x="5411739" y="764547"/>
+            <a:ext cx="0" cy="2463551"/>
+          </a:xfrm>
+          <a:prstGeom prst="straightConnector1">
+            <a:avLst/>
+          </a:prstGeom>
+          <a:ln w="12700">
+            <a:solidFill>
+              <a:schemeClr val="accent1"/>
+            </a:solidFill>
+            <a:prstDash val="lgDash"/>
+            <a:headEnd type="none" w="med" len="med"/>
+            <a:tailEnd type="none" w="med" len="med"/>
+          </a:ln>
+        </p:spPr>
+        <p:style>
+          <a:lnRef idx="1">
+            <a:schemeClr val="accent1"/>
+          </a:lnRef>
+          <a:fillRef idx="0">
+            <a:schemeClr val="accent1"/>
+          </a:fillRef>
+          <a:effectRef idx="0">
+            <a:schemeClr val="accent1"/>
+          </a:effectRef>
+          <a:fontRef idx="minor">
+            <a:schemeClr val="tx1"/>
+          </a:fontRef>
+        </p:style>
+      </p:cxnSp>
+      <p:cxnSp>
+        <p:nvCxnSpPr>
+          <p:cNvPr id="33" name="直線矢印コネクタ 32">
+            <a:extLst>
+              <a:ext uri="{FF2B5EF4-FFF2-40B4-BE49-F238E27FC236}">
+                <a16:creationId xmlns:a16="http://schemas.microsoft.com/office/drawing/2014/main" id="{71DB775B-3E77-0D10-34AA-2A2E11AD8589}"/>
+              </a:ext>
+            </a:extLst>
+          </p:cNvPr>
+          <p:cNvCxnSpPr>
+            <a:cxnSpLocks/>
+          </p:cNvCxnSpPr>
+          <p:nvPr/>
+        </p:nvCxnSpPr>
+        <p:spPr>
+          <a:xfrm flipH="1">
+            <a:off x="1826333" y="3248899"/>
+            <a:ext cx="3572794" cy="0"/>
+          </a:xfrm>
+          <a:prstGeom prst="straightConnector1">
+            <a:avLst/>
+          </a:prstGeom>
+          <a:ln w="12700">
+            <a:solidFill>
+              <a:schemeClr val="accent1"/>
+            </a:solidFill>
+            <a:prstDash val="lgDash"/>
+            <a:headEnd type="none" w="med" len="med"/>
+            <a:tailEnd type="none" w="med" len="med"/>
+          </a:ln>
+        </p:spPr>
+        <p:style>
+          <a:lnRef idx="1">
+            <a:schemeClr val="accent1"/>
+          </a:lnRef>
+          <a:fillRef idx="0">
+            <a:schemeClr val="accent1"/>
+          </a:fillRef>
+          <a:effectRef idx="0">
+            <a:schemeClr val="accent1"/>
+          </a:effectRef>
+          <a:fontRef idx="minor">
+            <a:schemeClr val="tx1"/>
+          </a:fontRef>
+        </p:style>
+      </p:cxnSp>
+      <p:cxnSp>
+        <p:nvCxnSpPr>
+          <p:cNvPr id="34" name="直線矢印コネクタ 33">
+            <a:extLst>
+              <a:ext uri="{FF2B5EF4-FFF2-40B4-BE49-F238E27FC236}">
+                <a16:creationId xmlns:a16="http://schemas.microsoft.com/office/drawing/2014/main" id="{C7417B97-8E03-1359-677A-808D0B3C9005}"/>
+              </a:ext>
+            </a:extLst>
+          </p:cNvPr>
+          <p:cNvCxnSpPr>
+            <a:cxnSpLocks/>
+          </p:cNvCxnSpPr>
+          <p:nvPr/>
+        </p:nvCxnSpPr>
+        <p:spPr>
+          <a:xfrm flipH="1">
+            <a:off x="5416805" y="3026880"/>
+            <a:ext cx="279013" cy="214249"/>
+          </a:xfrm>
+          <a:prstGeom prst="straightConnector1">
+            <a:avLst/>
+          </a:prstGeom>
+          <a:ln w="12700">
+            <a:solidFill>
+              <a:schemeClr val="accent1"/>
+            </a:solidFill>
+            <a:prstDash val="solid"/>
+            <a:headEnd type="none" w="med" len="med"/>
+            <a:tailEnd type="none" w="med" len="med"/>
+          </a:ln>
+        </p:spPr>
+        <p:style>
+          <a:lnRef idx="1">
+            <a:schemeClr val="accent1"/>
+          </a:lnRef>
+          <a:fillRef idx="0">
+            <a:schemeClr val="accent1"/>
+          </a:fillRef>
+          <a:effectRef idx="0">
+            <a:schemeClr val="accent1"/>
+          </a:effectRef>
+          <a:fontRef idx="minor">
+            <a:schemeClr val="tx1"/>
+          </a:fontRef>
+        </p:style>
+      </p:cxnSp>
+      <p:cxnSp>
+        <p:nvCxnSpPr>
+          <p:cNvPr id="35" name="直線矢印コネクタ 34">
+            <a:extLst>
+              <a:ext uri="{FF2B5EF4-FFF2-40B4-BE49-F238E27FC236}">
+                <a16:creationId xmlns:a16="http://schemas.microsoft.com/office/drawing/2014/main" id="{A3B07770-B330-676B-75EA-8312343F074B}"/>
+              </a:ext>
+            </a:extLst>
+          </p:cNvPr>
+          <p:cNvCxnSpPr>
+            <a:cxnSpLocks/>
+          </p:cNvCxnSpPr>
+          <p:nvPr/>
+        </p:nvCxnSpPr>
+        <p:spPr>
+          <a:xfrm flipH="1">
+            <a:off x="402708" y="596445"/>
+            <a:ext cx="127730" cy="222254"/>
+          </a:xfrm>
+          <a:prstGeom prst="straightConnector1">
+            <a:avLst/>
+          </a:prstGeom>
+          <a:ln w="12700">
+            <a:solidFill>
+              <a:schemeClr val="accent1"/>
+            </a:solidFill>
+            <a:prstDash val="solid"/>
+            <a:headEnd type="none" w="med" len="med"/>
+            <a:tailEnd type="none" w="med" len="med"/>
+          </a:ln>
+        </p:spPr>
+        <p:style>
+          <a:lnRef idx="1">
+            <a:schemeClr val="accent1"/>
+          </a:lnRef>
+          <a:fillRef idx="0">
+            <a:schemeClr val="accent1"/>
+          </a:fillRef>
+          <a:effectRef idx="0">
+            <a:schemeClr val="accent1"/>
+          </a:effectRef>
+          <a:fontRef idx="minor">
+            <a:schemeClr val="tx1"/>
+          </a:fontRef>
+        </p:style>
+      </p:cxnSp>
+      <p:sp>
+        <p:nvSpPr>
+          <p:cNvPr id="36" name="テキスト ボックス 35">
+            <a:extLst>
+              <a:ext uri="{FF2B5EF4-FFF2-40B4-BE49-F238E27FC236}">
+                <a16:creationId xmlns:a16="http://schemas.microsoft.com/office/drawing/2014/main" id="{6B2CBCAE-FF4B-894C-42B2-8F628FF3F55C}"/>
+              </a:ext>
+            </a:extLst>
+          </p:cNvPr>
+          <p:cNvSpPr txBox="1"/>
+          <p:nvPr/>
+        </p:nvSpPr>
+        <p:spPr>
+          <a:xfrm>
+            <a:off x="7107" y="795047"/>
+            <a:ext cx="915884" cy="338554"/>
+          </a:xfrm>
+          <a:prstGeom prst="rect">
+            <a:avLst/>
+          </a:prstGeom>
+          <a:noFill/>
+        </p:spPr>
+        <p:txBody>
+          <a:bodyPr wrap="square">
+            <a:spAutoFit/>
+          </a:bodyPr>
+          <a:lstStyle/>
+          <a:p>
+            <a:r>
+              <a:rPr lang="en-US" altLang="ja-JP" sz="800" b="1" dirty="0" err="1">
+                <a:solidFill>
+                  <a:schemeClr val="accent1"/>
+                </a:solidFill>
+              </a:rPr>
+              <a:t>screenRectIn</a:t>
+            </a:r>
+            <a:endParaRPr lang="en-US" altLang="ja-JP" sz="800" b="1" dirty="0">
+              <a:solidFill>
+                <a:schemeClr val="accent1"/>
+              </a:solidFill>
+            </a:endParaRPr>
+          </a:p>
+          <a:p>
+            <a:r>
+              <a:rPr lang="en-US" altLang="ja-JP" sz="800" b="1" dirty="0" err="1">
+                <a:solidFill>
+                  <a:schemeClr val="accent1"/>
+                </a:solidFill>
+              </a:rPr>
+              <a:t>BoardCoord.xy</a:t>
+            </a:r>
+            <a:endParaRPr lang="ja-JP" altLang="en-US" sz="800" b="1" dirty="0">
+              <a:solidFill>
+                <a:schemeClr val="accent1"/>
+              </a:solidFill>
+            </a:endParaRPr>
+          </a:p>
+        </p:txBody>
+      </p:sp>
+      <p:cxnSp>
+        <p:nvCxnSpPr>
+          <p:cNvPr id="37" name="直線矢印コネクタ 36">
+            <a:extLst>
+              <a:ext uri="{FF2B5EF4-FFF2-40B4-BE49-F238E27FC236}">
+                <a16:creationId xmlns:a16="http://schemas.microsoft.com/office/drawing/2014/main" id="{89FF42E7-9BEB-308C-370A-E0CEABE2ACD7}"/>
+              </a:ext>
+            </a:extLst>
+          </p:cNvPr>
+          <p:cNvCxnSpPr>
+            <a:cxnSpLocks/>
+          </p:cNvCxnSpPr>
+          <p:nvPr/>
+        </p:nvCxnSpPr>
+        <p:spPr>
+          <a:xfrm flipV="1">
+            <a:off x="530438" y="612865"/>
+            <a:ext cx="0" cy="125179"/>
+          </a:xfrm>
+          <a:prstGeom prst="straightConnector1">
+            <a:avLst/>
+          </a:prstGeom>
+          <a:ln w="12700">
+            <a:solidFill>
+              <a:schemeClr val="accent1"/>
+            </a:solidFill>
+            <a:prstDash val="lgDash"/>
+            <a:headEnd type="none" w="med" len="med"/>
+            <a:tailEnd type="none" w="med" len="med"/>
+          </a:ln>
+        </p:spPr>
+        <p:style>
+          <a:lnRef idx="1">
+            <a:schemeClr val="accent1"/>
+          </a:lnRef>
+          <a:fillRef idx="0">
+            <a:schemeClr val="accent1"/>
+          </a:fillRef>
+          <a:effectRef idx="0">
+            <a:schemeClr val="accent1"/>
+          </a:effectRef>
+          <a:fontRef idx="minor">
+            <a:schemeClr val="tx1"/>
+          </a:fontRef>
+        </p:style>
+      </p:cxnSp>
+      <p:cxnSp>
+        <p:nvCxnSpPr>
+          <p:cNvPr id="39" name="直線矢印コネクタ 38">
+            <a:extLst>
+              <a:ext uri="{FF2B5EF4-FFF2-40B4-BE49-F238E27FC236}">
+                <a16:creationId xmlns:a16="http://schemas.microsoft.com/office/drawing/2014/main" id="{262DC602-321D-B65A-CA98-F84A0D5E1343}"/>
+              </a:ext>
+            </a:extLst>
+          </p:cNvPr>
+          <p:cNvCxnSpPr>
+            <a:cxnSpLocks/>
+          </p:cNvCxnSpPr>
+          <p:nvPr/>
+        </p:nvCxnSpPr>
+        <p:spPr>
+          <a:xfrm flipH="1">
+            <a:off x="530438" y="583745"/>
+            <a:ext cx="1301742" cy="0"/>
+          </a:xfrm>
+          <a:prstGeom prst="straightConnector1">
+            <a:avLst/>
+          </a:prstGeom>
+          <a:ln w="12700">
+            <a:solidFill>
+              <a:schemeClr val="accent1"/>
+            </a:solidFill>
+            <a:prstDash val="lgDash"/>
+            <a:headEnd type="none" w="med" len="med"/>
+            <a:tailEnd type="none" w="med" len="med"/>
+          </a:ln>
+        </p:spPr>
+        <p:style>
+          <a:lnRef idx="1">
+            <a:schemeClr val="accent1"/>
+          </a:lnRef>
+          <a:fillRef idx="0">
+            <a:schemeClr val="accent1"/>
+          </a:fillRef>
+          <a:effectRef idx="0">
+            <a:schemeClr val="accent1"/>
+          </a:effectRef>
+          <a:fontRef idx="minor">
+            <a:schemeClr val="tx1"/>
+          </a:fontRef>
+        </p:style>
+      </p:cxnSp>
+      <p:cxnSp>
+        <p:nvCxnSpPr>
+          <p:cNvPr id="43" name="直線矢印コネクタ 42">
+            <a:extLst>
+              <a:ext uri="{FF2B5EF4-FFF2-40B4-BE49-F238E27FC236}">
+                <a16:creationId xmlns:a16="http://schemas.microsoft.com/office/drawing/2014/main" id="{E824AC6A-3383-A1C6-9E48-7107D16290C7}"/>
+              </a:ext>
+            </a:extLst>
+          </p:cNvPr>
+          <p:cNvCxnSpPr>
+            <a:cxnSpLocks/>
+          </p:cNvCxnSpPr>
+          <p:nvPr/>
+        </p:nvCxnSpPr>
+        <p:spPr>
+          <a:xfrm flipH="1">
+            <a:off x="4445677" y="3172917"/>
+            <a:ext cx="70284" cy="515575"/>
+          </a:xfrm>
+          <a:prstGeom prst="straightConnector1">
+            <a:avLst/>
+          </a:prstGeom>
+          <a:ln w="12700">
+            <a:solidFill>
+              <a:srgbClr val="FAA4E3"/>
+            </a:solidFill>
+            <a:prstDash val="solid"/>
+            <a:headEnd type="none" w="med" len="med"/>
+            <a:tailEnd type="none" w="med" len="med"/>
+          </a:ln>
+        </p:spPr>
+        <p:style>
+          <a:lnRef idx="1">
+            <a:schemeClr val="accent1"/>
+          </a:lnRef>
+          <a:fillRef idx="0">
+            <a:schemeClr val="accent1"/>
+          </a:fillRef>
+          <a:effectRef idx="0">
+            <a:schemeClr val="accent1"/>
+          </a:effectRef>
+          <a:fontRef idx="minor">
+            <a:schemeClr val="tx1"/>
+          </a:fontRef>
+        </p:style>
+      </p:cxnSp>
+      <p:sp>
+        <p:nvSpPr>
+          <p:cNvPr id="46" name="正方形/長方形 45">
+            <a:extLst>
+              <a:ext uri="{FF2B5EF4-FFF2-40B4-BE49-F238E27FC236}">
+                <a16:creationId xmlns:a16="http://schemas.microsoft.com/office/drawing/2014/main" id="{CE0942D6-778F-1B49-D1D1-29C3218E4289}"/>
+              </a:ext>
+            </a:extLst>
+          </p:cNvPr>
+          <p:cNvSpPr/>
+          <p:nvPr/>
+        </p:nvSpPr>
+        <p:spPr>
+          <a:xfrm>
+            <a:off x="4141022" y="4016542"/>
+            <a:ext cx="1148555" cy="2452059"/>
+          </a:xfrm>
+          <a:prstGeom prst="rect">
+            <a:avLst/>
+          </a:prstGeom>
+          <a:solidFill>
+            <a:srgbClr val="FEE6FB">
+              <a:alpha val="30196"/>
+            </a:srgbClr>
+          </a:solidFill>
+          <a:ln>
+            <a:solidFill>
+              <a:srgbClr val="FAA4E3"/>
+            </a:solidFill>
+          </a:ln>
+        </p:spPr>
+        <p:style>
+          <a:lnRef idx="2">
+            <a:schemeClr val="accent1">
+              <a:shade val="50000"/>
+            </a:schemeClr>
+          </a:lnRef>
+          <a:fillRef idx="1">
+            <a:schemeClr val="accent1"/>
+          </a:fillRef>
+          <a:effectRef idx="0">
+            <a:schemeClr val="accent1"/>
+          </a:effectRef>
+          <a:fontRef idx="minor">
+            <a:schemeClr val="lt1"/>
+          </a:fontRef>
+        </p:style>
+        <p:txBody>
+          <a:bodyPr rtlCol="0" anchor="ctr"/>
+          <a:lstStyle/>
+          <a:p>
+            <a:pPr algn="ctr"/>
+            <a:endParaRPr kumimoji="1" lang="ja-JP" altLang="en-US"/>
+          </a:p>
+        </p:txBody>
+      </p:sp>
+      <p:sp>
+        <p:nvSpPr>
+          <p:cNvPr id="47" name="テキスト ボックス 46">
+            <a:extLst>
+              <a:ext uri="{FF2B5EF4-FFF2-40B4-BE49-F238E27FC236}">
+                <a16:creationId xmlns:a16="http://schemas.microsoft.com/office/drawing/2014/main" id="{BA236A7E-3B3E-5989-50AA-528A1156C491}"/>
+              </a:ext>
+            </a:extLst>
+          </p:cNvPr>
+          <p:cNvSpPr txBox="1"/>
+          <p:nvPr/>
+        </p:nvSpPr>
+        <p:spPr>
+          <a:xfrm>
+            <a:off x="4073401" y="3768810"/>
+            <a:ext cx="1172116" cy="261610"/>
+          </a:xfrm>
+          <a:prstGeom prst="rect">
+            <a:avLst/>
+          </a:prstGeom>
+          <a:noFill/>
+        </p:spPr>
+        <p:txBody>
+          <a:bodyPr wrap="none" rtlCol="0">
+            <a:spAutoFit/>
+          </a:bodyPr>
+          <a:lstStyle/>
+          <a:p>
+            <a:r>
+              <a:rPr lang="ja-JP" altLang="en-US" sz="1050" dirty="0"/>
+              <a:t>アゲハマエリア</a:t>
+            </a:r>
+            <a:endParaRPr kumimoji="1" lang="ja-JP" altLang="en-US" sz="1050" dirty="0"/>
+          </a:p>
+        </p:txBody>
+      </p:sp>
+      <p:sp>
+        <p:nvSpPr>
+          <p:cNvPr id="48" name="テキスト ボックス 47">
+            <a:extLst>
+              <a:ext uri="{FF2B5EF4-FFF2-40B4-BE49-F238E27FC236}">
+                <a16:creationId xmlns:a16="http://schemas.microsoft.com/office/drawing/2014/main" id="{3F94D86E-F242-83C1-E162-EB9967B2BDA0}"/>
+              </a:ext>
+            </a:extLst>
+          </p:cNvPr>
+          <p:cNvSpPr txBox="1"/>
+          <p:nvPr/>
+        </p:nvSpPr>
+        <p:spPr>
+          <a:xfrm>
+            <a:off x="3755974" y="3867147"/>
+            <a:ext cx="511401" cy="215444"/>
+          </a:xfrm>
+          <a:prstGeom prst="rect">
+            <a:avLst/>
+          </a:prstGeom>
+          <a:noFill/>
+        </p:spPr>
+        <p:txBody>
+          <a:bodyPr wrap="square">
+            <a:spAutoFit/>
+          </a:bodyPr>
+          <a:lstStyle/>
+          <a:p>
+            <a:r>
+              <a:rPr lang="en-US" altLang="ja-JP" sz="800" b="1" dirty="0">
+                <a:solidFill>
+                  <a:schemeClr val="accent1"/>
+                </a:solidFill>
+              </a:rPr>
+              <a:t>(20, 0)</a:t>
+            </a:r>
+            <a:endParaRPr lang="ja-JP" altLang="en-US" sz="800" b="1" dirty="0">
+              <a:solidFill>
+                <a:schemeClr val="accent1"/>
+              </a:solidFill>
+            </a:endParaRPr>
+          </a:p>
+        </p:txBody>
+      </p:sp>
+      <p:sp>
+        <p:nvSpPr>
+          <p:cNvPr id="49" name="テキスト ボックス 48">
+            <a:extLst>
+              <a:ext uri="{FF2B5EF4-FFF2-40B4-BE49-F238E27FC236}">
+                <a16:creationId xmlns:a16="http://schemas.microsoft.com/office/drawing/2014/main" id="{6531B42B-71AA-CB34-7C64-D54A3EA13953}"/>
+              </a:ext>
+            </a:extLst>
+          </p:cNvPr>
+          <p:cNvSpPr txBox="1"/>
+          <p:nvPr/>
+        </p:nvSpPr>
+        <p:spPr>
+          <a:xfrm>
+            <a:off x="5178580" y="6443889"/>
+            <a:ext cx="2187629" cy="338554"/>
+          </a:xfrm>
+          <a:prstGeom prst="rect">
+            <a:avLst/>
+          </a:prstGeom>
+          <a:noFill/>
+        </p:spPr>
+        <p:txBody>
+          <a:bodyPr wrap="square">
+            <a:spAutoFit/>
+          </a:bodyPr>
+          <a:lstStyle/>
+          <a:p>
+            <a:r>
+              <a:rPr lang="en-US" altLang="ja-JP" sz="800" b="1" dirty="0" err="1">
+                <a:solidFill>
+                  <a:schemeClr val="accent1"/>
+                </a:solidFill>
+              </a:rPr>
+              <a:t>screenRectIn</a:t>
+            </a:r>
+            <a:endParaRPr lang="en-US" altLang="ja-JP" sz="800" b="1" dirty="0">
+              <a:solidFill>
+                <a:schemeClr val="accent1"/>
+              </a:solidFill>
+            </a:endParaRPr>
+          </a:p>
+          <a:p>
+            <a:r>
+              <a:rPr lang="en-US" altLang="ja-JP" sz="800" b="1" dirty="0">
+                <a:solidFill>
+                  <a:schemeClr val="accent1"/>
+                </a:solidFill>
+              </a:rPr>
+              <a:t>BoardCoord.zw</a:t>
             </a:r>
             <a:endParaRPr lang="ja-JP" altLang="en-US" sz="800" b="1" dirty="0">
               <a:solidFill>

</xml_diff>

<commit_message>
Fix bug in Kou
</commit_message>
<xml_diff>
--- a/memo.pptx
+++ b/memo.pptx
@@ -261,7 +261,7 @@
           <a:p>
             <a:fld id="{71C86F30-9BF8-4195-8A5F-24C1FBD914D9}" type="datetimeFigureOut">
               <a:rPr kumimoji="1" lang="ja-JP" altLang="en-US" smtClean="0"/>
-              <a:t>2022/7/9</a:t>
+              <a:t>2022/7/31</a:t>
             </a:fld>
             <a:endParaRPr kumimoji="1" lang="ja-JP" altLang="en-US"/>
           </a:p>
@@ -491,7 +491,7 @@
           <a:p>
             <a:fld id="{71C86F30-9BF8-4195-8A5F-24C1FBD914D9}" type="datetimeFigureOut">
               <a:rPr kumimoji="1" lang="ja-JP" altLang="en-US" smtClean="0"/>
-              <a:t>2022/7/9</a:t>
+              <a:t>2022/7/31</a:t>
             </a:fld>
             <a:endParaRPr kumimoji="1" lang="ja-JP" altLang="en-US"/>
           </a:p>
@@ -731,7 +731,7 @@
           <a:p>
             <a:fld id="{71C86F30-9BF8-4195-8A5F-24C1FBD914D9}" type="datetimeFigureOut">
               <a:rPr kumimoji="1" lang="ja-JP" altLang="en-US" smtClean="0"/>
-              <a:t>2022/7/9</a:t>
+              <a:t>2022/7/31</a:t>
             </a:fld>
             <a:endParaRPr kumimoji="1" lang="ja-JP" altLang="en-US"/>
           </a:p>
@@ -961,7 +961,7 @@
           <a:p>
             <a:fld id="{71C86F30-9BF8-4195-8A5F-24C1FBD914D9}" type="datetimeFigureOut">
               <a:rPr kumimoji="1" lang="ja-JP" altLang="en-US" smtClean="0"/>
-              <a:t>2022/7/9</a:t>
+              <a:t>2022/7/31</a:t>
             </a:fld>
             <a:endParaRPr kumimoji="1" lang="ja-JP" altLang="en-US"/>
           </a:p>
@@ -1236,7 +1236,7 @@
           <a:p>
             <a:fld id="{71C86F30-9BF8-4195-8A5F-24C1FBD914D9}" type="datetimeFigureOut">
               <a:rPr kumimoji="1" lang="ja-JP" altLang="en-US" smtClean="0"/>
-              <a:t>2022/7/9</a:t>
+              <a:t>2022/7/31</a:t>
             </a:fld>
             <a:endParaRPr kumimoji="1" lang="ja-JP" altLang="en-US"/>
           </a:p>
@@ -1565,7 +1565,7 @@
           <a:p>
             <a:fld id="{71C86F30-9BF8-4195-8A5F-24C1FBD914D9}" type="datetimeFigureOut">
               <a:rPr kumimoji="1" lang="ja-JP" altLang="en-US" smtClean="0"/>
-              <a:t>2022/7/9</a:t>
+              <a:t>2022/7/31</a:t>
             </a:fld>
             <a:endParaRPr kumimoji="1" lang="ja-JP" altLang="en-US"/>
           </a:p>
@@ -2041,7 +2041,7 @@
           <a:p>
             <a:fld id="{71C86F30-9BF8-4195-8A5F-24C1FBD914D9}" type="datetimeFigureOut">
               <a:rPr kumimoji="1" lang="ja-JP" altLang="en-US" smtClean="0"/>
-              <a:t>2022/7/9</a:t>
+              <a:t>2022/7/31</a:t>
             </a:fld>
             <a:endParaRPr kumimoji="1" lang="ja-JP" altLang="en-US"/>
           </a:p>
@@ -2182,7 +2182,7 @@
           <a:p>
             <a:fld id="{71C86F30-9BF8-4195-8A5F-24C1FBD914D9}" type="datetimeFigureOut">
               <a:rPr kumimoji="1" lang="ja-JP" altLang="en-US" smtClean="0"/>
-              <a:t>2022/7/9</a:t>
+              <a:t>2022/7/31</a:t>
             </a:fld>
             <a:endParaRPr kumimoji="1" lang="ja-JP" altLang="en-US"/>
           </a:p>
@@ -2295,7 +2295,7 @@
           <a:p>
             <a:fld id="{71C86F30-9BF8-4195-8A5F-24C1FBD914D9}" type="datetimeFigureOut">
               <a:rPr kumimoji="1" lang="ja-JP" altLang="en-US" smtClean="0"/>
-              <a:t>2022/7/9</a:t>
+              <a:t>2022/7/31</a:t>
             </a:fld>
             <a:endParaRPr kumimoji="1" lang="ja-JP" altLang="en-US"/>
           </a:p>
@@ -2638,7 +2638,7 @@
           <a:p>
             <a:fld id="{71C86F30-9BF8-4195-8A5F-24C1FBD914D9}" type="datetimeFigureOut">
               <a:rPr kumimoji="1" lang="ja-JP" altLang="en-US" smtClean="0"/>
-              <a:t>2022/7/9</a:t>
+              <a:t>2022/7/31</a:t>
             </a:fld>
             <a:endParaRPr kumimoji="1" lang="ja-JP" altLang="en-US"/>
           </a:p>
@@ -2926,7 +2926,7 @@
           <a:p>
             <a:fld id="{71C86F30-9BF8-4195-8A5F-24C1FBD914D9}" type="datetimeFigureOut">
               <a:rPr kumimoji="1" lang="ja-JP" altLang="en-US" smtClean="0"/>
-              <a:t>2022/7/9</a:t>
+              <a:t>2022/7/31</a:t>
             </a:fld>
             <a:endParaRPr kumimoji="1" lang="ja-JP" altLang="en-US"/>
           </a:p>
@@ -3199,7 +3199,7 @@
           <a:p>
             <a:fld id="{71C86F30-9BF8-4195-8A5F-24C1FBD914D9}" type="datetimeFigureOut">
               <a:rPr kumimoji="1" lang="ja-JP" altLang="en-US" smtClean="0"/>
-              <a:t>2022/7/9</a:t>
+              <a:t>2022/7/31</a:t>
             </a:fld>
             <a:endParaRPr kumimoji="1" lang="ja-JP" altLang="en-US"/>
           </a:p>
@@ -5825,7 +5825,7 @@
         <p:spPr>
           <a:xfrm>
             <a:off x="4141022" y="4016542"/>
-            <a:ext cx="1148555" cy="2452059"/>
+            <a:ext cx="1116851" cy="2452059"/>
           </a:xfrm>
           <a:prstGeom prst="rect">
             <a:avLst/>
@@ -5916,7 +5916,7 @@
         </p:nvSpPr>
         <p:spPr>
           <a:xfrm>
-            <a:off x="3755974" y="3867147"/>
+            <a:off x="3743618" y="3842435"/>
             <a:ext cx="511401" cy="215444"/>
           </a:xfrm>
           <a:prstGeom prst="rect">
@@ -6005,6 +6005,3005 @@
           </a:p>
         </p:txBody>
       </p:sp>
+      <p:graphicFrame>
+        <p:nvGraphicFramePr>
+          <p:cNvPr id="50" name="表 50">
+            <a:extLst>
+              <a:ext uri="{FF2B5EF4-FFF2-40B4-BE49-F238E27FC236}">
+                <a16:creationId xmlns:a16="http://schemas.microsoft.com/office/drawing/2014/main" id="{BD0B8B67-0066-BD6F-46F3-174FD0A8FB47}"/>
+              </a:ext>
+            </a:extLst>
+          </p:cNvPr>
+          <p:cNvGraphicFramePr>
+            <a:graphicFrameLocks noGrp="1"/>
+          </p:cNvGraphicFramePr>
+          <p:nvPr>
+            <p:extLst>
+              <p:ext uri="{D42A27DB-BD31-4B8C-83A1-F6EECF244321}">
+                <p14:modId xmlns:p14="http://schemas.microsoft.com/office/powerpoint/2010/main" val="1237967074"/>
+              </p:ext>
+            </p:extLst>
+          </p:nvPr>
+        </p:nvGraphicFramePr>
+        <p:xfrm>
+          <a:off x="4147200" y="4021216"/>
+          <a:ext cx="1104495" cy="2437072"/>
+        </p:xfrm>
+        <a:graphic>
+          <a:graphicData uri="http://schemas.openxmlformats.org/drawingml/2006/table">
+            <a:tbl>
+              <a:tblPr firstRow="1" bandRow="1">
+                <a:tableStyleId>{5C22544A-7EE6-4342-B048-85BDC9FD1C3A}</a:tableStyleId>
+              </a:tblPr>
+              <a:tblGrid>
+                <a:gridCol w="220899">
+                  <a:extLst>
+                    <a:ext uri="{9D8B030D-6E8A-4147-A177-3AD203B41FA5}">
+                      <a16:colId xmlns:a16="http://schemas.microsoft.com/office/drawing/2014/main" val="294161504"/>
+                    </a:ext>
+                  </a:extLst>
+                </a:gridCol>
+                <a:gridCol w="220899">
+                  <a:extLst>
+                    <a:ext uri="{9D8B030D-6E8A-4147-A177-3AD203B41FA5}">
+                      <a16:colId xmlns:a16="http://schemas.microsoft.com/office/drawing/2014/main" val="3204934110"/>
+                    </a:ext>
+                  </a:extLst>
+                </a:gridCol>
+                <a:gridCol w="220899">
+                  <a:extLst>
+                    <a:ext uri="{9D8B030D-6E8A-4147-A177-3AD203B41FA5}">
+                      <a16:colId xmlns:a16="http://schemas.microsoft.com/office/drawing/2014/main" val="2733321224"/>
+                    </a:ext>
+                  </a:extLst>
+                </a:gridCol>
+                <a:gridCol w="220899">
+                  <a:extLst>
+                    <a:ext uri="{9D8B030D-6E8A-4147-A177-3AD203B41FA5}">
+                      <a16:colId xmlns:a16="http://schemas.microsoft.com/office/drawing/2014/main" val="3063548757"/>
+                    </a:ext>
+                  </a:extLst>
+                </a:gridCol>
+                <a:gridCol w="220899">
+                  <a:extLst>
+                    <a:ext uri="{9D8B030D-6E8A-4147-A177-3AD203B41FA5}">
+                      <a16:colId xmlns:a16="http://schemas.microsoft.com/office/drawing/2014/main" val="4007785862"/>
+                    </a:ext>
+                  </a:extLst>
+                </a:gridCol>
+              </a:tblGrid>
+              <a:tr h="221552">
+                <a:tc>
+                  <a:txBody>
+                    <a:bodyPr/>
+                    <a:lstStyle/>
+                    <a:p>
+                      <a:endParaRPr kumimoji="1" lang="ja-JP" altLang="en-US" sz="100" dirty="0"/>
+                    </a:p>
+                  </a:txBody>
+                  <a:tcPr>
+                    <a:lnL w="12700" cap="flat" cmpd="sng" algn="ctr">
+                      <a:noFill/>
+                      <a:prstDash val="solid"/>
+                      <a:round/>
+                      <a:headEnd type="none" w="med" len="med"/>
+                      <a:tailEnd type="none" w="med" len="med"/>
+                    </a:lnL>
+                    <a:lnR w="3175" cap="flat" cmpd="sng" algn="ctr">
+                      <a:solidFill>
+                        <a:schemeClr val="tx1"/>
+                      </a:solidFill>
+                      <a:prstDash val="solid"/>
+                      <a:round/>
+                      <a:headEnd type="none" w="med" len="med"/>
+                      <a:tailEnd type="none" w="med" len="med"/>
+                    </a:lnR>
+                    <a:lnT w="12700" cap="flat" cmpd="sng" algn="ctr">
+                      <a:noFill/>
+                      <a:prstDash val="solid"/>
+                      <a:round/>
+                      <a:headEnd type="none" w="med" len="med"/>
+                      <a:tailEnd type="none" w="med" len="med"/>
+                    </a:lnT>
+                    <a:lnB w="3175" cap="flat" cmpd="sng" algn="ctr">
+                      <a:solidFill>
+                        <a:schemeClr val="tx1"/>
+                      </a:solidFill>
+                      <a:prstDash val="solid"/>
+                      <a:round/>
+                      <a:headEnd type="none" w="med" len="med"/>
+                      <a:tailEnd type="none" w="med" len="med"/>
+                    </a:lnB>
+                    <a:noFill/>
+                  </a:tcPr>
+                </a:tc>
+                <a:tc>
+                  <a:txBody>
+                    <a:bodyPr/>
+                    <a:lstStyle/>
+                    <a:p>
+                      <a:endParaRPr kumimoji="1" lang="ja-JP" altLang="en-US" sz="100" dirty="0"/>
+                    </a:p>
+                  </a:txBody>
+                  <a:tcPr>
+                    <a:lnL w="3175" cap="flat" cmpd="sng" algn="ctr">
+                      <a:solidFill>
+                        <a:schemeClr val="tx1"/>
+                      </a:solidFill>
+                      <a:prstDash val="solid"/>
+                      <a:round/>
+                      <a:headEnd type="none" w="med" len="med"/>
+                      <a:tailEnd type="none" w="med" len="med"/>
+                    </a:lnL>
+                    <a:lnR w="3175" cap="flat" cmpd="sng" algn="ctr">
+                      <a:solidFill>
+                        <a:schemeClr val="tx1"/>
+                      </a:solidFill>
+                      <a:prstDash val="solid"/>
+                      <a:round/>
+                      <a:headEnd type="none" w="med" len="med"/>
+                      <a:tailEnd type="none" w="med" len="med"/>
+                    </a:lnR>
+                    <a:lnT w="12700" cap="flat" cmpd="sng" algn="ctr">
+                      <a:noFill/>
+                      <a:prstDash val="solid"/>
+                      <a:round/>
+                      <a:headEnd type="none" w="med" len="med"/>
+                      <a:tailEnd type="none" w="med" len="med"/>
+                    </a:lnT>
+                    <a:lnB w="3175" cap="flat" cmpd="sng" algn="ctr">
+                      <a:solidFill>
+                        <a:schemeClr val="tx1"/>
+                      </a:solidFill>
+                      <a:prstDash val="solid"/>
+                      <a:round/>
+                      <a:headEnd type="none" w="med" len="med"/>
+                      <a:tailEnd type="none" w="med" len="med"/>
+                    </a:lnB>
+                    <a:noFill/>
+                  </a:tcPr>
+                </a:tc>
+                <a:tc>
+                  <a:txBody>
+                    <a:bodyPr/>
+                    <a:lstStyle/>
+                    <a:p>
+                      <a:endParaRPr kumimoji="1" lang="ja-JP" altLang="en-US" sz="100" dirty="0"/>
+                    </a:p>
+                  </a:txBody>
+                  <a:tcPr>
+                    <a:lnL w="3175" cap="flat" cmpd="sng" algn="ctr">
+                      <a:solidFill>
+                        <a:schemeClr val="tx1"/>
+                      </a:solidFill>
+                      <a:prstDash val="solid"/>
+                      <a:round/>
+                      <a:headEnd type="none" w="med" len="med"/>
+                      <a:tailEnd type="none" w="med" len="med"/>
+                    </a:lnL>
+                    <a:lnR w="3175" cap="flat" cmpd="sng" algn="ctr">
+                      <a:solidFill>
+                        <a:schemeClr val="tx1"/>
+                      </a:solidFill>
+                      <a:prstDash val="solid"/>
+                      <a:round/>
+                      <a:headEnd type="none" w="med" len="med"/>
+                      <a:tailEnd type="none" w="med" len="med"/>
+                    </a:lnR>
+                    <a:lnT w="12700" cap="flat" cmpd="sng" algn="ctr">
+                      <a:noFill/>
+                      <a:prstDash val="solid"/>
+                      <a:round/>
+                      <a:headEnd type="none" w="med" len="med"/>
+                      <a:tailEnd type="none" w="med" len="med"/>
+                    </a:lnT>
+                    <a:lnB w="3175" cap="flat" cmpd="sng" algn="ctr">
+                      <a:solidFill>
+                        <a:schemeClr val="tx1"/>
+                      </a:solidFill>
+                      <a:prstDash val="solid"/>
+                      <a:round/>
+                      <a:headEnd type="none" w="med" len="med"/>
+                      <a:tailEnd type="none" w="med" len="med"/>
+                    </a:lnB>
+                    <a:noFill/>
+                  </a:tcPr>
+                </a:tc>
+                <a:tc>
+                  <a:txBody>
+                    <a:bodyPr/>
+                    <a:lstStyle/>
+                    <a:p>
+                      <a:endParaRPr kumimoji="1" lang="ja-JP" altLang="en-US" sz="100" dirty="0"/>
+                    </a:p>
+                  </a:txBody>
+                  <a:tcPr>
+                    <a:lnL w="3175" cap="flat" cmpd="sng" algn="ctr">
+                      <a:solidFill>
+                        <a:schemeClr val="tx1"/>
+                      </a:solidFill>
+                      <a:prstDash val="solid"/>
+                      <a:round/>
+                      <a:headEnd type="none" w="med" len="med"/>
+                      <a:tailEnd type="none" w="med" len="med"/>
+                    </a:lnL>
+                    <a:lnR w="3175" cap="flat" cmpd="sng" algn="ctr">
+                      <a:solidFill>
+                        <a:schemeClr val="tx1"/>
+                      </a:solidFill>
+                      <a:prstDash val="solid"/>
+                      <a:round/>
+                      <a:headEnd type="none" w="med" len="med"/>
+                      <a:tailEnd type="none" w="med" len="med"/>
+                    </a:lnR>
+                    <a:lnT w="12700" cap="flat" cmpd="sng" algn="ctr">
+                      <a:noFill/>
+                      <a:prstDash val="solid"/>
+                      <a:round/>
+                      <a:headEnd type="none" w="med" len="med"/>
+                      <a:tailEnd type="none" w="med" len="med"/>
+                    </a:lnT>
+                    <a:lnB w="3175" cap="flat" cmpd="sng" algn="ctr">
+                      <a:solidFill>
+                        <a:schemeClr val="tx1"/>
+                      </a:solidFill>
+                      <a:prstDash val="solid"/>
+                      <a:round/>
+                      <a:headEnd type="none" w="med" len="med"/>
+                      <a:tailEnd type="none" w="med" len="med"/>
+                    </a:lnB>
+                    <a:noFill/>
+                  </a:tcPr>
+                </a:tc>
+                <a:tc>
+                  <a:txBody>
+                    <a:bodyPr/>
+                    <a:lstStyle/>
+                    <a:p>
+                      <a:endParaRPr kumimoji="1" lang="ja-JP" altLang="en-US" sz="100" dirty="0"/>
+                    </a:p>
+                  </a:txBody>
+                  <a:tcPr>
+                    <a:lnL w="3175" cap="flat" cmpd="sng" algn="ctr">
+                      <a:solidFill>
+                        <a:schemeClr val="tx1"/>
+                      </a:solidFill>
+                      <a:prstDash val="solid"/>
+                      <a:round/>
+                      <a:headEnd type="none" w="med" len="med"/>
+                      <a:tailEnd type="none" w="med" len="med"/>
+                    </a:lnL>
+                    <a:lnR w="12700" cap="flat" cmpd="sng" algn="ctr">
+                      <a:noFill/>
+                      <a:prstDash val="solid"/>
+                      <a:round/>
+                      <a:headEnd type="none" w="med" len="med"/>
+                      <a:tailEnd type="none" w="med" len="med"/>
+                    </a:lnR>
+                    <a:lnT w="12700" cap="flat" cmpd="sng" algn="ctr">
+                      <a:noFill/>
+                      <a:prstDash val="solid"/>
+                      <a:round/>
+                      <a:headEnd type="none" w="med" len="med"/>
+                      <a:tailEnd type="none" w="med" len="med"/>
+                    </a:lnT>
+                    <a:lnB w="3175" cap="flat" cmpd="sng" algn="ctr">
+                      <a:solidFill>
+                        <a:schemeClr val="tx1"/>
+                      </a:solidFill>
+                      <a:prstDash val="solid"/>
+                      <a:round/>
+                      <a:headEnd type="none" w="med" len="med"/>
+                      <a:tailEnd type="none" w="med" len="med"/>
+                    </a:lnB>
+                    <a:noFill/>
+                  </a:tcPr>
+                </a:tc>
+                <a:extLst>
+                  <a:ext uri="{0D108BD9-81ED-4DB2-BD59-A6C34878D82A}">
+                    <a16:rowId xmlns:a16="http://schemas.microsoft.com/office/drawing/2014/main" val="3969907977"/>
+                  </a:ext>
+                </a:extLst>
+              </a:tr>
+              <a:tr h="221552">
+                <a:tc>
+                  <a:txBody>
+                    <a:bodyPr/>
+                    <a:lstStyle/>
+                    <a:p>
+                      <a:endParaRPr kumimoji="1" lang="ja-JP" altLang="en-US" sz="100" dirty="0"/>
+                    </a:p>
+                  </a:txBody>
+                  <a:tcPr>
+                    <a:lnL w="12700" cap="flat" cmpd="sng" algn="ctr">
+                      <a:noFill/>
+                      <a:prstDash val="solid"/>
+                      <a:round/>
+                      <a:headEnd type="none" w="med" len="med"/>
+                      <a:tailEnd type="none" w="med" len="med"/>
+                    </a:lnL>
+                    <a:lnR w="3175" cap="flat" cmpd="sng" algn="ctr">
+                      <a:solidFill>
+                        <a:schemeClr val="tx1"/>
+                      </a:solidFill>
+                      <a:prstDash val="solid"/>
+                      <a:round/>
+                      <a:headEnd type="none" w="med" len="med"/>
+                      <a:tailEnd type="none" w="med" len="med"/>
+                    </a:lnR>
+                    <a:lnT w="3175" cap="flat" cmpd="sng" algn="ctr">
+                      <a:solidFill>
+                        <a:schemeClr val="tx1"/>
+                      </a:solidFill>
+                      <a:prstDash val="solid"/>
+                      <a:round/>
+                      <a:headEnd type="none" w="med" len="med"/>
+                      <a:tailEnd type="none" w="med" len="med"/>
+                    </a:lnT>
+                    <a:lnB w="3175" cap="flat" cmpd="sng" algn="ctr">
+                      <a:solidFill>
+                        <a:schemeClr val="tx1"/>
+                      </a:solidFill>
+                      <a:prstDash val="solid"/>
+                      <a:round/>
+                      <a:headEnd type="none" w="med" len="med"/>
+                      <a:tailEnd type="none" w="med" len="med"/>
+                    </a:lnB>
+                    <a:noFill/>
+                  </a:tcPr>
+                </a:tc>
+                <a:tc>
+                  <a:txBody>
+                    <a:bodyPr/>
+                    <a:lstStyle/>
+                    <a:p>
+                      <a:endParaRPr kumimoji="1" lang="ja-JP" altLang="en-US" sz="100"/>
+                    </a:p>
+                  </a:txBody>
+                  <a:tcPr>
+                    <a:lnL w="3175" cap="flat" cmpd="sng" algn="ctr">
+                      <a:solidFill>
+                        <a:schemeClr val="tx1"/>
+                      </a:solidFill>
+                      <a:prstDash val="solid"/>
+                      <a:round/>
+                      <a:headEnd type="none" w="med" len="med"/>
+                      <a:tailEnd type="none" w="med" len="med"/>
+                    </a:lnL>
+                    <a:lnR w="3175" cap="flat" cmpd="sng" algn="ctr">
+                      <a:solidFill>
+                        <a:schemeClr val="tx1"/>
+                      </a:solidFill>
+                      <a:prstDash val="solid"/>
+                      <a:round/>
+                      <a:headEnd type="none" w="med" len="med"/>
+                      <a:tailEnd type="none" w="med" len="med"/>
+                    </a:lnR>
+                    <a:lnT w="3175" cap="flat" cmpd="sng" algn="ctr">
+                      <a:solidFill>
+                        <a:schemeClr val="tx1"/>
+                      </a:solidFill>
+                      <a:prstDash val="solid"/>
+                      <a:round/>
+                      <a:headEnd type="none" w="med" len="med"/>
+                      <a:tailEnd type="none" w="med" len="med"/>
+                    </a:lnT>
+                    <a:lnB w="3175" cap="flat" cmpd="sng" algn="ctr">
+                      <a:solidFill>
+                        <a:schemeClr val="tx1"/>
+                      </a:solidFill>
+                      <a:prstDash val="solid"/>
+                      <a:round/>
+                      <a:headEnd type="none" w="med" len="med"/>
+                      <a:tailEnd type="none" w="med" len="med"/>
+                    </a:lnB>
+                    <a:noFill/>
+                  </a:tcPr>
+                </a:tc>
+                <a:tc>
+                  <a:txBody>
+                    <a:bodyPr/>
+                    <a:lstStyle/>
+                    <a:p>
+                      <a:endParaRPr kumimoji="1" lang="ja-JP" altLang="en-US" sz="100"/>
+                    </a:p>
+                  </a:txBody>
+                  <a:tcPr>
+                    <a:lnL w="3175" cap="flat" cmpd="sng" algn="ctr">
+                      <a:solidFill>
+                        <a:schemeClr val="tx1"/>
+                      </a:solidFill>
+                      <a:prstDash val="solid"/>
+                      <a:round/>
+                      <a:headEnd type="none" w="med" len="med"/>
+                      <a:tailEnd type="none" w="med" len="med"/>
+                    </a:lnL>
+                    <a:lnR w="3175" cap="flat" cmpd="sng" algn="ctr">
+                      <a:solidFill>
+                        <a:schemeClr val="tx1"/>
+                      </a:solidFill>
+                      <a:prstDash val="solid"/>
+                      <a:round/>
+                      <a:headEnd type="none" w="med" len="med"/>
+                      <a:tailEnd type="none" w="med" len="med"/>
+                    </a:lnR>
+                    <a:lnT w="3175" cap="flat" cmpd="sng" algn="ctr">
+                      <a:solidFill>
+                        <a:schemeClr val="tx1"/>
+                      </a:solidFill>
+                      <a:prstDash val="solid"/>
+                      <a:round/>
+                      <a:headEnd type="none" w="med" len="med"/>
+                      <a:tailEnd type="none" w="med" len="med"/>
+                    </a:lnT>
+                    <a:lnB w="3175" cap="flat" cmpd="sng" algn="ctr">
+                      <a:solidFill>
+                        <a:schemeClr val="tx1"/>
+                      </a:solidFill>
+                      <a:prstDash val="solid"/>
+                      <a:round/>
+                      <a:headEnd type="none" w="med" len="med"/>
+                      <a:tailEnd type="none" w="med" len="med"/>
+                    </a:lnB>
+                    <a:noFill/>
+                  </a:tcPr>
+                </a:tc>
+                <a:tc>
+                  <a:txBody>
+                    <a:bodyPr/>
+                    <a:lstStyle/>
+                    <a:p>
+                      <a:endParaRPr kumimoji="1" lang="ja-JP" altLang="en-US" sz="100" dirty="0"/>
+                    </a:p>
+                  </a:txBody>
+                  <a:tcPr>
+                    <a:lnL w="3175" cap="flat" cmpd="sng" algn="ctr">
+                      <a:solidFill>
+                        <a:schemeClr val="tx1"/>
+                      </a:solidFill>
+                      <a:prstDash val="solid"/>
+                      <a:round/>
+                      <a:headEnd type="none" w="med" len="med"/>
+                      <a:tailEnd type="none" w="med" len="med"/>
+                    </a:lnL>
+                    <a:lnR w="3175" cap="flat" cmpd="sng" algn="ctr">
+                      <a:solidFill>
+                        <a:schemeClr val="tx1"/>
+                      </a:solidFill>
+                      <a:prstDash val="solid"/>
+                      <a:round/>
+                      <a:headEnd type="none" w="med" len="med"/>
+                      <a:tailEnd type="none" w="med" len="med"/>
+                    </a:lnR>
+                    <a:lnT w="3175" cap="flat" cmpd="sng" algn="ctr">
+                      <a:solidFill>
+                        <a:schemeClr val="tx1"/>
+                      </a:solidFill>
+                      <a:prstDash val="solid"/>
+                      <a:round/>
+                      <a:headEnd type="none" w="med" len="med"/>
+                      <a:tailEnd type="none" w="med" len="med"/>
+                    </a:lnT>
+                    <a:lnB w="3175" cap="flat" cmpd="sng" algn="ctr">
+                      <a:solidFill>
+                        <a:schemeClr val="tx1"/>
+                      </a:solidFill>
+                      <a:prstDash val="solid"/>
+                      <a:round/>
+                      <a:headEnd type="none" w="med" len="med"/>
+                      <a:tailEnd type="none" w="med" len="med"/>
+                    </a:lnB>
+                    <a:noFill/>
+                  </a:tcPr>
+                </a:tc>
+                <a:tc>
+                  <a:txBody>
+                    <a:bodyPr/>
+                    <a:lstStyle/>
+                    <a:p>
+                      <a:endParaRPr kumimoji="1" lang="ja-JP" altLang="en-US" sz="100" dirty="0"/>
+                    </a:p>
+                  </a:txBody>
+                  <a:tcPr>
+                    <a:lnL w="3175" cap="flat" cmpd="sng" algn="ctr">
+                      <a:solidFill>
+                        <a:schemeClr val="tx1"/>
+                      </a:solidFill>
+                      <a:prstDash val="solid"/>
+                      <a:round/>
+                      <a:headEnd type="none" w="med" len="med"/>
+                      <a:tailEnd type="none" w="med" len="med"/>
+                    </a:lnL>
+                    <a:lnR w="12700" cap="flat" cmpd="sng" algn="ctr">
+                      <a:noFill/>
+                      <a:prstDash val="solid"/>
+                      <a:round/>
+                      <a:headEnd type="none" w="med" len="med"/>
+                      <a:tailEnd type="none" w="med" len="med"/>
+                    </a:lnR>
+                    <a:lnT w="3175" cap="flat" cmpd="sng" algn="ctr">
+                      <a:solidFill>
+                        <a:schemeClr val="tx1"/>
+                      </a:solidFill>
+                      <a:prstDash val="solid"/>
+                      <a:round/>
+                      <a:headEnd type="none" w="med" len="med"/>
+                      <a:tailEnd type="none" w="med" len="med"/>
+                    </a:lnT>
+                    <a:lnB w="3175" cap="flat" cmpd="sng" algn="ctr">
+                      <a:solidFill>
+                        <a:schemeClr val="tx1"/>
+                      </a:solidFill>
+                      <a:prstDash val="solid"/>
+                      <a:round/>
+                      <a:headEnd type="none" w="med" len="med"/>
+                      <a:tailEnd type="none" w="med" len="med"/>
+                    </a:lnB>
+                    <a:noFill/>
+                  </a:tcPr>
+                </a:tc>
+                <a:extLst>
+                  <a:ext uri="{0D108BD9-81ED-4DB2-BD59-A6C34878D82A}">
+                    <a16:rowId xmlns:a16="http://schemas.microsoft.com/office/drawing/2014/main" val="817482587"/>
+                  </a:ext>
+                </a:extLst>
+              </a:tr>
+              <a:tr h="221552">
+                <a:tc>
+                  <a:txBody>
+                    <a:bodyPr/>
+                    <a:lstStyle/>
+                    <a:p>
+                      <a:endParaRPr kumimoji="1" lang="ja-JP" altLang="en-US" sz="100" dirty="0"/>
+                    </a:p>
+                  </a:txBody>
+                  <a:tcPr>
+                    <a:lnL w="12700" cap="flat" cmpd="sng" algn="ctr">
+                      <a:noFill/>
+                      <a:prstDash val="solid"/>
+                      <a:round/>
+                      <a:headEnd type="none" w="med" len="med"/>
+                      <a:tailEnd type="none" w="med" len="med"/>
+                    </a:lnL>
+                    <a:lnR w="3175" cap="flat" cmpd="sng" algn="ctr">
+                      <a:solidFill>
+                        <a:schemeClr val="tx1"/>
+                      </a:solidFill>
+                      <a:prstDash val="solid"/>
+                      <a:round/>
+                      <a:headEnd type="none" w="med" len="med"/>
+                      <a:tailEnd type="none" w="med" len="med"/>
+                    </a:lnR>
+                    <a:lnT w="3175" cap="flat" cmpd="sng" algn="ctr">
+                      <a:solidFill>
+                        <a:schemeClr val="tx1"/>
+                      </a:solidFill>
+                      <a:prstDash val="solid"/>
+                      <a:round/>
+                      <a:headEnd type="none" w="med" len="med"/>
+                      <a:tailEnd type="none" w="med" len="med"/>
+                    </a:lnT>
+                    <a:lnB w="3175" cap="flat" cmpd="sng" algn="ctr">
+                      <a:solidFill>
+                        <a:schemeClr val="tx1"/>
+                      </a:solidFill>
+                      <a:prstDash val="solid"/>
+                      <a:round/>
+                      <a:headEnd type="none" w="med" len="med"/>
+                      <a:tailEnd type="none" w="med" len="med"/>
+                    </a:lnB>
+                    <a:noFill/>
+                  </a:tcPr>
+                </a:tc>
+                <a:tc>
+                  <a:txBody>
+                    <a:bodyPr/>
+                    <a:lstStyle/>
+                    <a:p>
+                      <a:endParaRPr kumimoji="1" lang="ja-JP" altLang="en-US" sz="100" dirty="0"/>
+                    </a:p>
+                  </a:txBody>
+                  <a:tcPr>
+                    <a:lnL w="3175" cap="flat" cmpd="sng" algn="ctr">
+                      <a:solidFill>
+                        <a:schemeClr val="tx1"/>
+                      </a:solidFill>
+                      <a:prstDash val="solid"/>
+                      <a:round/>
+                      <a:headEnd type="none" w="med" len="med"/>
+                      <a:tailEnd type="none" w="med" len="med"/>
+                    </a:lnL>
+                    <a:lnR w="3175" cap="flat" cmpd="sng" algn="ctr">
+                      <a:solidFill>
+                        <a:schemeClr val="tx1"/>
+                      </a:solidFill>
+                      <a:prstDash val="solid"/>
+                      <a:round/>
+                      <a:headEnd type="none" w="med" len="med"/>
+                      <a:tailEnd type="none" w="med" len="med"/>
+                    </a:lnR>
+                    <a:lnT w="3175" cap="flat" cmpd="sng" algn="ctr">
+                      <a:solidFill>
+                        <a:schemeClr val="tx1"/>
+                      </a:solidFill>
+                      <a:prstDash val="solid"/>
+                      <a:round/>
+                      <a:headEnd type="none" w="med" len="med"/>
+                      <a:tailEnd type="none" w="med" len="med"/>
+                    </a:lnT>
+                    <a:lnB w="3175" cap="flat" cmpd="sng" algn="ctr">
+                      <a:solidFill>
+                        <a:schemeClr val="tx1"/>
+                      </a:solidFill>
+                      <a:prstDash val="solid"/>
+                      <a:round/>
+                      <a:headEnd type="none" w="med" len="med"/>
+                      <a:tailEnd type="none" w="med" len="med"/>
+                    </a:lnB>
+                    <a:noFill/>
+                  </a:tcPr>
+                </a:tc>
+                <a:tc>
+                  <a:txBody>
+                    <a:bodyPr/>
+                    <a:lstStyle/>
+                    <a:p>
+                      <a:endParaRPr kumimoji="1" lang="ja-JP" altLang="en-US" sz="100"/>
+                    </a:p>
+                  </a:txBody>
+                  <a:tcPr>
+                    <a:lnL w="3175" cap="flat" cmpd="sng" algn="ctr">
+                      <a:solidFill>
+                        <a:schemeClr val="tx1"/>
+                      </a:solidFill>
+                      <a:prstDash val="solid"/>
+                      <a:round/>
+                      <a:headEnd type="none" w="med" len="med"/>
+                      <a:tailEnd type="none" w="med" len="med"/>
+                    </a:lnL>
+                    <a:lnR w="3175" cap="flat" cmpd="sng" algn="ctr">
+                      <a:solidFill>
+                        <a:schemeClr val="tx1"/>
+                      </a:solidFill>
+                      <a:prstDash val="solid"/>
+                      <a:round/>
+                      <a:headEnd type="none" w="med" len="med"/>
+                      <a:tailEnd type="none" w="med" len="med"/>
+                    </a:lnR>
+                    <a:lnT w="3175" cap="flat" cmpd="sng" algn="ctr">
+                      <a:solidFill>
+                        <a:schemeClr val="tx1"/>
+                      </a:solidFill>
+                      <a:prstDash val="solid"/>
+                      <a:round/>
+                      <a:headEnd type="none" w="med" len="med"/>
+                      <a:tailEnd type="none" w="med" len="med"/>
+                    </a:lnT>
+                    <a:lnB w="3175" cap="flat" cmpd="sng" algn="ctr">
+                      <a:solidFill>
+                        <a:schemeClr val="tx1"/>
+                      </a:solidFill>
+                      <a:prstDash val="solid"/>
+                      <a:round/>
+                      <a:headEnd type="none" w="med" len="med"/>
+                      <a:tailEnd type="none" w="med" len="med"/>
+                    </a:lnB>
+                    <a:noFill/>
+                  </a:tcPr>
+                </a:tc>
+                <a:tc>
+                  <a:txBody>
+                    <a:bodyPr/>
+                    <a:lstStyle/>
+                    <a:p>
+                      <a:endParaRPr kumimoji="1" lang="ja-JP" altLang="en-US" sz="100" dirty="0"/>
+                    </a:p>
+                  </a:txBody>
+                  <a:tcPr>
+                    <a:lnL w="3175" cap="flat" cmpd="sng" algn="ctr">
+                      <a:solidFill>
+                        <a:schemeClr val="tx1"/>
+                      </a:solidFill>
+                      <a:prstDash val="solid"/>
+                      <a:round/>
+                      <a:headEnd type="none" w="med" len="med"/>
+                      <a:tailEnd type="none" w="med" len="med"/>
+                    </a:lnL>
+                    <a:lnR w="3175" cap="flat" cmpd="sng" algn="ctr">
+                      <a:solidFill>
+                        <a:schemeClr val="tx1"/>
+                      </a:solidFill>
+                      <a:prstDash val="solid"/>
+                      <a:round/>
+                      <a:headEnd type="none" w="med" len="med"/>
+                      <a:tailEnd type="none" w="med" len="med"/>
+                    </a:lnR>
+                    <a:lnT w="3175" cap="flat" cmpd="sng" algn="ctr">
+                      <a:solidFill>
+                        <a:schemeClr val="tx1"/>
+                      </a:solidFill>
+                      <a:prstDash val="solid"/>
+                      <a:round/>
+                      <a:headEnd type="none" w="med" len="med"/>
+                      <a:tailEnd type="none" w="med" len="med"/>
+                    </a:lnT>
+                    <a:lnB w="3175" cap="flat" cmpd="sng" algn="ctr">
+                      <a:solidFill>
+                        <a:schemeClr val="tx1"/>
+                      </a:solidFill>
+                      <a:prstDash val="solid"/>
+                      <a:round/>
+                      <a:headEnd type="none" w="med" len="med"/>
+                      <a:tailEnd type="none" w="med" len="med"/>
+                    </a:lnB>
+                    <a:noFill/>
+                  </a:tcPr>
+                </a:tc>
+                <a:tc>
+                  <a:txBody>
+                    <a:bodyPr/>
+                    <a:lstStyle/>
+                    <a:p>
+                      <a:endParaRPr kumimoji="1" lang="ja-JP" altLang="en-US" sz="100" dirty="0"/>
+                    </a:p>
+                  </a:txBody>
+                  <a:tcPr>
+                    <a:lnL w="3175" cap="flat" cmpd="sng" algn="ctr">
+                      <a:solidFill>
+                        <a:schemeClr val="tx1"/>
+                      </a:solidFill>
+                      <a:prstDash val="solid"/>
+                      <a:round/>
+                      <a:headEnd type="none" w="med" len="med"/>
+                      <a:tailEnd type="none" w="med" len="med"/>
+                    </a:lnL>
+                    <a:lnR w="12700" cap="flat" cmpd="sng" algn="ctr">
+                      <a:noFill/>
+                      <a:prstDash val="solid"/>
+                      <a:round/>
+                      <a:headEnd type="none" w="med" len="med"/>
+                      <a:tailEnd type="none" w="med" len="med"/>
+                    </a:lnR>
+                    <a:lnT w="3175" cap="flat" cmpd="sng" algn="ctr">
+                      <a:solidFill>
+                        <a:schemeClr val="tx1"/>
+                      </a:solidFill>
+                      <a:prstDash val="solid"/>
+                      <a:round/>
+                      <a:headEnd type="none" w="med" len="med"/>
+                      <a:tailEnd type="none" w="med" len="med"/>
+                    </a:lnT>
+                    <a:lnB w="3175" cap="flat" cmpd="sng" algn="ctr">
+                      <a:solidFill>
+                        <a:schemeClr val="tx1"/>
+                      </a:solidFill>
+                      <a:prstDash val="solid"/>
+                      <a:round/>
+                      <a:headEnd type="none" w="med" len="med"/>
+                      <a:tailEnd type="none" w="med" len="med"/>
+                    </a:lnB>
+                    <a:noFill/>
+                  </a:tcPr>
+                </a:tc>
+                <a:extLst>
+                  <a:ext uri="{0D108BD9-81ED-4DB2-BD59-A6C34878D82A}">
+                    <a16:rowId xmlns:a16="http://schemas.microsoft.com/office/drawing/2014/main" val="2390617198"/>
+                  </a:ext>
+                </a:extLst>
+              </a:tr>
+              <a:tr h="221552">
+                <a:tc>
+                  <a:txBody>
+                    <a:bodyPr/>
+                    <a:lstStyle/>
+                    <a:p>
+                      <a:endParaRPr kumimoji="1" lang="ja-JP" altLang="en-US" sz="100" dirty="0"/>
+                    </a:p>
+                  </a:txBody>
+                  <a:tcPr>
+                    <a:lnL w="12700" cap="flat" cmpd="sng" algn="ctr">
+                      <a:noFill/>
+                      <a:prstDash val="solid"/>
+                      <a:round/>
+                      <a:headEnd type="none" w="med" len="med"/>
+                      <a:tailEnd type="none" w="med" len="med"/>
+                    </a:lnL>
+                    <a:lnR w="3175" cap="flat" cmpd="sng" algn="ctr">
+                      <a:solidFill>
+                        <a:schemeClr val="tx1"/>
+                      </a:solidFill>
+                      <a:prstDash val="solid"/>
+                      <a:round/>
+                      <a:headEnd type="none" w="med" len="med"/>
+                      <a:tailEnd type="none" w="med" len="med"/>
+                    </a:lnR>
+                    <a:lnT w="3175" cap="flat" cmpd="sng" algn="ctr">
+                      <a:solidFill>
+                        <a:schemeClr val="tx1"/>
+                      </a:solidFill>
+                      <a:prstDash val="solid"/>
+                      <a:round/>
+                      <a:headEnd type="none" w="med" len="med"/>
+                      <a:tailEnd type="none" w="med" len="med"/>
+                    </a:lnT>
+                    <a:lnB w="3175" cap="flat" cmpd="sng" algn="ctr">
+                      <a:solidFill>
+                        <a:schemeClr val="tx1"/>
+                      </a:solidFill>
+                      <a:prstDash val="solid"/>
+                      <a:round/>
+                      <a:headEnd type="none" w="med" len="med"/>
+                      <a:tailEnd type="none" w="med" len="med"/>
+                    </a:lnB>
+                    <a:noFill/>
+                  </a:tcPr>
+                </a:tc>
+                <a:tc>
+                  <a:txBody>
+                    <a:bodyPr/>
+                    <a:lstStyle/>
+                    <a:p>
+                      <a:endParaRPr kumimoji="1" lang="ja-JP" altLang="en-US" sz="100"/>
+                    </a:p>
+                  </a:txBody>
+                  <a:tcPr>
+                    <a:lnL w="3175" cap="flat" cmpd="sng" algn="ctr">
+                      <a:solidFill>
+                        <a:schemeClr val="tx1"/>
+                      </a:solidFill>
+                      <a:prstDash val="solid"/>
+                      <a:round/>
+                      <a:headEnd type="none" w="med" len="med"/>
+                      <a:tailEnd type="none" w="med" len="med"/>
+                    </a:lnL>
+                    <a:lnR w="3175" cap="flat" cmpd="sng" algn="ctr">
+                      <a:solidFill>
+                        <a:schemeClr val="tx1"/>
+                      </a:solidFill>
+                      <a:prstDash val="solid"/>
+                      <a:round/>
+                      <a:headEnd type="none" w="med" len="med"/>
+                      <a:tailEnd type="none" w="med" len="med"/>
+                    </a:lnR>
+                    <a:lnT w="3175" cap="flat" cmpd="sng" algn="ctr">
+                      <a:solidFill>
+                        <a:schemeClr val="tx1"/>
+                      </a:solidFill>
+                      <a:prstDash val="solid"/>
+                      <a:round/>
+                      <a:headEnd type="none" w="med" len="med"/>
+                      <a:tailEnd type="none" w="med" len="med"/>
+                    </a:lnT>
+                    <a:lnB w="3175" cap="flat" cmpd="sng" algn="ctr">
+                      <a:solidFill>
+                        <a:schemeClr val="tx1"/>
+                      </a:solidFill>
+                      <a:prstDash val="solid"/>
+                      <a:round/>
+                      <a:headEnd type="none" w="med" len="med"/>
+                      <a:tailEnd type="none" w="med" len="med"/>
+                    </a:lnB>
+                    <a:noFill/>
+                  </a:tcPr>
+                </a:tc>
+                <a:tc>
+                  <a:txBody>
+                    <a:bodyPr/>
+                    <a:lstStyle/>
+                    <a:p>
+                      <a:endParaRPr kumimoji="1" lang="ja-JP" altLang="en-US" sz="100" dirty="0"/>
+                    </a:p>
+                  </a:txBody>
+                  <a:tcPr>
+                    <a:lnL w="3175" cap="flat" cmpd="sng" algn="ctr">
+                      <a:solidFill>
+                        <a:schemeClr val="tx1"/>
+                      </a:solidFill>
+                      <a:prstDash val="solid"/>
+                      <a:round/>
+                      <a:headEnd type="none" w="med" len="med"/>
+                      <a:tailEnd type="none" w="med" len="med"/>
+                    </a:lnL>
+                    <a:lnR w="3175" cap="flat" cmpd="sng" algn="ctr">
+                      <a:solidFill>
+                        <a:schemeClr val="tx1"/>
+                      </a:solidFill>
+                      <a:prstDash val="solid"/>
+                      <a:round/>
+                      <a:headEnd type="none" w="med" len="med"/>
+                      <a:tailEnd type="none" w="med" len="med"/>
+                    </a:lnR>
+                    <a:lnT w="3175" cap="flat" cmpd="sng" algn="ctr">
+                      <a:solidFill>
+                        <a:schemeClr val="tx1"/>
+                      </a:solidFill>
+                      <a:prstDash val="solid"/>
+                      <a:round/>
+                      <a:headEnd type="none" w="med" len="med"/>
+                      <a:tailEnd type="none" w="med" len="med"/>
+                    </a:lnT>
+                    <a:lnB w="3175" cap="flat" cmpd="sng" algn="ctr">
+                      <a:solidFill>
+                        <a:schemeClr val="tx1"/>
+                      </a:solidFill>
+                      <a:prstDash val="solid"/>
+                      <a:round/>
+                      <a:headEnd type="none" w="med" len="med"/>
+                      <a:tailEnd type="none" w="med" len="med"/>
+                    </a:lnB>
+                    <a:noFill/>
+                  </a:tcPr>
+                </a:tc>
+                <a:tc>
+                  <a:txBody>
+                    <a:bodyPr/>
+                    <a:lstStyle/>
+                    <a:p>
+                      <a:endParaRPr kumimoji="1" lang="ja-JP" altLang="en-US" sz="100" dirty="0"/>
+                    </a:p>
+                  </a:txBody>
+                  <a:tcPr>
+                    <a:lnL w="3175" cap="flat" cmpd="sng" algn="ctr">
+                      <a:solidFill>
+                        <a:schemeClr val="tx1"/>
+                      </a:solidFill>
+                      <a:prstDash val="solid"/>
+                      <a:round/>
+                      <a:headEnd type="none" w="med" len="med"/>
+                      <a:tailEnd type="none" w="med" len="med"/>
+                    </a:lnL>
+                    <a:lnR w="3175" cap="flat" cmpd="sng" algn="ctr">
+                      <a:solidFill>
+                        <a:schemeClr val="tx1"/>
+                      </a:solidFill>
+                      <a:prstDash val="solid"/>
+                      <a:round/>
+                      <a:headEnd type="none" w="med" len="med"/>
+                      <a:tailEnd type="none" w="med" len="med"/>
+                    </a:lnR>
+                    <a:lnT w="3175" cap="flat" cmpd="sng" algn="ctr">
+                      <a:solidFill>
+                        <a:schemeClr val="tx1"/>
+                      </a:solidFill>
+                      <a:prstDash val="solid"/>
+                      <a:round/>
+                      <a:headEnd type="none" w="med" len="med"/>
+                      <a:tailEnd type="none" w="med" len="med"/>
+                    </a:lnT>
+                    <a:lnB w="3175" cap="flat" cmpd="sng" algn="ctr">
+                      <a:solidFill>
+                        <a:schemeClr val="tx1"/>
+                      </a:solidFill>
+                      <a:prstDash val="solid"/>
+                      <a:round/>
+                      <a:headEnd type="none" w="med" len="med"/>
+                      <a:tailEnd type="none" w="med" len="med"/>
+                    </a:lnB>
+                    <a:noFill/>
+                  </a:tcPr>
+                </a:tc>
+                <a:tc>
+                  <a:txBody>
+                    <a:bodyPr/>
+                    <a:lstStyle/>
+                    <a:p>
+                      <a:endParaRPr kumimoji="1" lang="ja-JP" altLang="en-US" sz="100" dirty="0"/>
+                    </a:p>
+                  </a:txBody>
+                  <a:tcPr>
+                    <a:lnL w="3175" cap="flat" cmpd="sng" algn="ctr">
+                      <a:solidFill>
+                        <a:schemeClr val="tx1"/>
+                      </a:solidFill>
+                      <a:prstDash val="solid"/>
+                      <a:round/>
+                      <a:headEnd type="none" w="med" len="med"/>
+                      <a:tailEnd type="none" w="med" len="med"/>
+                    </a:lnL>
+                    <a:lnR w="12700" cap="flat" cmpd="sng" algn="ctr">
+                      <a:noFill/>
+                      <a:prstDash val="solid"/>
+                      <a:round/>
+                      <a:headEnd type="none" w="med" len="med"/>
+                      <a:tailEnd type="none" w="med" len="med"/>
+                    </a:lnR>
+                    <a:lnT w="3175" cap="flat" cmpd="sng" algn="ctr">
+                      <a:solidFill>
+                        <a:schemeClr val="tx1"/>
+                      </a:solidFill>
+                      <a:prstDash val="solid"/>
+                      <a:round/>
+                      <a:headEnd type="none" w="med" len="med"/>
+                      <a:tailEnd type="none" w="med" len="med"/>
+                    </a:lnT>
+                    <a:lnB w="3175" cap="flat" cmpd="sng" algn="ctr">
+                      <a:solidFill>
+                        <a:schemeClr val="tx1"/>
+                      </a:solidFill>
+                      <a:prstDash val="solid"/>
+                      <a:round/>
+                      <a:headEnd type="none" w="med" len="med"/>
+                      <a:tailEnd type="none" w="med" len="med"/>
+                    </a:lnB>
+                    <a:noFill/>
+                  </a:tcPr>
+                </a:tc>
+                <a:extLst>
+                  <a:ext uri="{0D108BD9-81ED-4DB2-BD59-A6C34878D82A}">
+                    <a16:rowId xmlns:a16="http://schemas.microsoft.com/office/drawing/2014/main" val="4155880192"/>
+                  </a:ext>
+                </a:extLst>
+              </a:tr>
+              <a:tr h="221552">
+                <a:tc>
+                  <a:txBody>
+                    <a:bodyPr/>
+                    <a:lstStyle/>
+                    <a:p>
+                      <a:endParaRPr kumimoji="1" lang="ja-JP" altLang="en-US" sz="100" dirty="0"/>
+                    </a:p>
+                  </a:txBody>
+                  <a:tcPr>
+                    <a:lnL w="12700" cap="flat" cmpd="sng" algn="ctr">
+                      <a:noFill/>
+                      <a:prstDash val="solid"/>
+                      <a:round/>
+                      <a:headEnd type="none" w="med" len="med"/>
+                      <a:tailEnd type="none" w="med" len="med"/>
+                    </a:lnL>
+                    <a:lnR w="3175" cap="flat" cmpd="sng" algn="ctr">
+                      <a:solidFill>
+                        <a:schemeClr val="tx1"/>
+                      </a:solidFill>
+                      <a:prstDash val="solid"/>
+                      <a:round/>
+                      <a:headEnd type="none" w="med" len="med"/>
+                      <a:tailEnd type="none" w="med" len="med"/>
+                    </a:lnR>
+                    <a:lnT w="3175" cap="flat" cmpd="sng" algn="ctr">
+                      <a:solidFill>
+                        <a:schemeClr val="tx1"/>
+                      </a:solidFill>
+                      <a:prstDash val="solid"/>
+                      <a:round/>
+                      <a:headEnd type="none" w="med" len="med"/>
+                      <a:tailEnd type="none" w="med" len="med"/>
+                    </a:lnT>
+                    <a:lnB w="3175" cap="flat" cmpd="sng" algn="ctr">
+                      <a:solidFill>
+                        <a:schemeClr val="tx1"/>
+                      </a:solidFill>
+                      <a:prstDash val="solid"/>
+                      <a:round/>
+                      <a:headEnd type="none" w="med" len="med"/>
+                      <a:tailEnd type="none" w="med" len="med"/>
+                    </a:lnB>
+                    <a:noFill/>
+                  </a:tcPr>
+                </a:tc>
+                <a:tc>
+                  <a:txBody>
+                    <a:bodyPr/>
+                    <a:lstStyle/>
+                    <a:p>
+                      <a:endParaRPr kumimoji="1" lang="ja-JP" altLang="en-US" sz="100"/>
+                    </a:p>
+                  </a:txBody>
+                  <a:tcPr>
+                    <a:lnL w="3175" cap="flat" cmpd="sng" algn="ctr">
+                      <a:solidFill>
+                        <a:schemeClr val="tx1"/>
+                      </a:solidFill>
+                      <a:prstDash val="solid"/>
+                      <a:round/>
+                      <a:headEnd type="none" w="med" len="med"/>
+                      <a:tailEnd type="none" w="med" len="med"/>
+                    </a:lnL>
+                    <a:lnR w="3175" cap="flat" cmpd="sng" algn="ctr">
+                      <a:solidFill>
+                        <a:schemeClr val="tx1"/>
+                      </a:solidFill>
+                      <a:prstDash val="solid"/>
+                      <a:round/>
+                      <a:headEnd type="none" w="med" len="med"/>
+                      <a:tailEnd type="none" w="med" len="med"/>
+                    </a:lnR>
+                    <a:lnT w="3175" cap="flat" cmpd="sng" algn="ctr">
+                      <a:solidFill>
+                        <a:schemeClr val="tx1"/>
+                      </a:solidFill>
+                      <a:prstDash val="solid"/>
+                      <a:round/>
+                      <a:headEnd type="none" w="med" len="med"/>
+                      <a:tailEnd type="none" w="med" len="med"/>
+                    </a:lnT>
+                    <a:lnB w="3175" cap="flat" cmpd="sng" algn="ctr">
+                      <a:solidFill>
+                        <a:schemeClr val="tx1"/>
+                      </a:solidFill>
+                      <a:prstDash val="solid"/>
+                      <a:round/>
+                      <a:headEnd type="none" w="med" len="med"/>
+                      <a:tailEnd type="none" w="med" len="med"/>
+                    </a:lnB>
+                    <a:noFill/>
+                  </a:tcPr>
+                </a:tc>
+                <a:tc>
+                  <a:txBody>
+                    <a:bodyPr/>
+                    <a:lstStyle/>
+                    <a:p>
+                      <a:endParaRPr kumimoji="1" lang="ja-JP" altLang="en-US" sz="100"/>
+                    </a:p>
+                  </a:txBody>
+                  <a:tcPr>
+                    <a:lnL w="3175" cap="flat" cmpd="sng" algn="ctr">
+                      <a:solidFill>
+                        <a:schemeClr val="tx1"/>
+                      </a:solidFill>
+                      <a:prstDash val="solid"/>
+                      <a:round/>
+                      <a:headEnd type="none" w="med" len="med"/>
+                      <a:tailEnd type="none" w="med" len="med"/>
+                    </a:lnL>
+                    <a:lnR w="3175" cap="flat" cmpd="sng" algn="ctr">
+                      <a:solidFill>
+                        <a:schemeClr val="tx1"/>
+                      </a:solidFill>
+                      <a:prstDash val="solid"/>
+                      <a:round/>
+                      <a:headEnd type="none" w="med" len="med"/>
+                      <a:tailEnd type="none" w="med" len="med"/>
+                    </a:lnR>
+                    <a:lnT w="3175" cap="flat" cmpd="sng" algn="ctr">
+                      <a:solidFill>
+                        <a:schemeClr val="tx1"/>
+                      </a:solidFill>
+                      <a:prstDash val="solid"/>
+                      <a:round/>
+                      <a:headEnd type="none" w="med" len="med"/>
+                      <a:tailEnd type="none" w="med" len="med"/>
+                    </a:lnT>
+                    <a:lnB w="3175" cap="flat" cmpd="sng" algn="ctr">
+                      <a:solidFill>
+                        <a:schemeClr val="tx1"/>
+                      </a:solidFill>
+                      <a:prstDash val="solid"/>
+                      <a:round/>
+                      <a:headEnd type="none" w="med" len="med"/>
+                      <a:tailEnd type="none" w="med" len="med"/>
+                    </a:lnB>
+                    <a:noFill/>
+                  </a:tcPr>
+                </a:tc>
+                <a:tc>
+                  <a:txBody>
+                    <a:bodyPr/>
+                    <a:lstStyle/>
+                    <a:p>
+                      <a:endParaRPr kumimoji="1" lang="ja-JP" altLang="en-US" sz="100" dirty="0"/>
+                    </a:p>
+                  </a:txBody>
+                  <a:tcPr>
+                    <a:lnL w="3175" cap="flat" cmpd="sng" algn="ctr">
+                      <a:solidFill>
+                        <a:schemeClr val="tx1"/>
+                      </a:solidFill>
+                      <a:prstDash val="solid"/>
+                      <a:round/>
+                      <a:headEnd type="none" w="med" len="med"/>
+                      <a:tailEnd type="none" w="med" len="med"/>
+                    </a:lnL>
+                    <a:lnR w="3175" cap="flat" cmpd="sng" algn="ctr">
+                      <a:solidFill>
+                        <a:schemeClr val="tx1"/>
+                      </a:solidFill>
+                      <a:prstDash val="solid"/>
+                      <a:round/>
+                      <a:headEnd type="none" w="med" len="med"/>
+                      <a:tailEnd type="none" w="med" len="med"/>
+                    </a:lnR>
+                    <a:lnT w="3175" cap="flat" cmpd="sng" algn="ctr">
+                      <a:solidFill>
+                        <a:schemeClr val="tx1"/>
+                      </a:solidFill>
+                      <a:prstDash val="solid"/>
+                      <a:round/>
+                      <a:headEnd type="none" w="med" len="med"/>
+                      <a:tailEnd type="none" w="med" len="med"/>
+                    </a:lnT>
+                    <a:lnB w="3175" cap="flat" cmpd="sng" algn="ctr">
+                      <a:solidFill>
+                        <a:schemeClr val="tx1"/>
+                      </a:solidFill>
+                      <a:prstDash val="solid"/>
+                      <a:round/>
+                      <a:headEnd type="none" w="med" len="med"/>
+                      <a:tailEnd type="none" w="med" len="med"/>
+                    </a:lnB>
+                    <a:noFill/>
+                  </a:tcPr>
+                </a:tc>
+                <a:tc>
+                  <a:txBody>
+                    <a:bodyPr/>
+                    <a:lstStyle/>
+                    <a:p>
+                      <a:endParaRPr kumimoji="1" lang="ja-JP" altLang="en-US" sz="100" dirty="0"/>
+                    </a:p>
+                  </a:txBody>
+                  <a:tcPr>
+                    <a:lnL w="3175" cap="flat" cmpd="sng" algn="ctr">
+                      <a:solidFill>
+                        <a:schemeClr val="tx1"/>
+                      </a:solidFill>
+                      <a:prstDash val="solid"/>
+                      <a:round/>
+                      <a:headEnd type="none" w="med" len="med"/>
+                      <a:tailEnd type="none" w="med" len="med"/>
+                    </a:lnL>
+                    <a:lnR w="12700" cap="flat" cmpd="sng" algn="ctr">
+                      <a:noFill/>
+                      <a:prstDash val="solid"/>
+                      <a:round/>
+                      <a:headEnd type="none" w="med" len="med"/>
+                      <a:tailEnd type="none" w="med" len="med"/>
+                    </a:lnR>
+                    <a:lnT w="3175" cap="flat" cmpd="sng" algn="ctr">
+                      <a:solidFill>
+                        <a:schemeClr val="tx1"/>
+                      </a:solidFill>
+                      <a:prstDash val="solid"/>
+                      <a:round/>
+                      <a:headEnd type="none" w="med" len="med"/>
+                      <a:tailEnd type="none" w="med" len="med"/>
+                    </a:lnT>
+                    <a:lnB w="3175" cap="flat" cmpd="sng" algn="ctr">
+                      <a:solidFill>
+                        <a:schemeClr val="tx1"/>
+                      </a:solidFill>
+                      <a:prstDash val="solid"/>
+                      <a:round/>
+                      <a:headEnd type="none" w="med" len="med"/>
+                      <a:tailEnd type="none" w="med" len="med"/>
+                    </a:lnB>
+                    <a:noFill/>
+                  </a:tcPr>
+                </a:tc>
+                <a:extLst>
+                  <a:ext uri="{0D108BD9-81ED-4DB2-BD59-A6C34878D82A}">
+                    <a16:rowId xmlns:a16="http://schemas.microsoft.com/office/drawing/2014/main" val="2956310184"/>
+                  </a:ext>
+                </a:extLst>
+              </a:tr>
+              <a:tr h="221552">
+                <a:tc>
+                  <a:txBody>
+                    <a:bodyPr/>
+                    <a:lstStyle/>
+                    <a:p>
+                      <a:endParaRPr kumimoji="1" lang="ja-JP" altLang="en-US" sz="100" dirty="0"/>
+                    </a:p>
+                  </a:txBody>
+                  <a:tcPr>
+                    <a:lnL w="12700" cap="flat" cmpd="sng" algn="ctr">
+                      <a:noFill/>
+                      <a:prstDash val="solid"/>
+                      <a:round/>
+                      <a:headEnd type="none" w="med" len="med"/>
+                      <a:tailEnd type="none" w="med" len="med"/>
+                    </a:lnL>
+                    <a:lnR w="3175" cap="flat" cmpd="sng" algn="ctr">
+                      <a:solidFill>
+                        <a:schemeClr val="tx1"/>
+                      </a:solidFill>
+                      <a:prstDash val="solid"/>
+                      <a:round/>
+                      <a:headEnd type="none" w="med" len="med"/>
+                      <a:tailEnd type="none" w="med" len="med"/>
+                    </a:lnR>
+                    <a:lnT w="3175" cap="flat" cmpd="sng" algn="ctr">
+                      <a:solidFill>
+                        <a:schemeClr val="tx1"/>
+                      </a:solidFill>
+                      <a:prstDash val="solid"/>
+                      <a:round/>
+                      <a:headEnd type="none" w="med" len="med"/>
+                      <a:tailEnd type="none" w="med" len="med"/>
+                    </a:lnT>
+                    <a:lnB w="3175" cap="flat" cmpd="sng" algn="ctr">
+                      <a:solidFill>
+                        <a:schemeClr val="tx1"/>
+                      </a:solidFill>
+                      <a:prstDash val="solid"/>
+                      <a:round/>
+                      <a:headEnd type="none" w="med" len="med"/>
+                      <a:tailEnd type="none" w="med" len="med"/>
+                    </a:lnB>
+                    <a:noFill/>
+                  </a:tcPr>
+                </a:tc>
+                <a:tc>
+                  <a:txBody>
+                    <a:bodyPr/>
+                    <a:lstStyle/>
+                    <a:p>
+                      <a:endParaRPr kumimoji="1" lang="ja-JP" altLang="en-US" sz="100"/>
+                    </a:p>
+                  </a:txBody>
+                  <a:tcPr>
+                    <a:lnL w="3175" cap="flat" cmpd="sng" algn="ctr">
+                      <a:solidFill>
+                        <a:schemeClr val="tx1"/>
+                      </a:solidFill>
+                      <a:prstDash val="solid"/>
+                      <a:round/>
+                      <a:headEnd type="none" w="med" len="med"/>
+                      <a:tailEnd type="none" w="med" len="med"/>
+                    </a:lnL>
+                    <a:lnR w="3175" cap="flat" cmpd="sng" algn="ctr">
+                      <a:solidFill>
+                        <a:schemeClr val="tx1"/>
+                      </a:solidFill>
+                      <a:prstDash val="solid"/>
+                      <a:round/>
+                      <a:headEnd type="none" w="med" len="med"/>
+                      <a:tailEnd type="none" w="med" len="med"/>
+                    </a:lnR>
+                    <a:lnT w="3175" cap="flat" cmpd="sng" algn="ctr">
+                      <a:solidFill>
+                        <a:schemeClr val="tx1"/>
+                      </a:solidFill>
+                      <a:prstDash val="solid"/>
+                      <a:round/>
+                      <a:headEnd type="none" w="med" len="med"/>
+                      <a:tailEnd type="none" w="med" len="med"/>
+                    </a:lnT>
+                    <a:lnB w="3175" cap="flat" cmpd="sng" algn="ctr">
+                      <a:solidFill>
+                        <a:schemeClr val="tx1"/>
+                      </a:solidFill>
+                      <a:prstDash val="solid"/>
+                      <a:round/>
+                      <a:headEnd type="none" w="med" len="med"/>
+                      <a:tailEnd type="none" w="med" len="med"/>
+                    </a:lnB>
+                    <a:noFill/>
+                  </a:tcPr>
+                </a:tc>
+                <a:tc>
+                  <a:txBody>
+                    <a:bodyPr/>
+                    <a:lstStyle/>
+                    <a:p>
+                      <a:endParaRPr kumimoji="1" lang="ja-JP" altLang="en-US" sz="100"/>
+                    </a:p>
+                  </a:txBody>
+                  <a:tcPr>
+                    <a:lnL w="3175" cap="flat" cmpd="sng" algn="ctr">
+                      <a:solidFill>
+                        <a:schemeClr val="tx1"/>
+                      </a:solidFill>
+                      <a:prstDash val="solid"/>
+                      <a:round/>
+                      <a:headEnd type="none" w="med" len="med"/>
+                      <a:tailEnd type="none" w="med" len="med"/>
+                    </a:lnL>
+                    <a:lnR w="3175" cap="flat" cmpd="sng" algn="ctr">
+                      <a:solidFill>
+                        <a:schemeClr val="tx1"/>
+                      </a:solidFill>
+                      <a:prstDash val="solid"/>
+                      <a:round/>
+                      <a:headEnd type="none" w="med" len="med"/>
+                      <a:tailEnd type="none" w="med" len="med"/>
+                    </a:lnR>
+                    <a:lnT w="3175" cap="flat" cmpd="sng" algn="ctr">
+                      <a:solidFill>
+                        <a:schemeClr val="tx1"/>
+                      </a:solidFill>
+                      <a:prstDash val="solid"/>
+                      <a:round/>
+                      <a:headEnd type="none" w="med" len="med"/>
+                      <a:tailEnd type="none" w="med" len="med"/>
+                    </a:lnT>
+                    <a:lnB w="3175" cap="flat" cmpd="sng" algn="ctr">
+                      <a:solidFill>
+                        <a:schemeClr val="tx1"/>
+                      </a:solidFill>
+                      <a:prstDash val="solid"/>
+                      <a:round/>
+                      <a:headEnd type="none" w="med" len="med"/>
+                      <a:tailEnd type="none" w="med" len="med"/>
+                    </a:lnB>
+                    <a:noFill/>
+                  </a:tcPr>
+                </a:tc>
+                <a:tc>
+                  <a:txBody>
+                    <a:bodyPr/>
+                    <a:lstStyle/>
+                    <a:p>
+                      <a:endParaRPr kumimoji="1" lang="ja-JP" altLang="en-US" sz="100"/>
+                    </a:p>
+                  </a:txBody>
+                  <a:tcPr>
+                    <a:lnL w="3175" cap="flat" cmpd="sng" algn="ctr">
+                      <a:solidFill>
+                        <a:schemeClr val="tx1"/>
+                      </a:solidFill>
+                      <a:prstDash val="solid"/>
+                      <a:round/>
+                      <a:headEnd type="none" w="med" len="med"/>
+                      <a:tailEnd type="none" w="med" len="med"/>
+                    </a:lnL>
+                    <a:lnR w="3175" cap="flat" cmpd="sng" algn="ctr">
+                      <a:solidFill>
+                        <a:schemeClr val="tx1"/>
+                      </a:solidFill>
+                      <a:prstDash val="solid"/>
+                      <a:round/>
+                      <a:headEnd type="none" w="med" len="med"/>
+                      <a:tailEnd type="none" w="med" len="med"/>
+                    </a:lnR>
+                    <a:lnT w="3175" cap="flat" cmpd="sng" algn="ctr">
+                      <a:solidFill>
+                        <a:schemeClr val="tx1"/>
+                      </a:solidFill>
+                      <a:prstDash val="solid"/>
+                      <a:round/>
+                      <a:headEnd type="none" w="med" len="med"/>
+                      <a:tailEnd type="none" w="med" len="med"/>
+                    </a:lnT>
+                    <a:lnB w="3175" cap="flat" cmpd="sng" algn="ctr">
+                      <a:solidFill>
+                        <a:schemeClr val="tx1"/>
+                      </a:solidFill>
+                      <a:prstDash val="solid"/>
+                      <a:round/>
+                      <a:headEnd type="none" w="med" len="med"/>
+                      <a:tailEnd type="none" w="med" len="med"/>
+                    </a:lnB>
+                    <a:noFill/>
+                  </a:tcPr>
+                </a:tc>
+                <a:tc>
+                  <a:txBody>
+                    <a:bodyPr/>
+                    <a:lstStyle/>
+                    <a:p>
+                      <a:endParaRPr kumimoji="1" lang="ja-JP" altLang="en-US" sz="100"/>
+                    </a:p>
+                  </a:txBody>
+                  <a:tcPr>
+                    <a:lnL w="3175" cap="flat" cmpd="sng" algn="ctr">
+                      <a:solidFill>
+                        <a:schemeClr val="tx1"/>
+                      </a:solidFill>
+                      <a:prstDash val="solid"/>
+                      <a:round/>
+                      <a:headEnd type="none" w="med" len="med"/>
+                      <a:tailEnd type="none" w="med" len="med"/>
+                    </a:lnL>
+                    <a:lnR w="12700" cap="flat" cmpd="sng" algn="ctr">
+                      <a:noFill/>
+                      <a:prstDash val="solid"/>
+                      <a:round/>
+                      <a:headEnd type="none" w="med" len="med"/>
+                      <a:tailEnd type="none" w="med" len="med"/>
+                    </a:lnR>
+                    <a:lnT w="3175" cap="flat" cmpd="sng" algn="ctr">
+                      <a:solidFill>
+                        <a:schemeClr val="tx1"/>
+                      </a:solidFill>
+                      <a:prstDash val="solid"/>
+                      <a:round/>
+                      <a:headEnd type="none" w="med" len="med"/>
+                      <a:tailEnd type="none" w="med" len="med"/>
+                    </a:lnT>
+                    <a:lnB w="3175" cap="flat" cmpd="sng" algn="ctr">
+                      <a:solidFill>
+                        <a:schemeClr val="tx1"/>
+                      </a:solidFill>
+                      <a:prstDash val="solid"/>
+                      <a:round/>
+                      <a:headEnd type="none" w="med" len="med"/>
+                      <a:tailEnd type="none" w="med" len="med"/>
+                    </a:lnB>
+                    <a:noFill/>
+                  </a:tcPr>
+                </a:tc>
+                <a:extLst>
+                  <a:ext uri="{0D108BD9-81ED-4DB2-BD59-A6C34878D82A}">
+                    <a16:rowId xmlns:a16="http://schemas.microsoft.com/office/drawing/2014/main" val="442434528"/>
+                  </a:ext>
+                </a:extLst>
+              </a:tr>
+              <a:tr h="221552">
+                <a:tc>
+                  <a:txBody>
+                    <a:bodyPr/>
+                    <a:lstStyle/>
+                    <a:p>
+                      <a:endParaRPr kumimoji="1" lang="ja-JP" altLang="en-US" sz="100" dirty="0"/>
+                    </a:p>
+                  </a:txBody>
+                  <a:tcPr>
+                    <a:lnL w="12700" cap="flat" cmpd="sng" algn="ctr">
+                      <a:noFill/>
+                      <a:prstDash val="solid"/>
+                      <a:round/>
+                      <a:headEnd type="none" w="med" len="med"/>
+                      <a:tailEnd type="none" w="med" len="med"/>
+                    </a:lnL>
+                    <a:lnR w="3175" cap="flat" cmpd="sng" algn="ctr">
+                      <a:solidFill>
+                        <a:schemeClr val="tx1"/>
+                      </a:solidFill>
+                      <a:prstDash val="solid"/>
+                      <a:round/>
+                      <a:headEnd type="none" w="med" len="med"/>
+                      <a:tailEnd type="none" w="med" len="med"/>
+                    </a:lnR>
+                    <a:lnT w="3175" cap="flat" cmpd="sng" algn="ctr">
+                      <a:solidFill>
+                        <a:schemeClr val="tx1"/>
+                      </a:solidFill>
+                      <a:prstDash val="solid"/>
+                      <a:round/>
+                      <a:headEnd type="none" w="med" len="med"/>
+                      <a:tailEnd type="none" w="med" len="med"/>
+                    </a:lnT>
+                    <a:lnB w="3175" cap="flat" cmpd="sng" algn="ctr">
+                      <a:solidFill>
+                        <a:schemeClr val="tx1"/>
+                      </a:solidFill>
+                      <a:prstDash val="solid"/>
+                      <a:round/>
+                      <a:headEnd type="none" w="med" len="med"/>
+                      <a:tailEnd type="none" w="med" len="med"/>
+                    </a:lnB>
+                    <a:noFill/>
+                  </a:tcPr>
+                </a:tc>
+                <a:tc>
+                  <a:txBody>
+                    <a:bodyPr/>
+                    <a:lstStyle/>
+                    <a:p>
+                      <a:endParaRPr kumimoji="1" lang="ja-JP" altLang="en-US" sz="100"/>
+                    </a:p>
+                  </a:txBody>
+                  <a:tcPr>
+                    <a:lnL w="3175" cap="flat" cmpd="sng" algn="ctr">
+                      <a:solidFill>
+                        <a:schemeClr val="tx1"/>
+                      </a:solidFill>
+                      <a:prstDash val="solid"/>
+                      <a:round/>
+                      <a:headEnd type="none" w="med" len="med"/>
+                      <a:tailEnd type="none" w="med" len="med"/>
+                    </a:lnL>
+                    <a:lnR w="3175" cap="flat" cmpd="sng" algn="ctr">
+                      <a:solidFill>
+                        <a:schemeClr val="tx1"/>
+                      </a:solidFill>
+                      <a:prstDash val="solid"/>
+                      <a:round/>
+                      <a:headEnd type="none" w="med" len="med"/>
+                      <a:tailEnd type="none" w="med" len="med"/>
+                    </a:lnR>
+                    <a:lnT w="3175" cap="flat" cmpd="sng" algn="ctr">
+                      <a:solidFill>
+                        <a:schemeClr val="tx1"/>
+                      </a:solidFill>
+                      <a:prstDash val="solid"/>
+                      <a:round/>
+                      <a:headEnd type="none" w="med" len="med"/>
+                      <a:tailEnd type="none" w="med" len="med"/>
+                    </a:lnT>
+                    <a:lnB w="3175" cap="flat" cmpd="sng" algn="ctr">
+                      <a:solidFill>
+                        <a:schemeClr val="tx1"/>
+                      </a:solidFill>
+                      <a:prstDash val="solid"/>
+                      <a:round/>
+                      <a:headEnd type="none" w="med" len="med"/>
+                      <a:tailEnd type="none" w="med" len="med"/>
+                    </a:lnB>
+                    <a:noFill/>
+                  </a:tcPr>
+                </a:tc>
+                <a:tc>
+                  <a:txBody>
+                    <a:bodyPr/>
+                    <a:lstStyle/>
+                    <a:p>
+                      <a:endParaRPr kumimoji="1" lang="ja-JP" altLang="en-US" sz="100"/>
+                    </a:p>
+                  </a:txBody>
+                  <a:tcPr>
+                    <a:lnL w="3175" cap="flat" cmpd="sng" algn="ctr">
+                      <a:solidFill>
+                        <a:schemeClr val="tx1"/>
+                      </a:solidFill>
+                      <a:prstDash val="solid"/>
+                      <a:round/>
+                      <a:headEnd type="none" w="med" len="med"/>
+                      <a:tailEnd type="none" w="med" len="med"/>
+                    </a:lnL>
+                    <a:lnR w="3175" cap="flat" cmpd="sng" algn="ctr">
+                      <a:solidFill>
+                        <a:schemeClr val="tx1"/>
+                      </a:solidFill>
+                      <a:prstDash val="solid"/>
+                      <a:round/>
+                      <a:headEnd type="none" w="med" len="med"/>
+                      <a:tailEnd type="none" w="med" len="med"/>
+                    </a:lnR>
+                    <a:lnT w="3175" cap="flat" cmpd="sng" algn="ctr">
+                      <a:solidFill>
+                        <a:schemeClr val="tx1"/>
+                      </a:solidFill>
+                      <a:prstDash val="solid"/>
+                      <a:round/>
+                      <a:headEnd type="none" w="med" len="med"/>
+                      <a:tailEnd type="none" w="med" len="med"/>
+                    </a:lnT>
+                    <a:lnB w="3175" cap="flat" cmpd="sng" algn="ctr">
+                      <a:solidFill>
+                        <a:schemeClr val="tx1"/>
+                      </a:solidFill>
+                      <a:prstDash val="solid"/>
+                      <a:round/>
+                      <a:headEnd type="none" w="med" len="med"/>
+                      <a:tailEnd type="none" w="med" len="med"/>
+                    </a:lnB>
+                    <a:noFill/>
+                  </a:tcPr>
+                </a:tc>
+                <a:tc>
+                  <a:txBody>
+                    <a:bodyPr/>
+                    <a:lstStyle/>
+                    <a:p>
+                      <a:endParaRPr kumimoji="1" lang="ja-JP" altLang="en-US" sz="100"/>
+                    </a:p>
+                  </a:txBody>
+                  <a:tcPr>
+                    <a:lnL w="3175" cap="flat" cmpd="sng" algn="ctr">
+                      <a:solidFill>
+                        <a:schemeClr val="tx1"/>
+                      </a:solidFill>
+                      <a:prstDash val="solid"/>
+                      <a:round/>
+                      <a:headEnd type="none" w="med" len="med"/>
+                      <a:tailEnd type="none" w="med" len="med"/>
+                    </a:lnL>
+                    <a:lnR w="3175" cap="flat" cmpd="sng" algn="ctr">
+                      <a:solidFill>
+                        <a:schemeClr val="tx1"/>
+                      </a:solidFill>
+                      <a:prstDash val="solid"/>
+                      <a:round/>
+                      <a:headEnd type="none" w="med" len="med"/>
+                      <a:tailEnd type="none" w="med" len="med"/>
+                    </a:lnR>
+                    <a:lnT w="3175" cap="flat" cmpd="sng" algn="ctr">
+                      <a:solidFill>
+                        <a:schemeClr val="tx1"/>
+                      </a:solidFill>
+                      <a:prstDash val="solid"/>
+                      <a:round/>
+                      <a:headEnd type="none" w="med" len="med"/>
+                      <a:tailEnd type="none" w="med" len="med"/>
+                    </a:lnT>
+                    <a:lnB w="3175" cap="flat" cmpd="sng" algn="ctr">
+                      <a:solidFill>
+                        <a:schemeClr val="tx1"/>
+                      </a:solidFill>
+                      <a:prstDash val="solid"/>
+                      <a:round/>
+                      <a:headEnd type="none" w="med" len="med"/>
+                      <a:tailEnd type="none" w="med" len="med"/>
+                    </a:lnB>
+                    <a:noFill/>
+                  </a:tcPr>
+                </a:tc>
+                <a:tc>
+                  <a:txBody>
+                    <a:bodyPr/>
+                    <a:lstStyle/>
+                    <a:p>
+                      <a:endParaRPr kumimoji="1" lang="ja-JP" altLang="en-US" sz="100"/>
+                    </a:p>
+                  </a:txBody>
+                  <a:tcPr>
+                    <a:lnL w="3175" cap="flat" cmpd="sng" algn="ctr">
+                      <a:solidFill>
+                        <a:schemeClr val="tx1"/>
+                      </a:solidFill>
+                      <a:prstDash val="solid"/>
+                      <a:round/>
+                      <a:headEnd type="none" w="med" len="med"/>
+                      <a:tailEnd type="none" w="med" len="med"/>
+                    </a:lnL>
+                    <a:lnR w="12700" cap="flat" cmpd="sng" algn="ctr">
+                      <a:noFill/>
+                      <a:prstDash val="solid"/>
+                      <a:round/>
+                      <a:headEnd type="none" w="med" len="med"/>
+                      <a:tailEnd type="none" w="med" len="med"/>
+                    </a:lnR>
+                    <a:lnT w="3175" cap="flat" cmpd="sng" algn="ctr">
+                      <a:solidFill>
+                        <a:schemeClr val="tx1"/>
+                      </a:solidFill>
+                      <a:prstDash val="solid"/>
+                      <a:round/>
+                      <a:headEnd type="none" w="med" len="med"/>
+                      <a:tailEnd type="none" w="med" len="med"/>
+                    </a:lnT>
+                    <a:lnB w="3175" cap="flat" cmpd="sng" algn="ctr">
+                      <a:solidFill>
+                        <a:schemeClr val="tx1"/>
+                      </a:solidFill>
+                      <a:prstDash val="solid"/>
+                      <a:round/>
+                      <a:headEnd type="none" w="med" len="med"/>
+                      <a:tailEnd type="none" w="med" len="med"/>
+                    </a:lnB>
+                    <a:noFill/>
+                  </a:tcPr>
+                </a:tc>
+                <a:extLst>
+                  <a:ext uri="{0D108BD9-81ED-4DB2-BD59-A6C34878D82A}">
+                    <a16:rowId xmlns:a16="http://schemas.microsoft.com/office/drawing/2014/main" val="731460077"/>
+                  </a:ext>
+                </a:extLst>
+              </a:tr>
+              <a:tr h="221552">
+                <a:tc>
+                  <a:txBody>
+                    <a:bodyPr/>
+                    <a:lstStyle/>
+                    <a:p>
+                      <a:endParaRPr kumimoji="1" lang="ja-JP" altLang="en-US" sz="100" dirty="0"/>
+                    </a:p>
+                  </a:txBody>
+                  <a:tcPr>
+                    <a:lnL w="12700" cap="flat" cmpd="sng" algn="ctr">
+                      <a:noFill/>
+                      <a:prstDash val="solid"/>
+                      <a:round/>
+                      <a:headEnd type="none" w="med" len="med"/>
+                      <a:tailEnd type="none" w="med" len="med"/>
+                    </a:lnL>
+                    <a:lnR w="3175" cap="flat" cmpd="sng" algn="ctr">
+                      <a:solidFill>
+                        <a:schemeClr val="tx1"/>
+                      </a:solidFill>
+                      <a:prstDash val="solid"/>
+                      <a:round/>
+                      <a:headEnd type="none" w="med" len="med"/>
+                      <a:tailEnd type="none" w="med" len="med"/>
+                    </a:lnR>
+                    <a:lnT w="3175" cap="flat" cmpd="sng" algn="ctr">
+                      <a:solidFill>
+                        <a:schemeClr val="tx1"/>
+                      </a:solidFill>
+                      <a:prstDash val="solid"/>
+                      <a:round/>
+                      <a:headEnd type="none" w="med" len="med"/>
+                      <a:tailEnd type="none" w="med" len="med"/>
+                    </a:lnT>
+                    <a:lnB w="3175" cap="flat" cmpd="sng" algn="ctr">
+                      <a:solidFill>
+                        <a:schemeClr val="tx1"/>
+                      </a:solidFill>
+                      <a:prstDash val="solid"/>
+                      <a:round/>
+                      <a:headEnd type="none" w="med" len="med"/>
+                      <a:tailEnd type="none" w="med" len="med"/>
+                    </a:lnB>
+                    <a:noFill/>
+                  </a:tcPr>
+                </a:tc>
+                <a:tc>
+                  <a:txBody>
+                    <a:bodyPr/>
+                    <a:lstStyle/>
+                    <a:p>
+                      <a:endParaRPr kumimoji="1" lang="ja-JP" altLang="en-US" sz="100"/>
+                    </a:p>
+                  </a:txBody>
+                  <a:tcPr>
+                    <a:lnL w="3175" cap="flat" cmpd="sng" algn="ctr">
+                      <a:solidFill>
+                        <a:schemeClr val="tx1"/>
+                      </a:solidFill>
+                      <a:prstDash val="solid"/>
+                      <a:round/>
+                      <a:headEnd type="none" w="med" len="med"/>
+                      <a:tailEnd type="none" w="med" len="med"/>
+                    </a:lnL>
+                    <a:lnR w="3175" cap="flat" cmpd="sng" algn="ctr">
+                      <a:solidFill>
+                        <a:schemeClr val="tx1"/>
+                      </a:solidFill>
+                      <a:prstDash val="solid"/>
+                      <a:round/>
+                      <a:headEnd type="none" w="med" len="med"/>
+                      <a:tailEnd type="none" w="med" len="med"/>
+                    </a:lnR>
+                    <a:lnT w="3175" cap="flat" cmpd="sng" algn="ctr">
+                      <a:solidFill>
+                        <a:schemeClr val="tx1"/>
+                      </a:solidFill>
+                      <a:prstDash val="solid"/>
+                      <a:round/>
+                      <a:headEnd type="none" w="med" len="med"/>
+                      <a:tailEnd type="none" w="med" len="med"/>
+                    </a:lnT>
+                    <a:lnB w="3175" cap="flat" cmpd="sng" algn="ctr">
+                      <a:solidFill>
+                        <a:schemeClr val="tx1"/>
+                      </a:solidFill>
+                      <a:prstDash val="solid"/>
+                      <a:round/>
+                      <a:headEnd type="none" w="med" len="med"/>
+                      <a:tailEnd type="none" w="med" len="med"/>
+                    </a:lnB>
+                    <a:noFill/>
+                  </a:tcPr>
+                </a:tc>
+                <a:tc>
+                  <a:txBody>
+                    <a:bodyPr/>
+                    <a:lstStyle/>
+                    <a:p>
+                      <a:endParaRPr kumimoji="1" lang="ja-JP" altLang="en-US" sz="100"/>
+                    </a:p>
+                  </a:txBody>
+                  <a:tcPr>
+                    <a:lnL w="3175" cap="flat" cmpd="sng" algn="ctr">
+                      <a:solidFill>
+                        <a:schemeClr val="tx1"/>
+                      </a:solidFill>
+                      <a:prstDash val="solid"/>
+                      <a:round/>
+                      <a:headEnd type="none" w="med" len="med"/>
+                      <a:tailEnd type="none" w="med" len="med"/>
+                    </a:lnL>
+                    <a:lnR w="3175" cap="flat" cmpd="sng" algn="ctr">
+                      <a:solidFill>
+                        <a:schemeClr val="tx1"/>
+                      </a:solidFill>
+                      <a:prstDash val="solid"/>
+                      <a:round/>
+                      <a:headEnd type="none" w="med" len="med"/>
+                      <a:tailEnd type="none" w="med" len="med"/>
+                    </a:lnR>
+                    <a:lnT w="3175" cap="flat" cmpd="sng" algn="ctr">
+                      <a:solidFill>
+                        <a:schemeClr val="tx1"/>
+                      </a:solidFill>
+                      <a:prstDash val="solid"/>
+                      <a:round/>
+                      <a:headEnd type="none" w="med" len="med"/>
+                      <a:tailEnd type="none" w="med" len="med"/>
+                    </a:lnT>
+                    <a:lnB w="3175" cap="flat" cmpd="sng" algn="ctr">
+                      <a:solidFill>
+                        <a:schemeClr val="tx1"/>
+                      </a:solidFill>
+                      <a:prstDash val="solid"/>
+                      <a:round/>
+                      <a:headEnd type="none" w="med" len="med"/>
+                      <a:tailEnd type="none" w="med" len="med"/>
+                    </a:lnB>
+                    <a:noFill/>
+                  </a:tcPr>
+                </a:tc>
+                <a:tc>
+                  <a:txBody>
+                    <a:bodyPr/>
+                    <a:lstStyle/>
+                    <a:p>
+                      <a:endParaRPr kumimoji="1" lang="ja-JP" altLang="en-US" sz="100"/>
+                    </a:p>
+                  </a:txBody>
+                  <a:tcPr>
+                    <a:lnL w="3175" cap="flat" cmpd="sng" algn="ctr">
+                      <a:solidFill>
+                        <a:schemeClr val="tx1"/>
+                      </a:solidFill>
+                      <a:prstDash val="solid"/>
+                      <a:round/>
+                      <a:headEnd type="none" w="med" len="med"/>
+                      <a:tailEnd type="none" w="med" len="med"/>
+                    </a:lnL>
+                    <a:lnR w="3175" cap="flat" cmpd="sng" algn="ctr">
+                      <a:solidFill>
+                        <a:schemeClr val="tx1"/>
+                      </a:solidFill>
+                      <a:prstDash val="solid"/>
+                      <a:round/>
+                      <a:headEnd type="none" w="med" len="med"/>
+                      <a:tailEnd type="none" w="med" len="med"/>
+                    </a:lnR>
+                    <a:lnT w="3175" cap="flat" cmpd="sng" algn="ctr">
+                      <a:solidFill>
+                        <a:schemeClr val="tx1"/>
+                      </a:solidFill>
+                      <a:prstDash val="solid"/>
+                      <a:round/>
+                      <a:headEnd type="none" w="med" len="med"/>
+                      <a:tailEnd type="none" w="med" len="med"/>
+                    </a:lnT>
+                    <a:lnB w="3175" cap="flat" cmpd="sng" algn="ctr">
+                      <a:solidFill>
+                        <a:schemeClr val="tx1"/>
+                      </a:solidFill>
+                      <a:prstDash val="solid"/>
+                      <a:round/>
+                      <a:headEnd type="none" w="med" len="med"/>
+                      <a:tailEnd type="none" w="med" len="med"/>
+                    </a:lnB>
+                    <a:noFill/>
+                  </a:tcPr>
+                </a:tc>
+                <a:tc>
+                  <a:txBody>
+                    <a:bodyPr/>
+                    <a:lstStyle/>
+                    <a:p>
+                      <a:endParaRPr kumimoji="1" lang="ja-JP" altLang="en-US" sz="100" dirty="0"/>
+                    </a:p>
+                  </a:txBody>
+                  <a:tcPr>
+                    <a:lnL w="3175" cap="flat" cmpd="sng" algn="ctr">
+                      <a:solidFill>
+                        <a:schemeClr val="tx1"/>
+                      </a:solidFill>
+                      <a:prstDash val="solid"/>
+                      <a:round/>
+                      <a:headEnd type="none" w="med" len="med"/>
+                      <a:tailEnd type="none" w="med" len="med"/>
+                    </a:lnL>
+                    <a:lnR w="12700" cap="flat" cmpd="sng" algn="ctr">
+                      <a:noFill/>
+                      <a:prstDash val="solid"/>
+                      <a:round/>
+                      <a:headEnd type="none" w="med" len="med"/>
+                      <a:tailEnd type="none" w="med" len="med"/>
+                    </a:lnR>
+                    <a:lnT w="3175" cap="flat" cmpd="sng" algn="ctr">
+                      <a:solidFill>
+                        <a:schemeClr val="tx1"/>
+                      </a:solidFill>
+                      <a:prstDash val="solid"/>
+                      <a:round/>
+                      <a:headEnd type="none" w="med" len="med"/>
+                      <a:tailEnd type="none" w="med" len="med"/>
+                    </a:lnT>
+                    <a:lnB w="3175" cap="flat" cmpd="sng" algn="ctr">
+                      <a:solidFill>
+                        <a:schemeClr val="tx1"/>
+                      </a:solidFill>
+                      <a:prstDash val="solid"/>
+                      <a:round/>
+                      <a:headEnd type="none" w="med" len="med"/>
+                      <a:tailEnd type="none" w="med" len="med"/>
+                    </a:lnB>
+                    <a:noFill/>
+                  </a:tcPr>
+                </a:tc>
+                <a:extLst>
+                  <a:ext uri="{0D108BD9-81ED-4DB2-BD59-A6C34878D82A}">
+                    <a16:rowId xmlns:a16="http://schemas.microsoft.com/office/drawing/2014/main" val="3383399258"/>
+                  </a:ext>
+                </a:extLst>
+              </a:tr>
+              <a:tr h="221552">
+                <a:tc>
+                  <a:txBody>
+                    <a:bodyPr/>
+                    <a:lstStyle/>
+                    <a:p>
+                      <a:endParaRPr kumimoji="1" lang="ja-JP" altLang="en-US" sz="100" dirty="0"/>
+                    </a:p>
+                  </a:txBody>
+                  <a:tcPr>
+                    <a:lnL w="12700" cap="flat" cmpd="sng" algn="ctr">
+                      <a:noFill/>
+                      <a:prstDash val="solid"/>
+                      <a:round/>
+                      <a:headEnd type="none" w="med" len="med"/>
+                      <a:tailEnd type="none" w="med" len="med"/>
+                    </a:lnL>
+                    <a:lnR w="3175" cap="flat" cmpd="sng" algn="ctr">
+                      <a:solidFill>
+                        <a:schemeClr val="tx1"/>
+                      </a:solidFill>
+                      <a:prstDash val="solid"/>
+                      <a:round/>
+                      <a:headEnd type="none" w="med" len="med"/>
+                      <a:tailEnd type="none" w="med" len="med"/>
+                    </a:lnR>
+                    <a:lnT w="3175" cap="flat" cmpd="sng" algn="ctr">
+                      <a:solidFill>
+                        <a:schemeClr val="tx1"/>
+                      </a:solidFill>
+                      <a:prstDash val="solid"/>
+                      <a:round/>
+                      <a:headEnd type="none" w="med" len="med"/>
+                      <a:tailEnd type="none" w="med" len="med"/>
+                    </a:lnT>
+                    <a:lnB w="3175" cap="flat" cmpd="sng" algn="ctr">
+                      <a:solidFill>
+                        <a:schemeClr val="tx1"/>
+                      </a:solidFill>
+                      <a:prstDash val="solid"/>
+                      <a:round/>
+                      <a:headEnd type="none" w="med" len="med"/>
+                      <a:tailEnd type="none" w="med" len="med"/>
+                    </a:lnB>
+                    <a:noFill/>
+                  </a:tcPr>
+                </a:tc>
+                <a:tc>
+                  <a:txBody>
+                    <a:bodyPr/>
+                    <a:lstStyle/>
+                    <a:p>
+                      <a:endParaRPr kumimoji="1" lang="ja-JP" altLang="en-US" sz="100"/>
+                    </a:p>
+                  </a:txBody>
+                  <a:tcPr>
+                    <a:lnL w="3175" cap="flat" cmpd="sng" algn="ctr">
+                      <a:solidFill>
+                        <a:schemeClr val="tx1"/>
+                      </a:solidFill>
+                      <a:prstDash val="solid"/>
+                      <a:round/>
+                      <a:headEnd type="none" w="med" len="med"/>
+                      <a:tailEnd type="none" w="med" len="med"/>
+                    </a:lnL>
+                    <a:lnR w="3175" cap="flat" cmpd="sng" algn="ctr">
+                      <a:solidFill>
+                        <a:schemeClr val="tx1"/>
+                      </a:solidFill>
+                      <a:prstDash val="solid"/>
+                      <a:round/>
+                      <a:headEnd type="none" w="med" len="med"/>
+                      <a:tailEnd type="none" w="med" len="med"/>
+                    </a:lnR>
+                    <a:lnT w="3175" cap="flat" cmpd="sng" algn="ctr">
+                      <a:solidFill>
+                        <a:schemeClr val="tx1"/>
+                      </a:solidFill>
+                      <a:prstDash val="solid"/>
+                      <a:round/>
+                      <a:headEnd type="none" w="med" len="med"/>
+                      <a:tailEnd type="none" w="med" len="med"/>
+                    </a:lnT>
+                    <a:lnB w="3175" cap="flat" cmpd="sng" algn="ctr">
+                      <a:solidFill>
+                        <a:schemeClr val="tx1"/>
+                      </a:solidFill>
+                      <a:prstDash val="solid"/>
+                      <a:round/>
+                      <a:headEnd type="none" w="med" len="med"/>
+                      <a:tailEnd type="none" w="med" len="med"/>
+                    </a:lnB>
+                    <a:noFill/>
+                  </a:tcPr>
+                </a:tc>
+                <a:tc>
+                  <a:txBody>
+                    <a:bodyPr/>
+                    <a:lstStyle/>
+                    <a:p>
+                      <a:endParaRPr kumimoji="1" lang="ja-JP" altLang="en-US" sz="100"/>
+                    </a:p>
+                  </a:txBody>
+                  <a:tcPr>
+                    <a:lnL w="3175" cap="flat" cmpd="sng" algn="ctr">
+                      <a:solidFill>
+                        <a:schemeClr val="tx1"/>
+                      </a:solidFill>
+                      <a:prstDash val="solid"/>
+                      <a:round/>
+                      <a:headEnd type="none" w="med" len="med"/>
+                      <a:tailEnd type="none" w="med" len="med"/>
+                    </a:lnL>
+                    <a:lnR w="3175" cap="flat" cmpd="sng" algn="ctr">
+                      <a:solidFill>
+                        <a:schemeClr val="tx1"/>
+                      </a:solidFill>
+                      <a:prstDash val="solid"/>
+                      <a:round/>
+                      <a:headEnd type="none" w="med" len="med"/>
+                      <a:tailEnd type="none" w="med" len="med"/>
+                    </a:lnR>
+                    <a:lnT w="3175" cap="flat" cmpd="sng" algn="ctr">
+                      <a:solidFill>
+                        <a:schemeClr val="tx1"/>
+                      </a:solidFill>
+                      <a:prstDash val="solid"/>
+                      <a:round/>
+                      <a:headEnd type="none" w="med" len="med"/>
+                      <a:tailEnd type="none" w="med" len="med"/>
+                    </a:lnT>
+                    <a:lnB w="3175" cap="flat" cmpd="sng" algn="ctr">
+                      <a:solidFill>
+                        <a:schemeClr val="tx1"/>
+                      </a:solidFill>
+                      <a:prstDash val="solid"/>
+                      <a:round/>
+                      <a:headEnd type="none" w="med" len="med"/>
+                      <a:tailEnd type="none" w="med" len="med"/>
+                    </a:lnB>
+                    <a:noFill/>
+                  </a:tcPr>
+                </a:tc>
+                <a:tc>
+                  <a:txBody>
+                    <a:bodyPr/>
+                    <a:lstStyle/>
+                    <a:p>
+                      <a:endParaRPr kumimoji="1" lang="ja-JP" altLang="en-US" sz="100"/>
+                    </a:p>
+                  </a:txBody>
+                  <a:tcPr>
+                    <a:lnL w="3175" cap="flat" cmpd="sng" algn="ctr">
+                      <a:solidFill>
+                        <a:schemeClr val="tx1"/>
+                      </a:solidFill>
+                      <a:prstDash val="solid"/>
+                      <a:round/>
+                      <a:headEnd type="none" w="med" len="med"/>
+                      <a:tailEnd type="none" w="med" len="med"/>
+                    </a:lnL>
+                    <a:lnR w="3175" cap="flat" cmpd="sng" algn="ctr">
+                      <a:solidFill>
+                        <a:schemeClr val="tx1"/>
+                      </a:solidFill>
+                      <a:prstDash val="solid"/>
+                      <a:round/>
+                      <a:headEnd type="none" w="med" len="med"/>
+                      <a:tailEnd type="none" w="med" len="med"/>
+                    </a:lnR>
+                    <a:lnT w="3175" cap="flat" cmpd="sng" algn="ctr">
+                      <a:solidFill>
+                        <a:schemeClr val="tx1"/>
+                      </a:solidFill>
+                      <a:prstDash val="solid"/>
+                      <a:round/>
+                      <a:headEnd type="none" w="med" len="med"/>
+                      <a:tailEnd type="none" w="med" len="med"/>
+                    </a:lnT>
+                    <a:lnB w="3175" cap="flat" cmpd="sng" algn="ctr">
+                      <a:solidFill>
+                        <a:schemeClr val="tx1"/>
+                      </a:solidFill>
+                      <a:prstDash val="solid"/>
+                      <a:round/>
+                      <a:headEnd type="none" w="med" len="med"/>
+                      <a:tailEnd type="none" w="med" len="med"/>
+                    </a:lnB>
+                    <a:noFill/>
+                  </a:tcPr>
+                </a:tc>
+                <a:tc>
+                  <a:txBody>
+                    <a:bodyPr/>
+                    <a:lstStyle/>
+                    <a:p>
+                      <a:endParaRPr kumimoji="1" lang="ja-JP" altLang="en-US" sz="100"/>
+                    </a:p>
+                  </a:txBody>
+                  <a:tcPr>
+                    <a:lnL w="3175" cap="flat" cmpd="sng" algn="ctr">
+                      <a:solidFill>
+                        <a:schemeClr val="tx1"/>
+                      </a:solidFill>
+                      <a:prstDash val="solid"/>
+                      <a:round/>
+                      <a:headEnd type="none" w="med" len="med"/>
+                      <a:tailEnd type="none" w="med" len="med"/>
+                    </a:lnL>
+                    <a:lnR w="12700" cap="flat" cmpd="sng" algn="ctr">
+                      <a:noFill/>
+                      <a:prstDash val="solid"/>
+                      <a:round/>
+                      <a:headEnd type="none" w="med" len="med"/>
+                      <a:tailEnd type="none" w="med" len="med"/>
+                    </a:lnR>
+                    <a:lnT w="3175" cap="flat" cmpd="sng" algn="ctr">
+                      <a:solidFill>
+                        <a:schemeClr val="tx1"/>
+                      </a:solidFill>
+                      <a:prstDash val="solid"/>
+                      <a:round/>
+                      <a:headEnd type="none" w="med" len="med"/>
+                      <a:tailEnd type="none" w="med" len="med"/>
+                    </a:lnT>
+                    <a:lnB w="3175" cap="flat" cmpd="sng" algn="ctr">
+                      <a:solidFill>
+                        <a:schemeClr val="tx1"/>
+                      </a:solidFill>
+                      <a:prstDash val="solid"/>
+                      <a:round/>
+                      <a:headEnd type="none" w="med" len="med"/>
+                      <a:tailEnd type="none" w="med" len="med"/>
+                    </a:lnB>
+                    <a:noFill/>
+                  </a:tcPr>
+                </a:tc>
+                <a:extLst>
+                  <a:ext uri="{0D108BD9-81ED-4DB2-BD59-A6C34878D82A}">
+                    <a16:rowId xmlns:a16="http://schemas.microsoft.com/office/drawing/2014/main" val="1948166537"/>
+                  </a:ext>
+                </a:extLst>
+              </a:tr>
+              <a:tr h="221552">
+                <a:tc>
+                  <a:txBody>
+                    <a:bodyPr/>
+                    <a:lstStyle/>
+                    <a:p>
+                      <a:endParaRPr kumimoji="1" lang="ja-JP" altLang="en-US" sz="100" dirty="0"/>
+                    </a:p>
+                  </a:txBody>
+                  <a:tcPr>
+                    <a:lnL w="12700" cap="flat" cmpd="sng" algn="ctr">
+                      <a:noFill/>
+                      <a:prstDash val="solid"/>
+                      <a:round/>
+                      <a:headEnd type="none" w="med" len="med"/>
+                      <a:tailEnd type="none" w="med" len="med"/>
+                    </a:lnL>
+                    <a:lnR w="3175" cap="flat" cmpd="sng" algn="ctr">
+                      <a:solidFill>
+                        <a:schemeClr val="tx1"/>
+                      </a:solidFill>
+                      <a:prstDash val="solid"/>
+                      <a:round/>
+                      <a:headEnd type="none" w="med" len="med"/>
+                      <a:tailEnd type="none" w="med" len="med"/>
+                    </a:lnR>
+                    <a:lnT w="3175" cap="flat" cmpd="sng" algn="ctr">
+                      <a:solidFill>
+                        <a:schemeClr val="tx1"/>
+                      </a:solidFill>
+                      <a:prstDash val="solid"/>
+                      <a:round/>
+                      <a:headEnd type="none" w="med" len="med"/>
+                      <a:tailEnd type="none" w="med" len="med"/>
+                    </a:lnT>
+                    <a:lnB w="3175" cap="flat" cmpd="sng" algn="ctr">
+                      <a:solidFill>
+                        <a:schemeClr val="tx1"/>
+                      </a:solidFill>
+                      <a:prstDash val="solid"/>
+                      <a:round/>
+                      <a:headEnd type="none" w="med" len="med"/>
+                      <a:tailEnd type="none" w="med" len="med"/>
+                    </a:lnB>
+                    <a:noFill/>
+                  </a:tcPr>
+                </a:tc>
+                <a:tc>
+                  <a:txBody>
+                    <a:bodyPr/>
+                    <a:lstStyle/>
+                    <a:p>
+                      <a:endParaRPr kumimoji="1" lang="ja-JP" altLang="en-US" sz="100"/>
+                    </a:p>
+                  </a:txBody>
+                  <a:tcPr>
+                    <a:lnL w="3175" cap="flat" cmpd="sng" algn="ctr">
+                      <a:solidFill>
+                        <a:schemeClr val="tx1"/>
+                      </a:solidFill>
+                      <a:prstDash val="solid"/>
+                      <a:round/>
+                      <a:headEnd type="none" w="med" len="med"/>
+                      <a:tailEnd type="none" w="med" len="med"/>
+                    </a:lnL>
+                    <a:lnR w="3175" cap="flat" cmpd="sng" algn="ctr">
+                      <a:solidFill>
+                        <a:schemeClr val="tx1"/>
+                      </a:solidFill>
+                      <a:prstDash val="solid"/>
+                      <a:round/>
+                      <a:headEnd type="none" w="med" len="med"/>
+                      <a:tailEnd type="none" w="med" len="med"/>
+                    </a:lnR>
+                    <a:lnT w="3175" cap="flat" cmpd="sng" algn="ctr">
+                      <a:solidFill>
+                        <a:schemeClr val="tx1"/>
+                      </a:solidFill>
+                      <a:prstDash val="solid"/>
+                      <a:round/>
+                      <a:headEnd type="none" w="med" len="med"/>
+                      <a:tailEnd type="none" w="med" len="med"/>
+                    </a:lnT>
+                    <a:lnB w="3175" cap="flat" cmpd="sng" algn="ctr">
+                      <a:solidFill>
+                        <a:schemeClr val="tx1"/>
+                      </a:solidFill>
+                      <a:prstDash val="solid"/>
+                      <a:round/>
+                      <a:headEnd type="none" w="med" len="med"/>
+                      <a:tailEnd type="none" w="med" len="med"/>
+                    </a:lnB>
+                    <a:noFill/>
+                  </a:tcPr>
+                </a:tc>
+                <a:tc>
+                  <a:txBody>
+                    <a:bodyPr/>
+                    <a:lstStyle/>
+                    <a:p>
+                      <a:endParaRPr kumimoji="1" lang="ja-JP" altLang="en-US" sz="100"/>
+                    </a:p>
+                  </a:txBody>
+                  <a:tcPr>
+                    <a:lnL w="3175" cap="flat" cmpd="sng" algn="ctr">
+                      <a:solidFill>
+                        <a:schemeClr val="tx1"/>
+                      </a:solidFill>
+                      <a:prstDash val="solid"/>
+                      <a:round/>
+                      <a:headEnd type="none" w="med" len="med"/>
+                      <a:tailEnd type="none" w="med" len="med"/>
+                    </a:lnL>
+                    <a:lnR w="3175" cap="flat" cmpd="sng" algn="ctr">
+                      <a:solidFill>
+                        <a:schemeClr val="tx1"/>
+                      </a:solidFill>
+                      <a:prstDash val="solid"/>
+                      <a:round/>
+                      <a:headEnd type="none" w="med" len="med"/>
+                      <a:tailEnd type="none" w="med" len="med"/>
+                    </a:lnR>
+                    <a:lnT w="3175" cap="flat" cmpd="sng" algn="ctr">
+                      <a:solidFill>
+                        <a:schemeClr val="tx1"/>
+                      </a:solidFill>
+                      <a:prstDash val="solid"/>
+                      <a:round/>
+                      <a:headEnd type="none" w="med" len="med"/>
+                      <a:tailEnd type="none" w="med" len="med"/>
+                    </a:lnT>
+                    <a:lnB w="3175" cap="flat" cmpd="sng" algn="ctr">
+                      <a:solidFill>
+                        <a:schemeClr val="tx1"/>
+                      </a:solidFill>
+                      <a:prstDash val="solid"/>
+                      <a:round/>
+                      <a:headEnd type="none" w="med" len="med"/>
+                      <a:tailEnd type="none" w="med" len="med"/>
+                    </a:lnB>
+                    <a:noFill/>
+                  </a:tcPr>
+                </a:tc>
+                <a:tc>
+                  <a:txBody>
+                    <a:bodyPr/>
+                    <a:lstStyle/>
+                    <a:p>
+                      <a:endParaRPr kumimoji="1" lang="ja-JP" altLang="en-US" sz="100"/>
+                    </a:p>
+                  </a:txBody>
+                  <a:tcPr>
+                    <a:lnL w="3175" cap="flat" cmpd="sng" algn="ctr">
+                      <a:solidFill>
+                        <a:schemeClr val="tx1"/>
+                      </a:solidFill>
+                      <a:prstDash val="solid"/>
+                      <a:round/>
+                      <a:headEnd type="none" w="med" len="med"/>
+                      <a:tailEnd type="none" w="med" len="med"/>
+                    </a:lnL>
+                    <a:lnR w="3175" cap="flat" cmpd="sng" algn="ctr">
+                      <a:solidFill>
+                        <a:schemeClr val="tx1"/>
+                      </a:solidFill>
+                      <a:prstDash val="solid"/>
+                      <a:round/>
+                      <a:headEnd type="none" w="med" len="med"/>
+                      <a:tailEnd type="none" w="med" len="med"/>
+                    </a:lnR>
+                    <a:lnT w="3175" cap="flat" cmpd="sng" algn="ctr">
+                      <a:solidFill>
+                        <a:schemeClr val="tx1"/>
+                      </a:solidFill>
+                      <a:prstDash val="solid"/>
+                      <a:round/>
+                      <a:headEnd type="none" w="med" len="med"/>
+                      <a:tailEnd type="none" w="med" len="med"/>
+                    </a:lnT>
+                    <a:lnB w="3175" cap="flat" cmpd="sng" algn="ctr">
+                      <a:solidFill>
+                        <a:schemeClr val="tx1"/>
+                      </a:solidFill>
+                      <a:prstDash val="solid"/>
+                      <a:round/>
+                      <a:headEnd type="none" w="med" len="med"/>
+                      <a:tailEnd type="none" w="med" len="med"/>
+                    </a:lnB>
+                    <a:noFill/>
+                  </a:tcPr>
+                </a:tc>
+                <a:tc>
+                  <a:txBody>
+                    <a:bodyPr/>
+                    <a:lstStyle/>
+                    <a:p>
+                      <a:endParaRPr kumimoji="1" lang="ja-JP" altLang="en-US" sz="100"/>
+                    </a:p>
+                  </a:txBody>
+                  <a:tcPr>
+                    <a:lnL w="3175" cap="flat" cmpd="sng" algn="ctr">
+                      <a:solidFill>
+                        <a:schemeClr val="tx1"/>
+                      </a:solidFill>
+                      <a:prstDash val="solid"/>
+                      <a:round/>
+                      <a:headEnd type="none" w="med" len="med"/>
+                      <a:tailEnd type="none" w="med" len="med"/>
+                    </a:lnL>
+                    <a:lnR w="12700" cap="flat" cmpd="sng" algn="ctr">
+                      <a:noFill/>
+                      <a:prstDash val="solid"/>
+                      <a:round/>
+                      <a:headEnd type="none" w="med" len="med"/>
+                      <a:tailEnd type="none" w="med" len="med"/>
+                    </a:lnR>
+                    <a:lnT w="3175" cap="flat" cmpd="sng" algn="ctr">
+                      <a:solidFill>
+                        <a:schemeClr val="tx1"/>
+                      </a:solidFill>
+                      <a:prstDash val="solid"/>
+                      <a:round/>
+                      <a:headEnd type="none" w="med" len="med"/>
+                      <a:tailEnd type="none" w="med" len="med"/>
+                    </a:lnT>
+                    <a:lnB w="3175" cap="flat" cmpd="sng" algn="ctr">
+                      <a:solidFill>
+                        <a:schemeClr val="tx1"/>
+                      </a:solidFill>
+                      <a:prstDash val="solid"/>
+                      <a:round/>
+                      <a:headEnd type="none" w="med" len="med"/>
+                      <a:tailEnd type="none" w="med" len="med"/>
+                    </a:lnB>
+                    <a:noFill/>
+                  </a:tcPr>
+                </a:tc>
+                <a:extLst>
+                  <a:ext uri="{0D108BD9-81ED-4DB2-BD59-A6C34878D82A}">
+                    <a16:rowId xmlns:a16="http://schemas.microsoft.com/office/drawing/2014/main" val="2099293680"/>
+                  </a:ext>
+                </a:extLst>
+              </a:tr>
+              <a:tr h="221552">
+                <a:tc>
+                  <a:txBody>
+                    <a:bodyPr/>
+                    <a:lstStyle/>
+                    <a:p>
+                      <a:endParaRPr kumimoji="1" lang="ja-JP" altLang="en-US" sz="100" dirty="0"/>
+                    </a:p>
+                  </a:txBody>
+                  <a:tcPr>
+                    <a:lnL w="12700" cap="flat" cmpd="sng" algn="ctr">
+                      <a:noFill/>
+                      <a:prstDash val="solid"/>
+                      <a:round/>
+                      <a:headEnd type="none" w="med" len="med"/>
+                      <a:tailEnd type="none" w="med" len="med"/>
+                    </a:lnL>
+                    <a:lnR w="3175" cap="flat" cmpd="sng" algn="ctr">
+                      <a:solidFill>
+                        <a:schemeClr val="tx1"/>
+                      </a:solidFill>
+                      <a:prstDash val="solid"/>
+                      <a:round/>
+                      <a:headEnd type="none" w="med" len="med"/>
+                      <a:tailEnd type="none" w="med" len="med"/>
+                    </a:lnR>
+                    <a:lnT w="3175" cap="flat" cmpd="sng" algn="ctr">
+                      <a:solidFill>
+                        <a:schemeClr val="tx1"/>
+                      </a:solidFill>
+                      <a:prstDash val="solid"/>
+                      <a:round/>
+                      <a:headEnd type="none" w="med" len="med"/>
+                      <a:tailEnd type="none" w="med" len="med"/>
+                    </a:lnT>
+                    <a:lnB w="12700" cap="flat" cmpd="sng" algn="ctr">
+                      <a:noFill/>
+                      <a:prstDash val="solid"/>
+                      <a:round/>
+                      <a:headEnd type="none" w="med" len="med"/>
+                      <a:tailEnd type="none" w="med" len="med"/>
+                    </a:lnB>
+                    <a:noFill/>
+                  </a:tcPr>
+                </a:tc>
+                <a:tc>
+                  <a:txBody>
+                    <a:bodyPr/>
+                    <a:lstStyle/>
+                    <a:p>
+                      <a:endParaRPr kumimoji="1" lang="ja-JP" altLang="en-US" sz="100"/>
+                    </a:p>
+                  </a:txBody>
+                  <a:tcPr>
+                    <a:lnL w="3175" cap="flat" cmpd="sng" algn="ctr">
+                      <a:solidFill>
+                        <a:schemeClr val="tx1"/>
+                      </a:solidFill>
+                      <a:prstDash val="solid"/>
+                      <a:round/>
+                      <a:headEnd type="none" w="med" len="med"/>
+                      <a:tailEnd type="none" w="med" len="med"/>
+                    </a:lnL>
+                    <a:lnR w="3175" cap="flat" cmpd="sng" algn="ctr">
+                      <a:solidFill>
+                        <a:schemeClr val="tx1"/>
+                      </a:solidFill>
+                      <a:prstDash val="solid"/>
+                      <a:round/>
+                      <a:headEnd type="none" w="med" len="med"/>
+                      <a:tailEnd type="none" w="med" len="med"/>
+                    </a:lnR>
+                    <a:lnT w="3175" cap="flat" cmpd="sng" algn="ctr">
+                      <a:solidFill>
+                        <a:schemeClr val="tx1"/>
+                      </a:solidFill>
+                      <a:prstDash val="solid"/>
+                      <a:round/>
+                      <a:headEnd type="none" w="med" len="med"/>
+                      <a:tailEnd type="none" w="med" len="med"/>
+                    </a:lnT>
+                    <a:lnB w="12700" cap="flat" cmpd="sng" algn="ctr">
+                      <a:noFill/>
+                      <a:prstDash val="solid"/>
+                      <a:round/>
+                      <a:headEnd type="none" w="med" len="med"/>
+                      <a:tailEnd type="none" w="med" len="med"/>
+                    </a:lnB>
+                    <a:noFill/>
+                  </a:tcPr>
+                </a:tc>
+                <a:tc>
+                  <a:txBody>
+                    <a:bodyPr/>
+                    <a:lstStyle/>
+                    <a:p>
+                      <a:endParaRPr kumimoji="1" lang="ja-JP" altLang="en-US" sz="100"/>
+                    </a:p>
+                  </a:txBody>
+                  <a:tcPr>
+                    <a:lnL w="3175" cap="flat" cmpd="sng" algn="ctr">
+                      <a:solidFill>
+                        <a:schemeClr val="tx1"/>
+                      </a:solidFill>
+                      <a:prstDash val="solid"/>
+                      <a:round/>
+                      <a:headEnd type="none" w="med" len="med"/>
+                      <a:tailEnd type="none" w="med" len="med"/>
+                    </a:lnL>
+                    <a:lnR w="3175" cap="flat" cmpd="sng" algn="ctr">
+                      <a:solidFill>
+                        <a:schemeClr val="tx1"/>
+                      </a:solidFill>
+                      <a:prstDash val="solid"/>
+                      <a:round/>
+                      <a:headEnd type="none" w="med" len="med"/>
+                      <a:tailEnd type="none" w="med" len="med"/>
+                    </a:lnR>
+                    <a:lnT w="3175" cap="flat" cmpd="sng" algn="ctr">
+                      <a:solidFill>
+                        <a:schemeClr val="tx1"/>
+                      </a:solidFill>
+                      <a:prstDash val="solid"/>
+                      <a:round/>
+                      <a:headEnd type="none" w="med" len="med"/>
+                      <a:tailEnd type="none" w="med" len="med"/>
+                    </a:lnT>
+                    <a:lnB w="12700" cap="flat" cmpd="sng" algn="ctr">
+                      <a:noFill/>
+                      <a:prstDash val="solid"/>
+                      <a:round/>
+                      <a:headEnd type="none" w="med" len="med"/>
+                      <a:tailEnd type="none" w="med" len="med"/>
+                    </a:lnB>
+                    <a:noFill/>
+                  </a:tcPr>
+                </a:tc>
+                <a:tc>
+                  <a:txBody>
+                    <a:bodyPr/>
+                    <a:lstStyle/>
+                    <a:p>
+                      <a:endParaRPr kumimoji="1" lang="ja-JP" altLang="en-US" sz="100"/>
+                    </a:p>
+                  </a:txBody>
+                  <a:tcPr>
+                    <a:lnL w="3175" cap="flat" cmpd="sng" algn="ctr">
+                      <a:solidFill>
+                        <a:schemeClr val="tx1"/>
+                      </a:solidFill>
+                      <a:prstDash val="solid"/>
+                      <a:round/>
+                      <a:headEnd type="none" w="med" len="med"/>
+                      <a:tailEnd type="none" w="med" len="med"/>
+                    </a:lnL>
+                    <a:lnR w="3175" cap="flat" cmpd="sng" algn="ctr">
+                      <a:solidFill>
+                        <a:schemeClr val="tx1"/>
+                      </a:solidFill>
+                      <a:prstDash val="solid"/>
+                      <a:round/>
+                      <a:headEnd type="none" w="med" len="med"/>
+                      <a:tailEnd type="none" w="med" len="med"/>
+                    </a:lnR>
+                    <a:lnT w="3175" cap="flat" cmpd="sng" algn="ctr">
+                      <a:solidFill>
+                        <a:schemeClr val="tx1"/>
+                      </a:solidFill>
+                      <a:prstDash val="solid"/>
+                      <a:round/>
+                      <a:headEnd type="none" w="med" len="med"/>
+                      <a:tailEnd type="none" w="med" len="med"/>
+                    </a:lnT>
+                    <a:lnB w="12700" cap="flat" cmpd="sng" algn="ctr">
+                      <a:noFill/>
+                      <a:prstDash val="solid"/>
+                      <a:round/>
+                      <a:headEnd type="none" w="med" len="med"/>
+                      <a:tailEnd type="none" w="med" len="med"/>
+                    </a:lnB>
+                    <a:noFill/>
+                  </a:tcPr>
+                </a:tc>
+                <a:tc>
+                  <a:txBody>
+                    <a:bodyPr/>
+                    <a:lstStyle/>
+                    <a:p>
+                      <a:endParaRPr kumimoji="1" lang="ja-JP" altLang="en-US" sz="100" dirty="0"/>
+                    </a:p>
+                  </a:txBody>
+                  <a:tcPr>
+                    <a:lnL w="3175" cap="flat" cmpd="sng" algn="ctr">
+                      <a:solidFill>
+                        <a:schemeClr val="tx1"/>
+                      </a:solidFill>
+                      <a:prstDash val="solid"/>
+                      <a:round/>
+                      <a:headEnd type="none" w="med" len="med"/>
+                      <a:tailEnd type="none" w="med" len="med"/>
+                    </a:lnL>
+                    <a:lnR w="12700" cap="flat" cmpd="sng" algn="ctr">
+                      <a:noFill/>
+                      <a:prstDash val="solid"/>
+                      <a:round/>
+                      <a:headEnd type="none" w="med" len="med"/>
+                      <a:tailEnd type="none" w="med" len="med"/>
+                    </a:lnR>
+                    <a:lnT w="3175" cap="flat" cmpd="sng" algn="ctr">
+                      <a:solidFill>
+                        <a:schemeClr val="tx1"/>
+                      </a:solidFill>
+                      <a:prstDash val="solid"/>
+                      <a:round/>
+                      <a:headEnd type="none" w="med" len="med"/>
+                      <a:tailEnd type="none" w="med" len="med"/>
+                    </a:lnT>
+                    <a:lnB w="12700" cap="flat" cmpd="sng" algn="ctr">
+                      <a:noFill/>
+                      <a:prstDash val="solid"/>
+                      <a:round/>
+                      <a:headEnd type="none" w="med" len="med"/>
+                      <a:tailEnd type="none" w="med" len="med"/>
+                    </a:lnB>
+                    <a:noFill/>
+                  </a:tcPr>
+                </a:tc>
+                <a:extLst>
+                  <a:ext uri="{0D108BD9-81ED-4DB2-BD59-A6C34878D82A}">
+                    <a16:rowId xmlns:a16="http://schemas.microsoft.com/office/drawing/2014/main" val="616843169"/>
+                  </a:ext>
+                </a:extLst>
+              </a:tr>
+            </a:tbl>
+          </a:graphicData>
+        </a:graphic>
+      </p:graphicFrame>
+      <p:sp>
+        <p:nvSpPr>
+          <p:cNvPr id="51" name="テキスト ボックス 50">
+            <a:extLst>
+              <a:ext uri="{FF2B5EF4-FFF2-40B4-BE49-F238E27FC236}">
+                <a16:creationId xmlns:a16="http://schemas.microsoft.com/office/drawing/2014/main" id="{5CB9C829-F0F8-7552-E2F3-382E0B05516E}"/>
+              </a:ext>
+            </a:extLst>
+          </p:cNvPr>
+          <p:cNvSpPr txBox="1"/>
+          <p:nvPr/>
+        </p:nvSpPr>
+        <p:spPr>
+          <a:xfrm>
+            <a:off x="4516410" y="5102934"/>
+            <a:ext cx="364202" cy="307777"/>
+          </a:xfrm>
+          <a:prstGeom prst="rect">
+            <a:avLst/>
+          </a:prstGeom>
+          <a:noFill/>
+        </p:spPr>
+        <p:txBody>
+          <a:bodyPr wrap="none" rtlCol="0">
+            <a:spAutoFit/>
+          </a:bodyPr>
+          <a:lstStyle/>
+          <a:p>
+            <a:r>
+              <a:rPr kumimoji="1" lang="ja-JP" altLang="en-US" sz="1400" dirty="0"/>
+              <a:t>✕</a:t>
+            </a:r>
+          </a:p>
+        </p:txBody>
+      </p:sp>
+      <p:cxnSp>
+        <p:nvCxnSpPr>
+          <p:cNvPr id="53" name="直線コネクタ 52">
+            <a:extLst>
+              <a:ext uri="{FF2B5EF4-FFF2-40B4-BE49-F238E27FC236}">
+                <a16:creationId xmlns:a16="http://schemas.microsoft.com/office/drawing/2014/main" id="{800763EC-F090-91C4-2901-5CD6CD4145D0}"/>
+              </a:ext>
+            </a:extLst>
+          </p:cNvPr>
+          <p:cNvCxnSpPr>
+            <a:cxnSpLocks/>
+          </p:cNvCxnSpPr>
+          <p:nvPr/>
+        </p:nvCxnSpPr>
+        <p:spPr>
+          <a:xfrm flipV="1">
+            <a:off x="4739022" y="4798309"/>
+            <a:ext cx="751586" cy="365668"/>
+          </a:xfrm>
+          <a:prstGeom prst="line">
+            <a:avLst/>
+          </a:prstGeom>
+        </p:spPr>
+        <p:style>
+          <a:lnRef idx="1">
+            <a:schemeClr val="accent1"/>
+          </a:lnRef>
+          <a:fillRef idx="0">
+            <a:schemeClr val="accent1"/>
+          </a:fillRef>
+          <a:effectRef idx="0">
+            <a:schemeClr val="accent1"/>
+          </a:effectRef>
+          <a:fontRef idx="minor">
+            <a:schemeClr val="tx1"/>
+          </a:fontRef>
+        </p:style>
+      </p:cxnSp>
+      <p:sp>
+        <p:nvSpPr>
+          <p:cNvPr id="55" name="テキスト ボックス 54">
+            <a:extLst>
+              <a:ext uri="{FF2B5EF4-FFF2-40B4-BE49-F238E27FC236}">
+                <a16:creationId xmlns:a16="http://schemas.microsoft.com/office/drawing/2014/main" id="{5CF66844-2A6C-C780-D71B-DAC3C58956AB}"/>
+              </a:ext>
+            </a:extLst>
+          </p:cNvPr>
+          <p:cNvSpPr txBox="1"/>
+          <p:nvPr/>
+        </p:nvSpPr>
+        <p:spPr>
+          <a:xfrm>
+            <a:off x="5413717" y="4532418"/>
+            <a:ext cx="2608406" cy="577081"/>
+          </a:xfrm>
+          <a:prstGeom prst="rect">
+            <a:avLst/>
+          </a:prstGeom>
+          <a:noFill/>
+        </p:spPr>
+        <p:txBody>
+          <a:bodyPr wrap="none" rtlCol="0">
+            <a:spAutoFit/>
+          </a:bodyPr>
+          <a:lstStyle/>
+          <a:p>
+            <a:r>
+              <a:rPr kumimoji="1" lang="ja-JP" altLang="en-US" sz="1050" dirty="0"/>
+              <a:t>今描画しようとしている</a:t>
+            </a:r>
+            <a:r>
+              <a:rPr kumimoji="1" lang="en-US" altLang="ja-JP" sz="1050" dirty="0" err="1"/>
+              <a:t>BoardPos</a:t>
+            </a:r>
+            <a:r>
+              <a:rPr lang="ja-JP" altLang="en-US" sz="1050" dirty="0"/>
+              <a:t>が</a:t>
+            </a:r>
+            <a:endParaRPr lang="en-US" altLang="ja-JP" sz="1050" dirty="0"/>
+          </a:p>
+          <a:p>
+            <a:r>
+              <a:rPr kumimoji="1" lang="ja-JP" altLang="en-US" sz="1050" dirty="0"/>
+              <a:t>何個目の</a:t>
+            </a:r>
+            <a:r>
+              <a:rPr kumimoji="1" lang="en-US" altLang="ja-JP" sz="1050" dirty="0"/>
+              <a:t>Pos</a:t>
+            </a:r>
+            <a:r>
+              <a:rPr kumimoji="1" lang="ja-JP" altLang="en-US" sz="1050" dirty="0"/>
+              <a:t>かを数えて，</a:t>
+            </a:r>
+            <a:endParaRPr kumimoji="1" lang="en-US" altLang="ja-JP" sz="1050" dirty="0"/>
+          </a:p>
+          <a:p>
+            <a:r>
+              <a:rPr lang="ja-JP" altLang="en-US" sz="1050" dirty="0"/>
+              <a:t>それがアゲハマの数より下なら石を置く</a:t>
+            </a:r>
+            <a:endParaRPr kumimoji="1" lang="ja-JP" altLang="en-US" sz="1050" dirty="0"/>
+          </a:p>
+        </p:txBody>
+      </p:sp>
+      <p:cxnSp>
+        <p:nvCxnSpPr>
+          <p:cNvPr id="56" name="直線矢印コネクタ 55">
+            <a:extLst>
+              <a:ext uri="{FF2B5EF4-FFF2-40B4-BE49-F238E27FC236}">
+                <a16:creationId xmlns:a16="http://schemas.microsoft.com/office/drawing/2014/main" id="{0C8BC4A3-875A-8330-0E0A-95C3C6EE187E}"/>
+              </a:ext>
+            </a:extLst>
+          </p:cNvPr>
+          <p:cNvCxnSpPr>
+            <a:cxnSpLocks/>
+          </p:cNvCxnSpPr>
+          <p:nvPr/>
+        </p:nvCxnSpPr>
+        <p:spPr>
+          <a:xfrm flipV="1">
+            <a:off x="4264253" y="5470166"/>
+            <a:ext cx="0" cy="973723"/>
+          </a:xfrm>
+          <a:prstGeom prst="straightConnector1">
+            <a:avLst/>
+          </a:prstGeom>
+          <a:ln w="12700">
+            <a:solidFill>
+              <a:schemeClr val="accent1"/>
+            </a:solidFill>
+            <a:headEnd type="arrow" w="med" len="med"/>
+            <a:tailEnd type="arrow" w="med" len="med"/>
+          </a:ln>
+        </p:spPr>
+        <p:style>
+          <a:lnRef idx="1">
+            <a:schemeClr val="accent1"/>
+          </a:lnRef>
+          <a:fillRef idx="0">
+            <a:schemeClr val="accent1"/>
+          </a:fillRef>
+          <a:effectRef idx="0">
+            <a:schemeClr val="accent1"/>
+          </a:effectRef>
+          <a:fontRef idx="minor">
+            <a:schemeClr val="tx1"/>
+          </a:fontRef>
+        </p:style>
+      </p:cxnSp>
+      <p:cxnSp>
+        <p:nvCxnSpPr>
+          <p:cNvPr id="59" name="直線矢印コネクタ 58">
+            <a:extLst>
+              <a:ext uri="{FF2B5EF4-FFF2-40B4-BE49-F238E27FC236}">
+                <a16:creationId xmlns:a16="http://schemas.microsoft.com/office/drawing/2014/main" id="{61C9C2B8-03A6-B307-CC2F-3D340E2BCA92}"/>
+              </a:ext>
+            </a:extLst>
+          </p:cNvPr>
+          <p:cNvCxnSpPr>
+            <a:cxnSpLocks/>
+          </p:cNvCxnSpPr>
+          <p:nvPr/>
+        </p:nvCxnSpPr>
+        <p:spPr>
+          <a:xfrm flipH="1">
+            <a:off x="4223289" y="5470166"/>
+            <a:ext cx="955291" cy="0"/>
+          </a:xfrm>
+          <a:prstGeom prst="straightConnector1">
+            <a:avLst/>
+          </a:prstGeom>
+          <a:ln w="12700">
+            <a:solidFill>
+              <a:schemeClr val="accent1"/>
+            </a:solidFill>
+            <a:headEnd type="arrow" w="med" len="med"/>
+            <a:tailEnd type="arrow" w="med" len="med"/>
+          </a:ln>
+        </p:spPr>
+        <p:style>
+          <a:lnRef idx="1">
+            <a:schemeClr val="accent1"/>
+          </a:lnRef>
+          <a:fillRef idx="0">
+            <a:schemeClr val="accent1"/>
+          </a:fillRef>
+          <a:effectRef idx="0">
+            <a:schemeClr val="accent1"/>
+          </a:effectRef>
+          <a:fontRef idx="minor">
+            <a:schemeClr val="tx1"/>
+          </a:fontRef>
+        </p:style>
+      </p:cxnSp>
+      <p:cxnSp>
+        <p:nvCxnSpPr>
+          <p:cNvPr id="62" name="直線矢印コネクタ 61">
+            <a:extLst>
+              <a:ext uri="{FF2B5EF4-FFF2-40B4-BE49-F238E27FC236}">
+                <a16:creationId xmlns:a16="http://schemas.microsoft.com/office/drawing/2014/main" id="{5105BBD0-28AA-5901-C164-C7A01BEB8B00}"/>
+              </a:ext>
+            </a:extLst>
+          </p:cNvPr>
+          <p:cNvCxnSpPr>
+            <a:cxnSpLocks/>
+            <a:stCxn id="50" idx="3"/>
+          </p:cNvCxnSpPr>
+          <p:nvPr/>
+        </p:nvCxnSpPr>
+        <p:spPr>
+          <a:xfrm flipH="1">
+            <a:off x="4681721" y="5239752"/>
+            <a:ext cx="569974" cy="0"/>
+          </a:xfrm>
+          <a:prstGeom prst="straightConnector1">
+            <a:avLst/>
+          </a:prstGeom>
+          <a:ln w="12700">
+            <a:solidFill>
+              <a:schemeClr val="accent1"/>
+            </a:solidFill>
+            <a:headEnd type="arrow" w="med" len="med"/>
+            <a:tailEnd type="arrow" w="med" len="med"/>
+          </a:ln>
+        </p:spPr>
+        <p:style>
+          <a:lnRef idx="1">
+            <a:schemeClr val="accent1"/>
+          </a:lnRef>
+          <a:fillRef idx="0">
+            <a:schemeClr val="accent1"/>
+          </a:fillRef>
+          <a:effectRef idx="0">
+            <a:schemeClr val="accent1"/>
+          </a:effectRef>
+          <a:fontRef idx="minor">
+            <a:schemeClr val="tx1"/>
+          </a:fontRef>
+        </p:style>
+      </p:cxnSp>
     </p:spTree>
     <p:extLst>
       <p:ext uri="{BB962C8B-B14F-4D97-AF65-F5344CB8AC3E}">
@@ -8034,53 +11033,6 @@
       </p:sp>
       <p:sp>
         <p:nvSpPr>
-          <p:cNvPr id="25" name="テキスト ボックス 24">
-            <a:extLst>
-              <a:ext uri="{FF2B5EF4-FFF2-40B4-BE49-F238E27FC236}">
-                <a16:creationId xmlns:a16="http://schemas.microsoft.com/office/drawing/2014/main" id="{D9C1B2BE-740D-1731-D369-BE2DE68531E8}"/>
-              </a:ext>
-            </a:extLst>
-          </p:cNvPr>
-          <p:cNvSpPr txBox="1"/>
-          <p:nvPr/>
-        </p:nvSpPr>
-        <p:spPr>
-          <a:xfrm>
-            <a:off x="1416569" y="132896"/>
-            <a:ext cx="6384010" cy="276999"/>
-          </a:xfrm>
-          <a:prstGeom prst="rect">
-            <a:avLst/>
-          </a:prstGeom>
-          <a:noFill/>
-        </p:spPr>
-        <p:txBody>
-          <a:bodyPr wrap="square">
-            <a:spAutoFit/>
-          </a:bodyPr>
-          <a:lstStyle/>
-          <a:p>
-            <a:r>
-              <a:rPr lang="en-US" altLang="ja-JP" sz="1200" b="1" dirty="0">
-                <a:solidFill>
-                  <a:srgbClr val="FF0000"/>
-                </a:solidFill>
-              </a:rPr>
-              <a:t>Main</a:t>
-            </a:r>
-            <a:r>
-              <a:rPr lang="ja-JP" altLang="en-US" sz="1200" b="1" dirty="0">
-                <a:solidFill>
-                  <a:srgbClr val="FF0000"/>
-                </a:solidFill>
-              </a:rPr>
-              <a:t>とテクスチャサイズが違うので，座標変換が同じにならない（たぶん）</a:t>
-            </a:r>
-          </a:p>
-        </p:txBody>
-      </p:sp>
-      <p:sp>
-        <p:nvSpPr>
           <p:cNvPr id="27" name="正方形/長方形 26">
             <a:extLst>
               <a:ext uri="{FF2B5EF4-FFF2-40B4-BE49-F238E27FC236}">
@@ -8484,6 +11436,183 @@
           </a:fontRef>
         </p:style>
       </p:cxnSp>
+      <p:sp>
+        <p:nvSpPr>
+          <p:cNvPr id="26" name="正方形/長方形 25">
+            <a:extLst>
+              <a:ext uri="{FF2B5EF4-FFF2-40B4-BE49-F238E27FC236}">
+                <a16:creationId xmlns:a16="http://schemas.microsoft.com/office/drawing/2014/main" id="{44DC9B6F-4DF5-A080-EAF9-31D7193F3B2E}"/>
+              </a:ext>
+            </a:extLst>
+          </p:cNvPr>
+          <p:cNvSpPr/>
+          <p:nvPr/>
+        </p:nvSpPr>
+        <p:spPr>
+          <a:xfrm>
+            <a:off x="6625216" y="5829300"/>
+            <a:ext cx="378192" cy="411895"/>
+          </a:xfrm>
+          <a:prstGeom prst="rect">
+            <a:avLst/>
+          </a:prstGeom>
+          <a:solidFill>
+            <a:schemeClr val="accent6">
+              <a:alpha val="30196"/>
+            </a:schemeClr>
+          </a:solidFill>
+        </p:spPr>
+        <p:style>
+          <a:lnRef idx="2">
+            <a:schemeClr val="accent1">
+              <a:shade val="50000"/>
+            </a:schemeClr>
+          </a:lnRef>
+          <a:fillRef idx="1">
+            <a:schemeClr val="accent1"/>
+          </a:fillRef>
+          <a:effectRef idx="0">
+            <a:schemeClr val="accent1"/>
+          </a:effectRef>
+          <a:fontRef idx="minor">
+            <a:schemeClr val="lt1"/>
+          </a:fontRef>
+        </p:style>
+        <p:txBody>
+          <a:bodyPr rtlCol="0" anchor="ctr"/>
+          <a:lstStyle/>
+          <a:p>
+            <a:pPr algn="ctr"/>
+            <a:endParaRPr kumimoji="1" lang="ja-JP" altLang="en-US" b="1" dirty="0">
+              <a:solidFill>
+                <a:sysClr val="windowText" lastClr="000000"/>
+              </a:solidFill>
+            </a:endParaRPr>
+          </a:p>
+        </p:txBody>
+      </p:sp>
+      <p:cxnSp>
+        <p:nvCxnSpPr>
+          <p:cNvPr id="29" name="直線コネクタ 28">
+            <a:extLst>
+              <a:ext uri="{FF2B5EF4-FFF2-40B4-BE49-F238E27FC236}">
+                <a16:creationId xmlns:a16="http://schemas.microsoft.com/office/drawing/2014/main" id="{4BEFADE7-3DCF-3A58-E18D-6A9B6D463FCC}"/>
+              </a:ext>
+            </a:extLst>
+          </p:cNvPr>
+          <p:cNvCxnSpPr>
+            <a:cxnSpLocks/>
+          </p:cNvCxnSpPr>
+          <p:nvPr/>
+        </p:nvCxnSpPr>
+        <p:spPr>
+          <a:xfrm flipV="1">
+            <a:off x="6809817" y="5969358"/>
+            <a:ext cx="434549" cy="51379"/>
+          </a:xfrm>
+          <a:prstGeom prst="line">
+            <a:avLst/>
+          </a:prstGeom>
+          <a:ln w="19050">
+            <a:solidFill>
+              <a:schemeClr val="accent6"/>
+            </a:solidFill>
+          </a:ln>
+        </p:spPr>
+        <p:style>
+          <a:lnRef idx="1">
+            <a:schemeClr val="accent1"/>
+          </a:lnRef>
+          <a:fillRef idx="0">
+            <a:schemeClr val="accent1"/>
+          </a:fillRef>
+          <a:effectRef idx="0">
+            <a:schemeClr val="accent1"/>
+          </a:effectRef>
+          <a:fontRef idx="minor">
+            <a:schemeClr val="tx1"/>
+          </a:fontRef>
+        </p:style>
+      </p:cxnSp>
+      <p:sp>
+        <p:nvSpPr>
+          <p:cNvPr id="30" name="テキスト ボックス 29">
+            <a:extLst>
+              <a:ext uri="{FF2B5EF4-FFF2-40B4-BE49-F238E27FC236}">
+                <a16:creationId xmlns:a16="http://schemas.microsoft.com/office/drawing/2014/main" id="{8DB79609-AD4C-FA26-09BA-BC6813939C7F}"/>
+              </a:ext>
+            </a:extLst>
+          </p:cNvPr>
+          <p:cNvSpPr txBox="1"/>
+          <p:nvPr/>
+        </p:nvSpPr>
+        <p:spPr>
+          <a:xfrm>
+            <a:off x="7326448" y="5663088"/>
+            <a:ext cx="4948541" cy="461665"/>
+          </a:xfrm>
+          <a:prstGeom prst="rect">
+            <a:avLst/>
+          </a:prstGeom>
+          <a:noFill/>
+        </p:spPr>
+        <p:txBody>
+          <a:bodyPr wrap="square" rtlCol="0">
+            <a:spAutoFit/>
+          </a:bodyPr>
+          <a:lstStyle/>
+          <a:p>
+            <a:r>
+              <a:rPr lang="en-US" altLang="ja-JP" sz="1200" b="1" dirty="0" err="1"/>
+              <a:t>BufA</a:t>
+            </a:r>
+            <a:r>
+              <a:rPr lang="ja-JP" altLang="en-US" sz="1200" b="1" dirty="0"/>
+              <a:t>から</a:t>
+            </a:r>
+            <a:r>
+              <a:rPr lang="en-US" altLang="ja-JP" sz="1200" b="1" dirty="0"/>
+              <a:t>B</a:t>
+            </a:r>
+            <a:r>
+              <a:rPr lang="ja-JP" altLang="en-US" sz="1200" b="1" dirty="0"/>
+              <a:t>へ渡す情報のキャッシュ</a:t>
+            </a:r>
+            <a:endParaRPr lang="en-US" altLang="ja-JP" sz="1200" b="1" dirty="0"/>
+          </a:p>
+          <a:p>
+            <a:r>
+              <a:rPr lang="en-US" altLang="ja-JP" sz="1200" b="1" dirty="0"/>
+              <a:t>W =</a:t>
+            </a:r>
+            <a:r>
+              <a:rPr lang="ja-JP" altLang="en-US" sz="1200" b="1" dirty="0"/>
+              <a:t> </a:t>
+            </a:r>
+            <a:r>
+              <a:rPr lang="en-US" altLang="ja-JP" sz="1200" b="1" dirty="0" err="1"/>
+              <a:t>BufA</a:t>
+            </a:r>
+            <a:r>
+              <a:rPr lang="ja-JP" altLang="en-US" sz="1200" b="1" dirty="0"/>
+              <a:t>で更新があれば</a:t>
+            </a:r>
+            <a:r>
+              <a:rPr lang="en-US" altLang="ja-JP" sz="1200" b="1" dirty="0"/>
+              <a:t>1.0</a:t>
+            </a:r>
+            <a:r>
+              <a:rPr lang="ja-JP" altLang="en-US" sz="1200" b="1" dirty="0"/>
+              <a:t>，なければ</a:t>
+            </a:r>
+            <a:r>
+              <a:rPr lang="en-US" altLang="ja-JP" sz="1200" b="1" dirty="0"/>
+              <a:t>0.0</a:t>
+            </a:r>
+            <a:endParaRPr kumimoji="1" lang="en-US" altLang="ja-JP" sz="1200" b="1" dirty="0"/>
+          </a:p>
+        </p:txBody>
+      </p:sp>
     </p:spTree>
     <p:extLst>
       <p:ext uri="{BB962C8B-B14F-4D97-AF65-F5344CB8AC3E}">

</xml_diff>